<commit_message>
Update SQL part 3
</commit_message>
<xml_diff>
--- a/sql_course/2_database_design/2_database_design.pptx
+++ b/sql_course/2_database_design/2_database_design.pptx
@@ -5,7 +5,7 @@
     <p:sldMasterId id="2147483648" r:id="rId1"/>
   </p:sldMasterIdLst>
   <p:notesMasterIdLst>
-    <p:notesMasterId r:id="rId41"/>
+    <p:notesMasterId r:id="rId42"/>
   </p:notesMasterIdLst>
   <p:sldIdLst>
     <p:sldId id="256" r:id="rId2"/>
@@ -23,30 +23,31 @@
     <p:sldId id="313" r:id="rId14"/>
     <p:sldId id="314" r:id="rId15"/>
     <p:sldId id="320" r:id="rId16"/>
-    <p:sldId id="360" r:id="rId17"/>
-    <p:sldId id="266" r:id="rId18"/>
-    <p:sldId id="321" r:id="rId19"/>
-    <p:sldId id="316" r:id="rId20"/>
-    <p:sldId id="340" r:id="rId21"/>
-    <p:sldId id="357" r:id="rId22"/>
-    <p:sldId id="319" r:id="rId23"/>
-    <p:sldId id="323" r:id="rId24"/>
-    <p:sldId id="296" r:id="rId25"/>
-    <p:sldId id="333" r:id="rId26"/>
-    <p:sldId id="334" r:id="rId27"/>
-    <p:sldId id="335" r:id="rId28"/>
-    <p:sldId id="339" r:id="rId29"/>
-    <p:sldId id="337" r:id="rId30"/>
-    <p:sldId id="338" r:id="rId31"/>
-    <p:sldId id="343" r:id="rId32"/>
-    <p:sldId id="349" r:id="rId33"/>
-    <p:sldId id="298" r:id="rId34"/>
-    <p:sldId id="324" r:id="rId35"/>
-    <p:sldId id="297" r:id="rId36"/>
-    <p:sldId id="341" r:id="rId37"/>
-    <p:sldId id="342" r:id="rId38"/>
-    <p:sldId id="350" r:id="rId39"/>
-    <p:sldId id="322" r:id="rId40"/>
+    <p:sldId id="361" r:id="rId17"/>
+    <p:sldId id="360" r:id="rId18"/>
+    <p:sldId id="266" r:id="rId19"/>
+    <p:sldId id="321" r:id="rId20"/>
+    <p:sldId id="316" r:id="rId21"/>
+    <p:sldId id="340" r:id="rId22"/>
+    <p:sldId id="357" r:id="rId23"/>
+    <p:sldId id="319" r:id="rId24"/>
+    <p:sldId id="323" r:id="rId25"/>
+    <p:sldId id="296" r:id="rId26"/>
+    <p:sldId id="333" r:id="rId27"/>
+    <p:sldId id="334" r:id="rId28"/>
+    <p:sldId id="335" r:id="rId29"/>
+    <p:sldId id="339" r:id="rId30"/>
+    <p:sldId id="337" r:id="rId31"/>
+    <p:sldId id="338" r:id="rId32"/>
+    <p:sldId id="343" r:id="rId33"/>
+    <p:sldId id="349" r:id="rId34"/>
+    <p:sldId id="298" r:id="rId35"/>
+    <p:sldId id="324" r:id="rId36"/>
+    <p:sldId id="297" r:id="rId37"/>
+    <p:sldId id="341" r:id="rId38"/>
+    <p:sldId id="342" r:id="rId39"/>
+    <p:sldId id="350" r:id="rId40"/>
+    <p:sldId id="322" r:id="rId41"/>
   </p:sldIdLst>
   <p:sldSz cx="12192000" cy="6858000"/>
   <p:notesSz cx="6858000" cy="9144000"/>
@@ -235,7 +236,7 @@
           <a:p>
             <a:fld id="{61CE90D0-176A-4BE5-B54F-392F0A16E3B3}" type="datetimeFigureOut">
               <a:rPr lang="en-NL" smtClean="0"/>
-              <a:t>07/01/2025</a:t>
+              <a:t>10/01/2025</a:t>
             </a:fld>
             <a:endParaRPr lang="en-NL"/>
           </a:p>
@@ -652,7 +653,7 @@
           <a:p>
             <a:fld id="{F847AAA1-0A2D-4E17-BD7E-ECD1F2F24FF1}" type="slidenum">
               <a:rPr lang="en-NL" smtClean="0"/>
-              <a:t>29</a:t>
+              <a:t>30</a:t>
             </a:fld>
             <a:endParaRPr lang="en-NL"/>
           </a:p>
@@ -736,7 +737,7 @@
           <a:p>
             <a:fld id="{F847AAA1-0A2D-4E17-BD7E-ECD1F2F24FF1}" type="slidenum">
               <a:rPr lang="en-NL" smtClean="0"/>
-              <a:t>33</a:t>
+              <a:t>34</a:t>
             </a:fld>
             <a:endParaRPr lang="en-NL"/>
           </a:p>
@@ -820,7 +821,7 @@
           <a:p>
             <a:fld id="{F847AAA1-0A2D-4E17-BD7E-ECD1F2F24FF1}" type="slidenum">
               <a:rPr lang="en-NL" smtClean="0"/>
-              <a:t>34</a:t>
+              <a:t>35</a:t>
             </a:fld>
             <a:endParaRPr lang="en-NL"/>
           </a:p>
@@ -904,7 +905,7 @@
           <a:p>
             <a:fld id="{F847AAA1-0A2D-4E17-BD7E-ECD1F2F24FF1}" type="slidenum">
               <a:rPr lang="en-NL" smtClean="0"/>
-              <a:t>35</a:t>
+              <a:t>36</a:t>
             </a:fld>
             <a:endParaRPr lang="en-NL"/>
           </a:p>
@@ -988,7 +989,7 @@
           <a:p>
             <a:fld id="{F847AAA1-0A2D-4E17-BD7E-ECD1F2F24FF1}" type="slidenum">
               <a:rPr lang="en-NL" smtClean="0"/>
-              <a:t>36</a:t>
+              <a:t>37</a:t>
             </a:fld>
             <a:endParaRPr lang="en-NL"/>
           </a:p>
@@ -1156,7 +1157,7 @@
           <a:p>
             <a:fld id="{F847AAA1-0A2D-4E17-BD7E-ECD1F2F24FF1}" type="slidenum">
               <a:rPr lang="en-NL" smtClean="0"/>
-              <a:t>22</a:t>
+              <a:t>23</a:t>
             </a:fld>
             <a:endParaRPr lang="en-NL"/>
           </a:p>
@@ -1268,7 +1269,7 @@
           <a:p>
             <a:fld id="{F847AAA1-0A2D-4E17-BD7E-ECD1F2F24FF1}" type="slidenum">
               <a:rPr lang="en-NL" smtClean="0"/>
-              <a:t>23</a:t>
+              <a:t>24</a:t>
             </a:fld>
             <a:endParaRPr lang="en-NL"/>
           </a:p>
@@ -1352,7 +1353,7 @@
           <a:p>
             <a:fld id="{F847AAA1-0A2D-4E17-BD7E-ECD1F2F24FF1}" type="slidenum">
               <a:rPr lang="en-NL" smtClean="0"/>
-              <a:t>24</a:t>
+              <a:t>25</a:t>
             </a:fld>
             <a:endParaRPr lang="en-NL"/>
           </a:p>
@@ -1436,7 +1437,7 @@
           <a:p>
             <a:fld id="{F847AAA1-0A2D-4E17-BD7E-ECD1F2F24FF1}" type="slidenum">
               <a:rPr lang="en-NL" smtClean="0"/>
-              <a:t>25</a:t>
+              <a:t>26</a:t>
             </a:fld>
             <a:endParaRPr lang="en-NL"/>
           </a:p>
@@ -1580,7 +1581,7 @@
           <a:p>
             <a:fld id="{F847AAA1-0A2D-4E17-BD7E-ECD1F2F24FF1}" type="slidenum">
               <a:rPr lang="en-NL" smtClean="0"/>
-              <a:t>26</a:t>
+              <a:t>27</a:t>
             </a:fld>
             <a:endParaRPr lang="en-NL"/>
           </a:p>
@@ -1664,7 +1665,7 @@
           <a:p>
             <a:fld id="{F847AAA1-0A2D-4E17-BD7E-ECD1F2F24FF1}" type="slidenum">
               <a:rPr lang="en-NL" smtClean="0"/>
-              <a:t>27</a:t>
+              <a:t>28</a:t>
             </a:fld>
             <a:endParaRPr lang="en-NL"/>
           </a:p>
@@ -1748,7 +1749,7 @@
           <a:p>
             <a:fld id="{F847AAA1-0A2D-4E17-BD7E-ECD1F2F24FF1}" type="slidenum">
               <a:rPr lang="en-NL" smtClean="0"/>
-              <a:t>28</a:t>
+              <a:t>29</a:t>
             </a:fld>
             <a:endParaRPr lang="en-NL"/>
           </a:p>
@@ -1916,7 +1917,7 @@
           <a:p>
             <a:fld id="{7B15CBDA-B49C-4B0F-9869-5B15867EA611}" type="datetimeFigureOut">
               <a:rPr lang="en-NL" smtClean="0"/>
-              <a:t>07/01/2025</a:t>
+              <a:t>10/01/2025</a:t>
             </a:fld>
             <a:endParaRPr lang="en-NL"/>
           </a:p>
@@ -2116,7 +2117,7 @@
           <a:p>
             <a:fld id="{7B15CBDA-B49C-4B0F-9869-5B15867EA611}" type="datetimeFigureOut">
               <a:rPr lang="en-NL" smtClean="0"/>
-              <a:t>07/01/2025</a:t>
+              <a:t>10/01/2025</a:t>
             </a:fld>
             <a:endParaRPr lang="en-NL"/>
           </a:p>
@@ -2326,7 +2327,7 @@
           <a:p>
             <a:fld id="{7B15CBDA-B49C-4B0F-9869-5B15867EA611}" type="datetimeFigureOut">
               <a:rPr lang="en-NL" smtClean="0"/>
-              <a:t>07/01/2025</a:t>
+              <a:t>10/01/2025</a:t>
             </a:fld>
             <a:endParaRPr lang="en-NL"/>
           </a:p>
@@ -2526,7 +2527,7 @@
           <a:p>
             <a:fld id="{7B15CBDA-B49C-4B0F-9869-5B15867EA611}" type="datetimeFigureOut">
               <a:rPr lang="en-NL" smtClean="0"/>
-              <a:t>07/01/2025</a:t>
+              <a:t>10/01/2025</a:t>
             </a:fld>
             <a:endParaRPr lang="en-NL"/>
           </a:p>
@@ -2802,7 +2803,7 @@
           <a:p>
             <a:fld id="{7B15CBDA-B49C-4B0F-9869-5B15867EA611}" type="datetimeFigureOut">
               <a:rPr lang="en-NL" smtClean="0"/>
-              <a:t>07/01/2025</a:t>
+              <a:t>10/01/2025</a:t>
             </a:fld>
             <a:endParaRPr lang="en-NL"/>
           </a:p>
@@ -3070,7 +3071,7 @@
           <a:p>
             <a:fld id="{7B15CBDA-B49C-4B0F-9869-5B15867EA611}" type="datetimeFigureOut">
               <a:rPr lang="en-NL" smtClean="0"/>
-              <a:t>07/01/2025</a:t>
+              <a:t>10/01/2025</a:t>
             </a:fld>
             <a:endParaRPr lang="en-NL"/>
           </a:p>
@@ -3485,7 +3486,7 @@
           <a:p>
             <a:fld id="{7B15CBDA-B49C-4B0F-9869-5B15867EA611}" type="datetimeFigureOut">
               <a:rPr lang="en-NL" smtClean="0"/>
-              <a:t>07/01/2025</a:t>
+              <a:t>10/01/2025</a:t>
             </a:fld>
             <a:endParaRPr lang="en-NL"/>
           </a:p>
@@ -3627,7 +3628,7 @@
           <a:p>
             <a:fld id="{7B15CBDA-B49C-4B0F-9869-5B15867EA611}" type="datetimeFigureOut">
               <a:rPr lang="en-NL" smtClean="0"/>
-              <a:t>07/01/2025</a:t>
+              <a:t>10/01/2025</a:t>
             </a:fld>
             <a:endParaRPr lang="en-NL"/>
           </a:p>
@@ -3740,7 +3741,7 @@
           <a:p>
             <a:fld id="{7B15CBDA-B49C-4B0F-9869-5B15867EA611}" type="datetimeFigureOut">
               <a:rPr lang="en-NL" smtClean="0"/>
-              <a:t>07/01/2025</a:t>
+              <a:t>10/01/2025</a:t>
             </a:fld>
             <a:endParaRPr lang="en-NL"/>
           </a:p>
@@ -4053,7 +4054,7 @@
           <a:p>
             <a:fld id="{7B15CBDA-B49C-4B0F-9869-5B15867EA611}" type="datetimeFigureOut">
               <a:rPr lang="en-NL" smtClean="0"/>
-              <a:t>07/01/2025</a:t>
+              <a:t>10/01/2025</a:t>
             </a:fld>
             <a:endParaRPr lang="en-NL"/>
           </a:p>
@@ -4342,7 +4343,7 @@
           <a:p>
             <a:fld id="{7B15CBDA-B49C-4B0F-9869-5B15867EA611}" type="datetimeFigureOut">
               <a:rPr lang="en-NL" smtClean="0"/>
-              <a:t>07/01/2025</a:t>
+              <a:t>10/01/2025</a:t>
             </a:fld>
             <a:endParaRPr lang="en-NL"/>
           </a:p>
@@ -4585,7 +4586,7 @@
           <a:p>
             <a:fld id="{7B15CBDA-B49C-4B0F-9869-5B15867EA611}" type="datetimeFigureOut">
               <a:rPr lang="en-NL" smtClean="0"/>
-              <a:t>07/01/2025</a:t>
+              <a:t>10/01/2025</a:t>
             </a:fld>
             <a:endParaRPr lang="en-NL"/>
           </a:p>
@@ -5261,7 +5262,7 @@
           <p:nvPr>
             <p:extLst>
               <p:ext uri="{D42A27DB-BD31-4B8C-83A1-F6EECF244321}">
-                <p14:modId xmlns:p14="http://schemas.microsoft.com/office/powerpoint/2010/main" val="178399480"/>
+                <p14:modId xmlns:p14="http://schemas.microsoft.com/office/powerpoint/2010/main" val="3217725437"/>
               </p:ext>
             </p:extLst>
           </p:nvPr>
@@ -5914,7 +5915,7 @@
           <p:nvPr>
             <p:extLst>
               <p:ext uri="{D42A27DB-BD31-4B8C-83A1-F6EECF244321}">
-                <p14:modId xmlns:p14="http://schemas.microsoft.com/office/powerpoint/2010/main" val="1319346741"/>
+                <p14:modId xmlns:p14="http://schemas.microsoft.com/office/powerpoint/2010/main" val="2212744580"/>
               </p:ext>
             </p:extLst>
           </p:nvPr>
@@ -6010,7 +6011,7 @@
                     <a:p>
                       <a:pPr algn="l"/>
                       <a:r>
-                        <a:rPr lang="nl-NL" sz="1600" noProof="0"/>
+                        <a:rPr lang="nl-NL" sz="1600" noProof="0" dirty="0"/>
                         <a:t>1</a:t>
                       </a:r>
                     </a:p>
@@ -6091,7 +6092,7 @@
                     <a:p>
                       <a:pPr algn="l"/>
                       <a:r>
-                        <a:rPr lang="nl-NL" sz="1600" noProof="0"/>
+                        <a:rPr lang="nl-NL" sz="1600" noProof="0" dirty="0"/>
                         <a:t>1</a:t>
                       </a:r>
                     </a:p>
@@ -6172,7 +6173,7 @@
                     <a:p>
                       <a:pPr algn="l"/>
                       <a:r>
-                        <a:rPr lang="nl-NL" sz="1600" noProof="0"/>
+                        <a:rPr lang="nl-NL" sz="1600" noProof="0" dirty="0"/>
                         <a:t>2</a:t>
                       </a:r>
                     </a:p>
@@ -6232,7 +6233,7 @@
                         <a:defRPr/>
                       </a:pPr>
                       <a:r>
-                        <a:rPr lang="nl-NL" sz="1600" noProof="0"/>
+                        <a:rPr lang="nl-NL" sz="1600" noProof="0" dirty="0"/>
                         <a:t>Scala</a:t>
                       </a:r>
                     </a:p>
@@ -6253,7 +6254,7 @@
                     <a:p>
                       <a:pPr algn="l"/>
                       <a:r>
-                        <a:rPr lang="nl-NL" sz="1600" noProof="0"/>
+                        <a:rPr lang="nl-NL" sz="1600" noProof="0" dirty="0"/>
                         <a:t>3</a:t>
                       </a:r>
                     </a:p>
@@ -6316,7 +6317,7 @@
                     <a:p>
                       <a:pPr algn="l"/>
                       <a:r>
-                        <a:rPr lang="nl-NL" sz="1600" noProof="0"/>
+                        <a:rPr lang="nl-NL" sz="1600" noProof="0" dirty="0"/>
                         <a:t>4</a:t>
                       </a:r>
                     </a:p>
@@ -8818,7 +8819,7 @@
             </a:pPr>
             <a:r>
               <a:rPr lang="nl-NL" sz="2000" dirty="0"/>
-              <a:t>Voorkomt herhaling in waardes</a:t>
+              <a:t>Voorkomt herhaling van waardes</a:t>
             </a:r>
           </a:p>
           <a:p>
@@ -8835,7 +8836,7 @@
             </a:pPr>
             <a:r>
               <a:rPr lang="nl-NL" sz="2000" dirty="0"/>
-              <a:t>Efficiënt qua data opslag.</a:t>
+              <a:t>Betere consistentie van waardes.</a:t>
             </a:r>
           </a:p>
           <a:p>
@@ -8852,7 +8853,7 @@
             </a:pPr>
             <a:r>
               <a:rPr lang="nl-NL" sz="2000" dirty="0"/>
-              <a:t>Duidelijk overzicht van relaties in de data.</a:t>
+              <a:t>Efficiënt qua data opslag.</a:t>
             </a:r>
           </a:p>
           <a:p>
@@ -8869,8 +8870,15 @@
             </a:pPr>
             <a:r>
               <a:rPr lang="nl-NL" sz="2000" dirty="0"/>
-              <a:t>Aanpassingen worden consistent doorgevoerd.</a:t>
-            </a:r>
+              <a:t>Duidelijk overzicht van relaties in de data.</a:t>
+            </a:r>
+          </a:p>
+          <a:p>
+            <a:pPr>
+              <a:buFontTx/>
+              <a:buChar char="-"/>
+            </a:pPr>
+            <a:endParaRPr lang="nl-NL" sz="2000" dirty="0"/>
           </a:p>
         </p:txBody>
       </p:sp>
@@ -9088,7 +9096,15 @@
             </a:pPr>
             <a:r>
               <a:rPr lang="nl-NL" sz="2000" dirty="0"/>
-              <a:t>Toegenomen complexiteit, o.a. in bevragen.</a:t>
+              <a:t>Toegenomen complexiteit (veel </a:t>
+            </a:r>
+            <a:r>
+              <a:rPr lang="nl-NL" sz="2000" dirty="0" err="1"/>
+              <a:t>JOINs</a:t>
+            </a:r>
+            <a:r>
+              <a:rPr lang="nl-NL" sz="2000" dirty="0"/>
+              <a:t>).</a:t>
             </a:r>
           </a:p>
           <a:p>
@@ -9105,7 +9121,7 @@
             </a:pPr>
             <a:r>
               <a:rPr lang="nl-NL" sz="2000" dirty="0"/>
-              <a:t>Opslag is goedkoop; rekenkracht minder.</a:t>
+              <a:t>Losse tabellen minder goed leesbaar.</a:t>
             </a:r>
           </a:p>
           <a:p>
@@ -9122,8 +9138,15 @@
             </a:pPr>
             <a:r>
               <a:rPr lang="nl-NL" sz="2000" dirty="0"/>
-              <a:t>Data op zichzelf zijn minder goed leesbaar.</a:t>
-            </a:r>
+              <a:t>Minder efficiënt qua rekenkracht.</a:t>
+            </a:r>
+          </a:p>
+          <a:p>
+            <a:pPr>
+              <a:buFontTx/>
+              <a:buChar char="-"/>
+            </a:pPr>
+            <a:endParaRPr lang="nl-NL" sz="2000" dirty="0"/>
           </a:p>
         </p:txBody>
       </p:sp>
@@ -9141,6 +9164,132 @@
 </file>
 
 <file path=ppt/slides/slide16.xml><?xml version="1.0" encoding="utf-8"?>
+<p:sld xmlns:a="http://schemas.openxmlformats.org/drawingml/2006/main" xmlns:r="http://schemas.openxmlformats.org/officeDocument/2006/relationships" xmlns:p="http://schemas.openxmlformats.org/presentationml/2006/main">
+  <p:cSld>
+    <p:spTree>
+      <p:nvGrpSpPr>
+        <p:cNvPr id="1" name="">
+          <a:extLst>
+            <a:ext uri="{FF2B5EF4-FFF2-40B4-BE49-F238E27FC236}">
+              <a16:creationId xmlns:a16="http://schemas.microsoft.com/office/drawing/2014/main" id="{5A1F9C09-FC02-5228-6A61-AFC785A2D17E}"/>
+            </a:ext>
+          </a:extLst>
+        </p:cNvPr>
+        <p:cNvGrpSpPr/>
+        <p:nvPr/>
+      </p:nvGrpSpPr>
+      <p:grpSpPr>
+        <a:xfrm>
+          <a:off x="0" y="0"/>
+          <a:ext cx="0" cy="0"/>
+          <a:chOff x="0" y="0"/>
+          <a:chExt cx="0" cy="0"/>
+        </a:xfrm>
+      </p:grpSpPr>
+      <p:sp>
+        <p:nvSpPr>
+          <p:cNvPr id="2" name="Title 1">
+            <a:extLst>
+              <a:ext uri="{FF2B5EF4-FFF2-40B4-BE49-F238E27FC236}">
+                <a16:creationId xmlns:a16="http://schemas.microsoft.com/office/drawing/2014/main" id="{A0126310-9DC0-6AAC-493A-CC8D72724991}"/>
+              </a:ext>
+            </a:extLst>
+          </p:cNvPr>
+          <p:cNvSpPr>
+            <a:spLocks noGrp="1"/>
+          </p:cNvSpPr>
+          <p:nvPr>
+            <p:ph type="title"/>
+          </p:nvPr>
+        </p:nvSpPr>
+        <p:spPr/>
+        <p:txBody>
+          <a:bodyPr>
+            <a:normAutofit/>
+          </a:bodyPr>
+          <a:lstStyle/>
+          <a:p>
+            <a:r>
+              <a:rPr lang="nl-NL" sz="3600" dirty="0"/>
+              <a:t>Oefeningen 1</a:t>
+            </a:r>
+          </a:p>
+        </p:txBody>
+      </p:sp>
+      <p:sp>
+        <p:nvSpPr>
+          <p:cNvPr id="3" name="Content Placeholder 2">
+            <a:extLst>
+              <a:ext uri="{FF2B5EF4-FFF2-40B4-BE49-F238E27FC236}">
+                <a16:creationId xmlns:a16="http://schemas.microsoft.com/office/drawing/2014/main" id="{09CFF3DE-DA11-A7C8-8682-8F636AA6B910}"/>
+              </a:ext>
+            </a:extLst>
+          </p:cNvPr>
+          <p:cNvSpPr>
+            <a:spLocks noGrp="1"/>
+          </p:cNvSpPr>
+          <p:nvPr>
+            <p:ph idx="1"/>
+          </p:nvPr>
+        </p:nvSpPr>
+        <p:spPr/>
+        <p:txBody>
+          <a:bodyPr>
+            <a:noAutofit/>
+          </a:bodyPr>
+          <a:lstStyle/>
+          <a:p>
+            <a:pPr marL="457200" indent="-457200">
+              <a:buAutoNum type="arabicPeriod"/>
+            </a:pPr>
+            <a:r>
+              <a:rPr lang="nl-NL" sz="2000" dirty="0"/>
+              <a:t>Wat voor type zijn de volgende relaties:</a:t>
+            </a:r>
+          </a:p>
+          <a:p>
+            <a:pPr marL="457200" indent="-457200">
+              <a:buAutoNum type="arabicPeriod"/>
+            </a:pPr>
+            <a:endParaRPr lang="nl-NL" sz="2000" dirty="0"/>
+          </a:p>
+          <a:p>
+            <a:pPr marL="457200" indent="-457200">
+              <a:buAutoNum type="arabicPeriod"/>
+            </a:pPr>
+            <a:endParaRPr lang="nl-NL" sz="2000" dirty="0"/>
+          </a:p>
+          <a:p>
+            <a:pPr marL="457200" indent="-457200">
+              <a:buAutoNum type="arabicPeriod"/>
+            </a:pPr>
+            <a:endParaRPr lang="nl-NL" sz="2000" dirty="0"/>
+          </a:p>
+          <a:p>
+            <a:pPr marL="457200" indent="-457200">
+              <a:buAutoNum type="arabicPeriod"/>
+            </a:pPr>
+            <a:r>
+              <a:rPr lang="nl-NL" sz="2000" dirty="0"/>
+              <a:t>Hoe zou je de volgende structuur uitmodeleren volgens 3NF:</a:t>
+            </a:r>
+          </a:p>
+        </p:txBody>
+      </p:sp>
+    </p:spTree>
+    <p:extLst>
+      <p:ext uri="{BB962C8B-B14F-4D97-AF65-F5344CB8AC3E}">
+        <p14:creationId xmlns:p14="http://schemas.microsoft.com/office/powerpoint/2010/main" val="145400048"/>
+      </p:ext>
+    </p:extLst>
+  </p:cSld>
+  <p:clrMapOvr>
+    <a:masterClrMapping/>
+  </p:clrMapOvr>
+</p:sld>
+</file>
+
+<file path=ppt/slides/slide17.xml><?xml version="1.0" encoding="utf-8"?>
 <p:sld xmlns:a="http://schemas.openxmlformats.org/drawingml/2006/main" xmlns:r="http://schemas.openxmlformats.org/officeDocument/2006/relationships" xmlns:p="http://schemas.openxmlformats.org/presentationml/2006/main">
   <p:cSld>
     <p:spTree>
@@ -9200,8 +9349,13 @@
             </a:r>
             <a:r>
               <a:rPr lang="nl-NL" sz="4400" dirty="0"/>
-              <a:t> Diagram</a:t>
-            </a:r>
+              <a:t> </a:t>
+            </a:r>
+            <a:r>
+              <a:rPr lang="nl-NL" sz="4400" dirty="0" err="1"/>
+              <a:t>Diagrams</a:t>
+            </a:r>
+            <a:endParaRPr lang="nl-NL" sz="4400" dirty="0"/>
           </a:p>
         </p:txBody>
       </p:sp>
@@ -9243,7 +9397,7 @@
 </p:sld>
 </file>
 
-<file path=ppt/slides/slide17.xml><?xml version="1.0" encoding="utf-8"?>
+<file path=ppt/slides/slide18.xml><?xml version="1.0" encoding="utf-8"?>
 <p:sld xmlns:a="http://schemas.openxmlformats.org/drawingml/2006/main" xmlns:r="http://schemas.openxmlformats.org/officeDocument/2006/relationships" xmlns:p="http://schemas.openxmlformats.org/presentationml/2006/main">
   <p:cSld>
     <p:spTree>
@@ -9716,7 +9870,7 @@
         <p:spPr>
           <a:xfrm>
             <a:off x="3000054" y="3796152"/>
-            <a:ext cx="4380366" cy="400110"/>
+            <a:ext cx="3941144" cy="400110"/>
           </a:xfrm>
           <a:prstGeom prst="rect">
             <a:avLst/>
@@ -9731,7 +9885,7 @@
           <a:p>
             <a:r>
               <a:rPr lang="nl-NL" sz="2000" dirty="0"/>
-              <a:t>Koppelt aan precies 1 record in de tabel.</a:t>
+              <a:t>Koppelt precies 1 record in de tabel.</a:t>
             </a:r>
           </a:p>
         </p:txBody>
@@ -9751,7 +9905,7 @@
         <p:spPr>
           <a:xfrm>
             <a:off x="3000054" y="4685628"/>
-            <a:ext cx="4700646" cy="400110"/>
+            <a:ext cx="3787447" cy="400110"/>
           </a:xfrm>
           <a:prstGeom prst="rect">
             <a:avLst/>
@@ -9766,7 +9920,7 @@
           <a:p>
             <a:r>
               <a:rPr lang="nl-NL" sz="2000" dirty="0"/>
-              <a:t>Koppelt aan meerdere records in een tabel.</a:t>
+              <a:t>Koppelt meer records in een tabel.</a:t>
             </a:r>
           </a:p>
         </p:txBody>
@@ -9786,7 +9940,7 @@
         <p:spPr>
           <a:xfrm>
             <a:off x="3000054" y="5571701"/>
-            <a:ext cx="5159105" cy="400110"/>
+            <a:ext cx="4245906" cy="400110"/>
           </a:xfrm>
           <a:prstGeom prst="rect">
             <a:avLst/>
@@ -9801,7 +9955,7 @@
           <a:p>
             <a:r>
               <a:rPr lang="nl-NL" sz="2000" dirty="0"/>
-              <a:t>Koppelt aan 1 of meerdere records in een tabel.</a:t>
+              <a:t>Koppelt 1 of meer records in een tabel.</a:t>
             </a:r>
           </a:p>
         </p:txBody>
@@ -10168,7 +10322,7 @@
         <p:spPr>
           <a:xfrm>
             <a:off x="3000055" y="2011753"/>
-            <a:ext cx="4263539" cy="400110"/>
+            <a:ext cx="3824317" cy="400110"/>
           </a:xfrm>
           <a:prstGeom prst="rect">
             <a:avLst/>
@@ -10183,7 +10337,7 @@
           <a:p>
             <a:r>
               <a:rPr lang="nl-NL" sz="2000" dirty="0"/>
-              <a:t>Koppelt aan 0 of 1 records in een tabel.</a:t>
+              <a:t>Koppelt 0 of 1 records in een tabel.</a:t>
             </a:r>
           </a:p>
         </p:txBody>
@@ -10203,7 +10357,7 @@
         <p:spPr>
           <a:xfrm>
             <a:off x="3000054" y="2895535"/>
-            <a:ext cx="5159105" cy="400110"/>
+            <a:ext cx="4245906" cy="400110"/>
           </a:xfrm>
           <a:prstGeom prst="rect">
             <a:avLst/>
@@ -10218,7 +10372,7 @@
           <a:p>
             <a:r>
               <a:rPr lang="nl-NL" sz="2000" dirty="0"/>
-              <a:t>Koppelt aan 0 of meerdere records in een tabel.</a:t>
+              <a:t>Koppelt 0 of meer records in een tabel.</a:t>
             </a:r>
           </a:p>
         </p:txBody>
@@ -10227,108 +10381,6 @@
     <p:extLst>
       <p:ext uri="{BB962C8B-B14F-4D97-AF65-F5344CB8AC3E}">
         <p14:creationId xmlns:p14="http://schemas.microsoft.com/office/powerpoint/2010/main" val="812638733"/>
-      </p:ext>
-    </p:extLst>
-  </p:cSld>
-  <p:clrMapOvr>
-    <a:masterClrMapping/>
-  </p:clrMapOvr>
-</p:sld>
-</file>
-
-<file path=ppt/slides/slide18.xml><?xml version="1.0" encoding="utf-8"?>
-<p:sld xmlns:a="http://schemas.openxmlformats.org/drawingml/2006/main" xmlns:r="http://schemas.openxmlformats.org/officeDocument/2006/relationships" xmlns:p="http://schemas.openxmlformats.org/presentationml/2006/main">
-  <p:cSld>
-    <p:spTree>
-      <p:nvGrpSpPr>
-        <p:cNvPr id="1" name=""/>
-        <p:cNvGrpSpPr/>
-        <p:nvPr/>
-      </p:nvGrpSpPr>
-      <p:grpSpPr>
-        <a:xfrm>
-          <a:off x="0" y="0"/>
-          <a:ext cx="0" cy="0"/>
-          <a:chOff x="0" y="0"/>
-          <a:chExt cx="0" cy="0"/>
-        </a:xfrm>
-      </p:grpSpPr>
-      <p:sp>
-        <p:nvSpPr>
-          <p:cNvPr id="2" name="Title 1">
-            <a:extLst>
-              <a:ext uri="{FF2B5EF4-FFF2-40B4-BE49-F238E27FC236}">
-                <a16:creationId xmlns:a16="http://schemas.microsoft.com/office/drawing/2014/main" id="{9BDFD261-0D2C-41B9-9E28-43DF575D40E0}"/>
-              </a:ext>
-            </a:extLst>
-          </p:cNvPr>
-          <p:cNvSpPr>
-            <a:spLocks noGrp="1"/>
-          </p:cNvSpPr>
-          <p:nvPr>
-            <p:ph type="title"/>
-          </p:nvPr>
-        </p:nvSpPr>
-        <p:spPr/>
-        <p:txBody>
-          <a:bodyPr>
-            <a:normAutofit/>
-          </a:bodyPr>
-          <a:lstStyle/>
-          <a:p>
-            <a:r>
-              <a:rPr lang="nl-NL" sz="3600" dirty="0" err="1"/>
-              <a:t>Entity</a:t>
-            </a:r>
-            <a:r>
-              <a:rPr lang="nl-NL" sz="3600" dirty="0"/>
-              <a:t> </a:t>
-            </a:r>
-            <a:r>
-              <a:rPr lang="nl-NL" sz="3600" dirty="0" err="1"/>
-              <a:t>Relationship</a:t>
-            </a:r>
-            <a:r>
-              <a:rPr lang="nl-NL" sz="3600" dirty="0"/>
-              <a:t> Diagram</a:t>
-            </a:r>
-          </a:p>
-        </p:txBody>
-      </p:sp>
-      <p:pic>
-        <p:nvPicPr>
-          <p:cNvPr id="3" name="Picture 2">
-            <a:extLst>
-              <a:ext uri="{FF2B5EF4-FFF2-40B4-BE49-F238E27FC236}">
-                <a16:creationId xmlns:a16="http://schemas.microsoft.com/office/drawing/2014/main" id="{9F7D6075-1C5C-4836-A0E8-6EFEAFDCF7CB}"/>
-              </a:ext>
-            </a:extLst>
-          </p:cNvPr>
-          <p:cNvPicPr>
-            <a:picLocks noChangeAspect="1"/>
-          </p:cNvPicPr>
-          <p:nvPr/>
-        </p:nvPicPr>
-        <p:blipFill>
-          <a:blip r:embed="rId2"/>
-          <a:stretch>
-            <a:fillRect/>
-          </a:stretch>
-        </p:blipFill>
-        <p:spPr>
-          <a:xfrm>
-            <a:off x="1801402" y="1407167"/>
-            <a:ext cx="8589196" cy="5085708"/>
-          </a:xfrm>
-          <a:prstGeom prst="rect">
-            <a:avLst/>
-          </a:prstGeom>
-        </p:spPr>
-      </p:pic>
-    </p:spTree>
-    <p:extLst>
-      <p:ext uri="{BB962C8B-B14F-4D97-AF65-F5344CB8AC3E}">
-        <p14:creationId xmlns:p14="http://schemas.microsoft.com/office/powerpoint/2010/main" val="1728007162"/>
       </p:ext>
     </p:extLst>
   </p:cSld>
@@ -10379,650 +10431,58 @@
           <a:lstStyle/>
           <a:p>
             <a:r>
+              <a:rPr lang="nl-NL" sz="3600" dirty="0" err="1"/>
+              <a:t>Entity</a:t>
+            </a:r>
+            <a:r>
               <a:rPr lang="nl-NL" sz="3600" dirty="0"/>
-              <a:t>Oefeningen 4</a:t>
+              <a:t> </a:t>
+            </a:r>
+            <a:r>
+              <a:rPr lang="nl-NL" sz="3600" dirty="0" err="1"/>
+              <a:t>Relationship</a:t>
+            </a:r>
+            <a:r>
+              <a:rPr lang="nl-NL" sz="3600" dirty="0"/>
+              <a:t> Diagram</a:t>
             </a:r>
           </a:p>
         </p:txBody>
       </p:sp>
-      <p:sp>
-        <p:nvSpPr>
-          <p:cNvPr id="3" name="Content Placeholder 2">
+      <p:pic>
+        <p:nvPicPr>
+          <p:cNvPr id="3" name="Picture 2">
             <a:extLst>
               <a:ext uri="{FF2B5EF4-FFF2-40B4-BE49-F238E27FC236}">
-                <a16:creationId xmlns:a16="http://schemas.microsoft.com/office/drawing/2014/main" id="{7844B503-C44F-453E-9465-D42E4557DE0C}"/>
+                <a16:creationId xmlns:a16="http://schemas.microsoft.com/office/drawing/2014/main" id="{9F7D6075-1C5C-4836-A0E8-6EFEAFDCF7CB}"/>
               </a:ext>
             </a:extLst>
           </p:cNvPr>
-          <p:cNvSpPr>
-            <a:spLocks noGrp="1"/>
-          </p:cNvSpPr>
-          <p:nvPr>
-            <p:ph idx="1"/>
-          </p:nvPr>
-        </p:nvSpPr>
+          <p:cNvPicPr>
+            <a:picLocks noChangeAspect="1"/>
+          </p:cNvPicPr>
+          <p:nvPr/>
+        </p:nvPicPr>
+        <p:blipFill>
+          <a:blip r:embed="rId2"/>
+          <a:stretch>
+            <a:fillRect/>
+          </a:stretch>
+        </p:blipFill>
         <p:spPr>
           <a:xfrm>
-            <a:off x="838200" y="1825625"/>
-            <a:ext cx="5069440" cy="4351338"/>
-          </a:xfrm>
-        </p:spPr>
-        <p:txBody>
-          <a:bodyPr>
-            <a:normAutofit/>
-          </a:bodyPr>
-          <a:lstStyle/>
-          <a:p>
-            <a:pPr marL="0" indent="0">
-              <a:buNone/>
-            </a:pPr>
-            <a:r>
-              <a:rPr lang="nl-NL" sz="2000" dirty="0"/>
-              <a:t>Veel </a:t>
-            </a:r>
-            <a:r>
-              <a:rPr lang="nl-NL" sz="2000" dirty="0" err="1"/>
-              <a:t>API’s</a:t>
-            </a:r>
-            <a:r>
-              <a:rPr lang="nl-NL" sz="2000" dirty="0"/>
-              <a:t> en webapplicaties gebruiken JSON.</a:t>
-            </a:r>
-          </a:p>
-          <a:p>
-            <a:pPr marL="0" indent="0">
-              <a:buNone/>
-            </a:pPr>
-            <a:endParaRPr lang="nl-NL" sz="2000" dirty="0"/>
-          </a:p>
-          <a:p>
-            <a:pPr marL="0" indent="0">
-              <a:buNone/>
-            </a:pPr>
-            <a:r>
-              <a:rPr lang="nl-NL" sz="2000" dirty="0"/>
-              <a:t>Dit is een documentformaat waarin zowel data als relaties opgeslagen zitten.</a:t>
-            </a:r>
-          </a:p>
-          <a:p>
-            <a:pPr marL="0" indent="0">
-              <a:buNone/>
-            </a:pPr>
-            <a:endParaRPr lang="nl-NL" sz="2000" dirty="0"/>
-          </a:p>
-          <a:p>
-            <a:pPr marL="0" indent="0">
-              <a:buNone/>
-            </a:pPr>
-            <a:r>
-              <a:rPr lang="nl-NL" sz="2000" dirty="0"/>
-              <a:t>Als je deze data in een RDBMS wilt opslaan, moet je de JSON normaliseren.</a:t>
-            </a:r>
-          </a:p>
-          <a:p>
-            <a:pPr marL="0" indent="0">
-              <a:buNone/>
-            </a:pPr>
-            <a:endParaRPr lang="nl-NL" sz="2000" dirty="0"/>
-          </a:p>
-          <a:p>
-            <a:pPr marL="0" indent="0">
-              <a:buNone/>
-            </a:pPr>
-            <a:r>
-              <a:rPr lang="nl-NL" sz="2000" dirty="0"/>
-              <a:t>Welke entiteiten en relaties zie jij in het JSON object hiernaast?</a:t>
-            </a:r>
-          </a:p>
-          <a:p>
-            <a:pPr marL="457200" indent="-457200">
-              <a:buAutoNum type="arabicPeriod"/>
-            </a:pPr>
-            <a:endParaRPr lang="nl-NL" sz="2000" dirty="0"/>
-          </a:p>
-        </p:txBody>
-      </p:sp>
-      <p:sp>
-        <p:nvSpPr>
-          <p:cNvPr id="5" name="TextBox 4">
-            <a:extLst>
-              <a:ext uri="{FF2B5EF4-FFF2-40B4-BE49-F238E27FC236}">
-                <a16:creationId xmlns:a16="http://schemas.microsoft.com/office/drawing/2014/main" id="{F96547F5-B7F4-4E32-9C8B-E5AFC9D5B180}"/>
-              </a:ext>
-            </a:extLst>
-          </p:cNvPr>
-          <p:cNvSpPr txBox="1"/>
-          <p:nvPr/>
-        </p:nvSpPr>
-        <p:spPr>
-          <a:xfrm>
-            <a:off x="6627044" y="346252"/>
-            <a:ext cx="5198512" cy="6340197"/>
+            <a:off x="1801402" y="1407167"/>
+            <a:ext cx="8589196" cy="5085708"/>
           </a:xfrm>
           <a:prstGeom prst="rect">
             <a:avLst/>
           </a:prstGeom>
-          <a:noFill/>
         </p:spPr>
-        <p:txBody>
-          <a:bodyPr wrap="square" rtlCol="0">
-            <a:spAutoFit/>
-          </a:bodyPr>
-          <a:lstStyle/>
-          <a:p>
-            <a:r>
-              <a:rPr lang="en-US" sz="1400" dirty="0">
-                <a:latin typeface="Courier New" panose="02070309020205020404" pitchFamily="49" charset="0"/>
-                <a:cs typeface="Courier New" panose="02070309020205020404" pitchFamily="49" charset="0"/>
-              </a:rPr>
-              <a:t>{</a:t>
-            </a:r>
-          </a:p>
-          <a:p>
-            <a:r>
-              <a:rPr lang="en-US" sz="1400" dirty="0">
-                <a:latin typeface="Courier New" panose="02070309020205020404" pitchFamily="49" charset="0"/>
-                <a:cs typeface="Courier New" panose="02070309020205020404" pitchFamily="49" charset="0"/>
-              </a:rPr>
-              <a:t>    "</a:t>
-            </a:r>
-            <a:r>
-              <a:rPr lang="en-US" sz="1400" dirty="0" err="1">
-                <a:latin typeface="Courier New" panose="02070309020205020404" pitchFamily="49" charset="0"/>
-                <a:cs typeface="Courier New" panose="02070309020205020404" pitchFamily="49" charset="0"/>
-              </a:rPr>
-              <a:t>klant</a:t>
-            </a:r>
-            <a:r>
-              <a:rPr lang="en-US" sz="1400" dirty="0">
-                <a:latin typeface="Courier New" panose="02070309020205020404" pitchFamily="49" charset="0"/>
-                <a:cs typeface="Courier New" panose="02070309020205020404" pitchFamily="49" charset="0"/>
-              </a:rPr>
-              <a:t>": {</a:t>
-            </a:r>
-          </a:p>
-          <a:p>
-            <a:r>
-              <a:rPr lang="en-US" sz="1400" dirty="0">
-                <a:latin typeface="Courier New" panose="02070309020205020404" pitchFamily="49" charset="0"/>
-                <a:cs typeface="Courier New" panose="02070309020205020404" pitchFamily="49" charset="0"/>
-              </a:rPr>
-              <a:t>        "</a:t>
-            </a:r>
-            <a:r>
-              <a:rPr lang="en-US" sz="1400" dirty="0" err="1">
-                <a:latin typeface="Courier New" panose="02070309020205020404" pitchFamily="49" charset="0"/>
-                <a:cs typeface="Courier New" panose="02070309020205020404" pitchFamily="49" charset="0"/>
-              </a:rPr>
-              <a:t>aanhef</a:t>
-            </a:r>
-            <a:r>
-              <a:rPr lang="en-US" sz="1400" dirty="0">
-                <a:latin typeface="Courier New" panose="02070309020205020404" pitchFamily="49" charset="0"/>
-                <a:cs typeface="Courier New" panose="02070309020205020404" pitchFamily="49" charset="0"/>
-              </a:rPr>
-              <a:t>": "</a:t>
-            </a:r>
-            <a:r>
-              <a:rPr lang="en-US" sz="1400" dirty="0" err="1">
-                <a:latin typeface="Courier New" panose="02070309020205020404" pitchFamily="49" charset="0"/>
-                <a:cs typeface="Courier New" panose="02070309020205020404" pitchFamily="49" charset="0"/>
-              </a:rPr>
-              <a:t>Dhr</a:t>
-            </a:r>
-            <a:r>
-              <a:rPr lang="en-US" sz="1400" dirty="0">
-                <a:latin typeface="Courier New" panose="02070309020205020404" pitchFamily="49" charset="0"/>
-                <a:cs typeface="Courier New" panose="02070309020205020404" pitchFamily="49" charset="0"/>
-              </a:rPr>
-              <a:t>.",</a:t>
-            </a:r>
-          </a:p>
-          <a:p>
-            <a:r>
-              <a:rPr lang="en-US" sz="1400" dirty="0">
-                <a:latin typeface="Courier New" panose="02070309020205020404" pitchFamily="49" charset="0"/>
-                <a:cs typeface="Courier New" panose="02070309020205020404" pitchFamily="49" charset="0"/>
-              </a:rPr>
-              <a:t>        "naam": "</a:t>
-            </a:r>
-            <a:r>
-              <a:rPr lang="en-US" sz="1400" dirty="0" err="1">
-                <a:latin typeface="Courier New" panose="02070309020205020404" pitchFamily="49" charset="0"/>
-                <a:cs typeface="Courier New" panose="02070309020205020404" pitchFamily="49" charset="0"/>
-              </a:rPr>
-              <a:t>Klaas</a:t>
-            </a:r>
-            <a:r>
-              <a:rPr lang="en-US" sz="1400" dirty="0">
-                <a:latin typeface="Courier New" panose="02070309020205020404" pitchFamily="49" charset="0"/>
-                <a:cs typeface="Courier New" panose="02070309020205020404" pitchFamily="49" charset="0"/>
-              </a:rPr>
-              <a:t>",</a:t>
-            </a:r>
-          </a:p>
-          <a:p>
-            <a:r>
-              <a:rPr lang="en-US" sz="1400" dirty="0">
-                <a:latin typeface="Courier New" panose="02070309020205020404" pitchFamily="49" charset="0"/>
-                <a:cs typeface="Courier New" panose="02070309020205020404" pitchFamily="49" charset="0"/>
-              </a:rPr>
-              <a:t>        “</a:t>
-            </a:r>
-            <a:r>
-              <a:rPr lang="en-US" sz="1400" dirty="0" err="1">
-                <a:latin typeface="Courier New" panose="02070309020205020404" pitchFamily="49" charset="0"/>
-                <a:cs typeface="Courier New" panose="02070309020205020404" pitchFamily="49" charset="0"/>
-              </a:rPr>
-              <a:t>achternaam</a:t>
-            </a:r>
-            <a:r>
-              <a:rPr lang="en-US" sz="1400" dirty="0">
-                <a:latin typeface="Courier New" panose="02070309020205020404" pitchFamily="49" charset="0"/>
-                <a:cs typeface="Courier New" panose="02070309020205020404" pitchFamily="49" charset="0"/>
-              </a:rPr>
-              <a:t>": "De Vries"</a:t>
-            </a:r>
-          </a:p>
-          <a:p>
-            <a:r>
-              <a:rPr lang="en-US" sz="1400" dirty="0">
-                <a:latin typeface="Courier New" panose="02070309020205020404" pitchFamily="49" charset="0"/>
-                <a:cs typeface="Courier New" panose="02070309020205020404" pitchFamily="49" charset="0"/>
-              </a:rPr>
-              <a:t>    },</a:t>
-            </a:r>
-          </a:p>
-          <a:p>
-            <a:r>
-              <a:rPr lang="en-US" sz="1400" dirty="0">
-                <a:latin typeface="Courier New" panose="02070309020205020404" pitchFamily="49" charset="0"/>
-                <a:cs typeface="Courier New" panose="02070309020205020404" pitchFamily="49" charset="0"/>
-              </a:rPr>
-              <a:t>    "</a:t>
-            </a:r>
-            <a:r>
-              <a:rPr lang="en-US" sz="1400" dirty="0" err="1">
-                <a:latin typeface="Courier New" panose="02070309020205020404" pitchFamily="49" charset="0"/>
-                <a:cs typeface="Courier New" panose="02070309020205020404" pitchFamily="49" charset="0"/>
-              </a:rPr>
-              <a:t>bezorg_adres</a:t>
-            </a:r>
-            <a:r>
-              <a:rPr lang="en-US" sz="1400" dirty="0">
-                <a:latin typeface="Courier New" panose="02070309020205020404" pitchFamily="49" charset="0"/>
-                <a:cs typeface="Courier New" panose="02070309020205020404" pitchFamily="49" charset="0"/>
-              </a:rPr>
-              <a:t>": {</a:t>
-            </a:r>
-          </a:p>
-          <a:p>
-            <a:r>
-              <a:rPr lang="en-US" sz="1400" dirty="0">
-                <a:latin typeface="Courier New" panose="02070309020205020404" pitchFamily="49" charset="0"/>
-                <a:cs typeface="Courier New" panose="02070309020205020404" pitchFamily="49" charset="0"/>
-              </a:rPr>
-              <a:t>        "</a:t>
-            </a:r>
-            <a:r>
-              <a:rPr lang="en-US" sz="1400" dirty="0" err="1">
-                <a:latin typeface="Courier New" panose="02070309020205020404" pitchFamily="49" charset="0"/>
-                <a:cs typeface="Courier New" panose="02070309020205020404" pitchFamily="49" charset="0"/>
-              </a:rPr>
-              <a:t>straat</a:t>
-            </a:r>
-            <a:r>
-              <a:rPr lang="en-US" sz="1400" dirty="0">
-                <a:latin typeface="Courier New" panose="02070309020205020404" pitchFamily="49" charset="0"/>
-                <a:cs typeface="Courier New" panose="02070309020205020404" pitchFamily="49" charset="0"/>
-              </a:rPr>
-              <a:t>": "</a:t>
-            </a:r>
-            <a:r>
-              <a:rPr lang="en-US" sz="1400" dirty="0" err="1">
-                <a:latin typeface="Courier New" panose="02070309020205020404" pitchFamily="49" charset="0"/>
-                <a:cs typeface="Courier New" panose="02070309020205020404" pitchFamily="49" charset="0"/>
-              </a:rPr>
-              <a:t>Kleverlaan</a:t>
-            </a:r>
-            <a:r>
-              <a:rPr lang="en-US" sz="1400" dirty="0">
-                <a:latin typeface="Courier New" panose="02070309020205020404" pitchFamily="49" charset="0"/>
-                <a:cs typeface="Courier New" panose="02070309020205020404" pitchFamily="49" charset="0"/>
-              </a:rPr>
-              <a:t>",</a:t>
-            </a:r>
-          </a:p>
-          <a:p>
-            <a:r>
-              <a:rPr lang="en-US" sz="1400" dirty="0">
-                <a:latin typeface="Courier New" panose="02070309020205020404" pitchFamily="49" charset="0"/>
-                <a:cs typeface="Courier New" panose="02070309020205020404" pitchFamily="49" charset="0"/>
-              </a:rPr>
-              <a:t>        "</a:t>
-            </a:r>
-            <a:r>
-              <a:rPr lang="en-US" sz="1400" dirty="0" err="1">
-                <a:latin typeface="Courier New" panose="02070309020205020404" pitchFamily="49" charset="0"/>
-                <a:cs typeface="Courier New" panose="02070309020205020404" pitchFamily="49" charset="0"/>
-              </a:rPr>
-              <a:t>huisnummer</a:t>
-            </a:r>
-            <a:r>
-              <a:rPr lang="en-US" sz="1400" dirty="0">
-                <a:latin typeface="Courier New" panose="02070309020205020404" pitchFamily="49" charset="0"/>
-                <a:cs typeface="Courier New" panose="02070309020205020404" pitchFamily="49" charset="0"/>
-              </a:rPr>
-              <a:t>": 4,</a:t>
-            </a:r>
-          </a:p>
-          <a:p>
-            <a:r>
-              <a:rPr lang="en-US" sz="1400" dirty="0">
-                <a:latin typeface="Courier New" panose="02070309020205020404" pitchFamily="49" charset="0"/>
-                <a:cs typeface="Courier New" panose="02070309020205020404" pitchFamily="49" charset="0"/>
-              </a:rPr>
-              <a:t>        "postcode": "2022 HJ",</a:t>
-            </a:r>
-          </a:p>
-          <a:p>
-            <a:r>
-              <a:rPr lang="en-US" sz="1400" dirty="0">
-                <a:latin typeface="Courier New" panose="02070309020205020404" pitchFamily="49" charset="0"/>
-                <a:cs typeface="Courier New" panose="02070309020205020404" pitchFamily="49" charset="0"/>
-              </a:rPr>
-              <a:t>        "</a:t>
-            </a:r>
-            <a:r>
-              <a:rPr lang="en-US" sz="1400" dirty="0" err="1">
-                <a:latin typeface="Courier New" panose="02070309020205020404" pitchFamily="49" charset="0"/>
-                <a:cs typeface="Courier New" panose="02070309020205020404" pitchFamily="49" charset="0"/>
-              </a:rPr>
-              <a:t>stad</a:t>
-            </a:r>
-            <a:r>
-              <a:rPr lang="en-US" sz="1400" dirty="0">
-                <a:latin typeface="Courier New" panose="02070309020205020404" pitchFamily="49" charset="0"/>
-                <a:cs typeface="Courier New" panose="02070309020205020404" pitchFamily="49" charset="0"/>
-              </a:rPr>
-              <a:t>": "Haarlem",</a:t>
-            </a:r>
-          </a:p>
-          <a:p>
-            <a:r>
-              <a:rPr lang="en-US" sz="1400" dirty="0">
-                <a:latin typeface="Courier New" panose="02070309020205020404" pitchFamily="49" charset="0"/>
-                <a:cs typeface="Courier New" panose="02070309020205020404" pitchFamily="49" charset="0"/>
-              </a:rPr>
-              <a:t>        "land": "Nederland"</a:t>
-            </a:r>
-          </a:p>
-          <a:p>
-            <a:r>
-              <a:rPr lang="en-US" sz="1400" dirty="0">
-                <a:latin typeface="Courier New" panose="02070309020205020404" pitchFamily="49" charset="0"/>
-                <a:cs typeface="Courier New" panose="02070309020205020404" pitchFamily="49" charset="0"/>
-              </a:rPr>
-              <a:t>    },</a:t>
-            </a:r>
-          </a:p>
-          <a:p>
-            <a:r>
-              <a:rPr lang="en-US" sz="1400" dirty="0">
-                <a:latin typeface="Courier New" panose="02070309020205020404" pitchFamily="49" charset="0"/>
-                <a:cs typeface="Courier New" panose="02070309020205020404" pitchFamily="49" charset="0"/>
-              </a:rPr>
-              <a:t>    "</a:t>
-            </a:r>
-            <a:r>
-              <a:rPr lang="en-US" sz="1400" dirty="0" err="1">
-                <a:latin typeface="Courier New" panose="02070309020205020404" pitchFamily="49" charset="0"/>
-                <a:cs typeface="Courier New" panose="02070309020205020404" pitchFamily="49" charset="0"/>
-              </a:rPr>
-              <a:t>factuur_adres</a:t>
-            </a:r>
-            <a:r>
-              <a:rPr lang="en-US" sz="1400" dirty="0">
-                <a:latin typeface="Courier New" panose="02070309020205020404" pitchFamily="49" charset="0"/>
-                <a:cs typeface="Courier New" panose="02070309020205020404" pitchFamily="49" charset="0"/>
-              </a:rPr>
-              <a:t>": {},</a:t>
-            </a:r>
-          </a:p>
-          <a:p>
-            <a:r>
-              <a:rPr lang="en-US" sz="1400" dirty="0">
-                <a:latin typeface="Courier New" panose="02070309020205020404" pitchFamily="49" charset="0"/>
-                <a:cs typeface="Courier New" panose="02070309020205020404" pitchFamily="49" charset="0"/>
-              </a:rPr>
-              <a:t>    "</a:t>
-            </a:r>
-            <a:r>
-              <a:rPr lang="en-US" sz="1400" dirty="0" err="1">
-                <a:latin typeface="Courier New" panose="02070309020205020404" pitchFamily="49" charset="0"/>
-                <a:cs typeface="Courier New" panose="02070309020205020404" pitchFamily="49" charset="0"/>
-              </a:rPr>
-              <a:t>producten</a:t>
-            </a:r>
-            <a:r>
-              <a:rPr lang="en-US" sz="1400" dirty="0">
-                <a:latin typeface="Courier New" panose="02070309020205020404" pitchFamily="49" charset="0"/>
-                <a:cs typeface="Courier New" panose="02070309020205020404" pitchFamily="49" charset="0"/>
-              </a:rPr>
-              <a:t>": [</a:t>
-            </a:r>
-          </a:p>
-          <a:p>
-            <a:r>
-              <a:rPr lang="en-US" sz="1400" dirty="0">
-                <a:latin typeface="Courier New" panose="02070309020205020404" pitchFamily="49" charset="0"/>
-                <a:cs typeface="Courier New" panose="02070309020205020404" pitchFamily="49" charset="0"/>
-              </a:rPr>
-              <a:t>        {</a:t>
-            </a:r>
-          </a:p>
-          <a:p>
-            <a:r>
-              <a:rPr lang="en-US" sz="1400" dirty="0">
-                <a:latin typeface="Courier New" panose="02070309020205020404" pitchFamily="49" charset="0"/>
-                <a:cs typeface="Courier New" panose="02070309020205020404" pitchFamily="49" charset="0"/>
-              </a:rPr>
-              <a:t>            "id": 1884322,</a:t>
-            </a:r>
-          </a:p>
-          <a:p>
-            <a:r>
-              <a:rPr lang="en-US" sz="1400" dirty="0">
-                <a:latin typeface="Courier New" panose="02070309020205020404" pitchFamily="49" charset="0"/>
-                <a:cs typeface="Courier New" panose="02070309020205020404" pitchFamily="49" charset="0"/>
-              </a:rPr>
-              <a:t>            "</a:t>
-            </a:r>
-            <a:r>
-              <a:rPr lang="en-US" sz="1400" dirty="0" err="1">
-                <a:latin typeface="Courier New" panose="02070309020205020404" pitchFamily="49" charset="0"/>
-                <a:cs typeface="Courier New" panose="02070309020205020404" pitchFamily="49" charset="0"/>
-              </a:rPr>
-              <a:t>ean</a:t>
-            </a:r>
-            <a:r>
-              <a:rPr lang="en-US" sz="1400" dirty="0">
-                <a:latin typeface="Courier New" panose="02070309020205020404" pitchFamily="49" charset="0"/>
-                <a:cs typeface="Courier New" panose="02070309020205020404" pitchFamily="49" charset="0"/>
-              </a:rPr>
-              <a:t>": 880688934884,</a:t>
-            </a:r>
-          </a:p>
-          <a:p>
-            <a:r>
-              <a:rPr lang="en-US" sz="1400" dirty="0">
-                <a:latin typeface="Courier New" panose="02070309020205020404" pitchFamily="49" charset="0"/>
-                <a:cs typeface="Courier New" panose="02070309020205020404" pitchFamily="49" charset="0"/>
-              </a:rPr>
-              <a:t>            "naam": "Samsung 860 EVO SSD",</a:t>
-            </a:r>
-          </a:p>
-          <a:p>
-            <a:r>
-              <a:rPr lang="en-US" sz="1400" dirty="0">
-                <a:latin typeface="Courier New" panose="02070309020205020404" pitchFamily="49" charset="0"/>
-                <a:cs typeface="Courier New" panose="02070309020205020404" pitchFamily="49" charset="0"/>
-              </a:rPr>
-              <a:t>            "</a:t>
-            </a:r>
-            <a:r>
-              <a:rPr lang="en-US" sz="1400" dirty="0" err="1">
-                <a:latin typeface="Courier New" panose="02070309020205020404" pitchFamily="49" charset="0"/>
-                <a:cs typeface="Courier New" panose="02070309020205020404" pitchFamily="49" charset="0"/>
-              </a:rPr>
-              <a:t>categorie</a:t>
-            </a:r>
-            <a:r>
-              <a:rPr lang="en-US" sz="1400" dirty="0">
-                <a:latin typeface="Courier New" panose="02070309020205020404" pitchFamily="49" charset="0"/>
-                <a:cs typeface="Courier New" panose="02070309020205020404" pitchFamily="49" charset="0"/>
-              </a:rPr>
-              <a:t>": "SSD Intern",</a:t>
-            </a:r>
-          </a:p>
-          <a:p>
-            <a:r>
-              <a:rPr lang="en-US" sz="1400" dirty="0">
-                <a:latin typeface="Courier New" panose="02070309020205020404" pitchFamily="49" charset="0"/>
-                <a:cs typeface="Courier New" panose="02070309020205020404" pitchFamily="49" charset="0"/>
-              </a:rPr>
-              <a:t>            "</a:t>
-            </a:r>
-            <a:r>
-              <a:rPr lang="en-US" sz="1400" dirty="0" err="1">
-                <a:latin typeface="Courier New" panose="02070309020205020404" pitchFamily="49" charset="0"/>
-                <a:cs typeface="Courier New" panose="02070309020205020404" pitchFamily="49" charset="0"/>
-              </a:rPr>
-              <a:t>prijs</a:t>
-            </a:r>
-            <a:r>
-              <a:rPr lang="en-US" sz="1400" dirty="0">
-                <a:latin typeface="Courier New" panose="02070309020205020404" pitchFamily="49" charset="0"/>
-                <a:cs typeface="Courier New" panose="02070309020205020404" pitchFamily="49" charset="0"/>
-              </a:rPr>
-              <a:t>": 95.50,</a:t>
-            </a:r>
-          </a:p>
-          <a:p>
-            <a:r>
-              <a:rPr lang="en-US" sz="1400" dirty="0">
-                <a:latin typeface="Courier New" panose="02070309020205020404" pitchFamily="49" charset="0"/>
-                <a:cs typeface="Courier New" panose="02070309020205020404" pitchFamily="49" charset="0"/>
-              </a:rPr>
-              <a:t>        }</a:t>
-            </a:r>
-          </a:p>
-          <a:p>
-            <a:r>
-              <a:rPr lang="en-US" sz="1400" dirty="0">
-                <a:latin typeface="Courier New" panose="02070309020205020404" pitchFamily="49" charset="0"/>
-                <a:cs typeface="Courier New" panose="02070309020205020404" pitchFamily="49" charset="0"/>
-              </a:rPr>
-              <a:t>    ],</a:t>
-            </a:r>
-          </a:p>
-          <a:p>
-            <a:r>
-              <a:rPr lang="en-US" sz="1400" dirty="0">
-                <a:latin typeface="Courier New" panose="02070309020205020404" pitchFamily="49" charset="0"/>
-                <a:cs typeface="Courier New" panose="02070309020205020404" pitchFamily="49" charset="0"/>
-              </a:rPr>
-              <a:t>    "</a:t>
-            </a:r>
-            <a:r>
-              <a:rPr lang="en-US" sz="1400" dirty="0" err="1">
-                <a:latin typeface="Courier New" panose="02070309020205020404" pitchFamily="49" charset="0"/>
-                <a:cs typeface="Courier New" panose="02070309020205020404" pitchFamily="49" charset="0"/>
-              </a:rPr>
-              <a:t>betaling</a:t>
-            </a:r>
-            <a:r>
-              <a:rPr lang="en-US" sz="1400" dirty="0">
-                <a:latin typeface="Courier New" panose="02070309020205020404" pitchFamily="49" charset="0"/>
-                <a:cs typeface="Courier New" panose="02070309020205020404" pitchFamily="49" charset="0"/>
-              </a:rPr>
-              <a:t>": {</a:t>
-            </a:r>
-          </a:p>
-          <a:p>
-            <a:r>
-              <a:rPr lang="en-US" sz="1400" dirty="0">
-                <a:latin typeface="Courier New" panose="02070309020205020404" pitchFamily="49" charset="0"/>
-                <a:cs typeface="Courier New" panose="02070309020205020404" pitchFamily="49" charset="0"/>
-              </a:rPr>
-              <a:t>        "</a:t>
-            </a:r>
-            <a:r>
-              <a:rPr lang="en-US" sz="1400" dirty="0" err="1">
-                <a:latin typeface="Courier New" panose="02070309020205020404" pitchFamily="49" charset="0"/>
-                <a:cs typeface="Courier New" panose="02070309020205020404" pitchFamily="49" charset="0"/>
-              </a:rPr>
-              <a:t>methode</a:t>
-            </a:r>
-            <a:r>
-              <a:rPr lang="en-US" sz="1400" dirty="0">
-                <a:latin typeface="Courier New" panose="02070309020205020404" pitchFamily="49" charset="0"/>
-                <a:cs typeface="Courier New" panose="02070309020205020404" pitchFamily="49" charset="0"/>
-              </a:rPr>
-              <a:t>": "PayPal",</a:t>
-            </a:r>
-          </a:p>
-          <a:p>
-            <a:r>
-              <a:rPr lang="en-US" sz="1400" dirty="0">
-                <a:latin typeface="Courier New" panose="02070309020205020404" pitchFamily="49" charset="0"/>
-                <a:cs typeface="Courier New" panose="02070309020205020404" pitchFamily="49" charset="0"/>
-              </a:rPr>
-              <a:t>        "</a:t>
-            </a:r>
-            <a:r>
-              <a:rPr lang="en-US" sz="1400" dirty="0" err="1">
-                <a:latin typeface="Courier New" panose="02070309020205020404" pitchFamily="49" charset="0"/>
-                <a:cs typeface="Courier New" panose="02070309020205020404" pitchFamily="49" charset="0"/>
-              </a:rPr>
-              <a:t>voldaan</a:t>
-            </a:r>
-            <a:r>
-              <a:rPr lang="en-US" sz="1400" dirty="0">
-                <a:latin typeface="Courier New" panose="02070309020205020404" pitchFamily="49" charset="0"/>
-                <a:cs typeface="Courier New" panose="02070309020205020404" pitchFamily="49" charset="0"/>
-              </a:rPr>
-              <a:t>": true</a:t>
-            </a:r>
-          </a:p>
-          <a:p>
-            <a:r>
-              <a:rPr lang="en-US" sz="1400" dirty="0">
-                <a:latin typeface="Courier New" panose="02070309020205020404" pitchFamily="49" charset="0"/>
-                <a:cs typeface="Courier New" panose="02070309020205020404" pitchFamily="49" charset="0"/>
-              </a:rPr>
-              <a:t>    },</a:t>
-            </a:r>
-          </a:p>
-          <a:p>
-            <a:r>
-              <a:rPr lang="en-US" sz="1400" dirty="0">
-                <a:latin typeface="Courier New" panose="02070309020205020404" pitchFamily="49" charset="0"/>
-                <a:cs typeface="Courier New" panose="02070309020205020404" pitchFamily="49" charset="0"/>
-              </a:rPr>
-              <a:t>}</a:t>
-            </a:r>
-            <a:endParaRPr lang="en-NL" sz="1400" dirty="0">
-              <a:latin typeface="Courier New" panose="02070309020205020404" pitchFamily="49" charset="0"/>
-              <a:cs typeface="Courier New" panose="02070309020205020404" pitchFamily="49" charset="0"/>
-            </a:endParaRPr>
-          </a:p>
-        </p:txBody>
-      </p:sp>
+      </p:pic>
     </p:spTree>
     <p:extLst>
       <p:ext uri="{BB962C8B-B14F-4D97-AF65-F5344CB8AC3E}">
-        <p14:creationId xmlns:p14="http://schemas.microsoft.com/office/powerpoint/2010/main" val="2674116955"/>
+        <p14:creationId xmlns:p14="http://schemas.microsoft.com/office/powerpoint/2010/main" val="1728007162"/>
       </p:ext>
     </p:extLst>
   </p:cSld>
@@ -11150,7 +10610,15 @@
             </a:r>
             <a:r>
               <a:rPr lang="nl-NL" sz="2000" dirty="0"/>
-              <a:t> Diagram (ERD).</a:t>
+              <a:t> </a:t>
+            </a:r>
+            <a:r>
+              <a:rPr lang="nl-NL" sz="2000"/>
+              <a:t>Diagrams </a:t>
+            </a:r>
+            <a:r>
+              <a:rPr lang="nl-NL" sz="2000" dirty="0"/>
+              <a:t>(ERD).</a:t>
             </a:r>
           </a:p>
           <a:p>
@@ -11278,6 +10746,700 @@
         </p:spPr>
         <p:txBody>
           <a:bodyPr>
+            <a:normAutofit/>
+          </a:bodyPr>
+          <a:lstStyle/>
+          <a:p>
+            <a:pPr marL="0" indent="0">
+              <a:buNone/>
+            </a:pPr>
+            <a:r>
+              <a:rPr lang="nl-NL" sz="2000" dirty="0"/>
+              <a:t>Veel </a:t>
+            </a:r>
+            <a:r>
+              <a:rPr lang="nl-NL" sz="2000" dirty="0" err="1"/>
+              <a:t>API’s</a:t>
+            </a:r>
+            <a:r>
+              <a:rPr lang="nl-NL" sz="2000" dirty="0"/>
+              <a:t> en webapplicaties gebruiken JSON.</a:t>
+            </a:r>
+          </a:p>
+          <a:p>
+            <a:pPr marL="0" indent="0">
+              <a:buNone/>
+            </a:pPr>
+            <a:endParaRPr lang="nl-NL" sz="2000" dirty="0"/>
+          </a:p>
+          <a:p>
+            <a:pPr marL="0" indent="0">
+              <a:buNone/>
+            </a:pPr>
+            <a:r>
+              <a:rPr lang="nl-NL" sz="2000" dirty="0"/>
+              <a:t>Dit is een documentformaat waarin zowel data als relaties opgeslagen zitten.</a:t>
+            </a:r>
+          </a:p>
+          <a:p>
+            <a:pPr marL="0" indent="0">
+              <a:buNone/>
+            </a:pPr>
+            <a:endParaRPr lang="nl-NL" sz="2000" dirty="0"/>
+          </a:p>
+          <a:p>
+            <a:pPr marL="0" indent="0">
+              <a:buNone/>
+            </a:pPr>
+            <a:r>
+              <a:rPr lang="nl-NL" sz="2000" dirty="0"/>
+              <a:t>Als je deze data in een RDBMS wilt opslaan, moet je de JSON normaliseren.</a:t>
+            </a:r>
+          </a:p>
+          <a:p>
+            <a:pPr marL="0" indent="0">
+              <a:buNone/>
+            </a:pPr>
+            <a:endParaRPr lang="nl-NL" sz="2000" dirty="0"/>
+          </a:p>
+          <a:p>
+            <a:pPr marL="0" indent="0">
+              <a:buNone/>
+            </a:pPr>
+            <a:r>
+              <a:rPr lang="nl-NL" sz="2000" dirty="0"/>
+              <a:t>Welke entiteiten en relaties zie jij in het JSON object hiernaast?</a:t>
+            </a:r>
+          </a:p>
+          <a:p>
+            <a:pPr marL="457200" indent="-457200">
+              <a:buAutoNum type="arabicPeriod"/>
+            </a:pPr>
+            <a:endParaRPr lang="nl-NL" sz="2000" dirty="0"/>
+          </a:p>
+        </p:txBody>
+      </p:sp>
+      <p:sp>
+        <p:nvSpPr>
+          <p:cNvPr id="5" name="TextBox 4">
+            <a:extLst>
+              <a:ext uri="{FF2B5EF4-FFF2-40B4-BE49-F238E27FC236}">
+                <a16:creationId xmlns:a16="http://schemas.microsoft.com/office/drawing/2014/main" id="{F96547F5-B7F4-4E32-9C8B-E5AFC9D5B180}"/>
+              </a:ext>
+            </a:extLst>
+          </p:cNvPr>
+          <p:cNvSpPr txBox="1"/>
+          <p:nvPr/>
+        </p:nvSpPr>
+        <p:spPr>
+          <a:xfrm>
+            <a:off x="6627044" y="346252"/>
+            <a:ext cx="5198512" cy="6340197"/>
+          </a:xfrm>
+          <a:prstGeom prst="rect">
+            <a:avLst/>
+          </a:prstGeom>
+          <a:noFill/>
+        </p:spPr>
+        <p:txBody>
+          <a:bodyPr wrap="square" rtlCol="0">
+            <a:spAutoFit/>
+          </a:bodyPr>
+          <a:lstStyle/>
+          <a:p>
+            <a:r>
+              <a:rPr lang="en-US" sz="1400" dirty="0">
+                <a:latin typeface="Courier New" panose="02070309020205020404" pitchFamily="49" charset="0"/>
+                <a:cs typeface="Courier New" panose="02070309020205020404" pitchFamily="49" charset="0"/>
+              </a:rPr>
+              <a:t>{</a:t>
+            </a:r>
+          </a:p>
+          <a:p>
+            <a:r>
+              <a:rPr lang="en-US" sz="1400" dirty="0">
+                <a:latin typeface="Courier New" panose="02070309020205020404" pitchFamily="49" charset="0"/>
+                <a:cs typeface="Courier New" panose="02070309020205020404" pitchFamily="49" charset="0"/>
+              </a:rPr>
+              <a:t>    "</a:t>
+            </a:r>
+            <a:r>
+              <a:rPr lang="en-US" sz="1400" dirty="0" err="1">
+                <a:latin typeface="Courier New" panose="02070309020205020404" pitchFamily="49" charset="0"/>
+                <a:cs typeface="Courier New" panose="02070309020205020404" pitchFamily="49" charset="0"/>
+              </a:rPr>
+              <a:t>klant</a:t>
+            </a:r>
+            <a:r>
+              <a:rPr lang="en-US" sz="1400" dirty="0">
+                <a:latin typeface="Courier New" panose="02070309020205020404" pitchFamily="49" charset="0"/>
+                <a:cs typeface="Courier New" panose="02070309020205020404" pitchFamily="49" charset="0"/>
+              </a:rPr>
+              <a:t>": {</a:t>
+            </a:r>
+          </a:p>
+          <a:p>
+            <a:r>
+              <a:rPr lang="en-US" sz="1400" dirty="0">
+                <a:latin typeface="Courier New" panose="02070309020205020404" pitchFamily="49" charset="0"/>
+                <a:cs typeface="Courier New" panose="02070309020205020404" pitchFamily="49" charset="0"/>
+              </a:rPr>
+              <a:t>        "</a:t>
+            </a:r>
+            <a:r>
+              <a:rPr lang="en-US" sz="1400" dirty="0" err="1">
+                <a:latin typeface="Courier New" panose="02070309020205020404" pitchFamily="49" charset="0"/>
+                <a:cs typeface="Courier New" panose="02070309020205020404" pitchFamily="49" charset="0"/>
+              </a:rPr>
+              <a:t>aanhef</a:t>
+            </a:r>
+            <a:r>
+              <a:rPr lang="en-US" sz="1400" dirty="0">
+                <a:latin typeface="Courier New" panose="02070309020205020404" pitchFamily="49" charset="0"/>
+                <a:cs typeface="Courier New" panose="02070309020205020404" pitchFamily="49" charset="0"/>
+              </a:rPr>
+              <a:t>": "</a:t>
+            </a:r>
+            <a:r>
+              <a:rPr lang="en-US" sz="1400" dirty="0" err="1">
+                <a:latin typeface="Courier New" panose="02070309020205020404" pitchFamily="49" charset="0"/>
+                <a:cs typeface="Courier New" panose="02070309020205020404" pitchFamily="49" charset="0"/>
+              </a:rPr>
+              <a:t>Dhr</a:t>
+            </a:r>
+            <a:r>
+              <a:rPr lang="en-US" sz="1400" dirty="0">
+                <a:latin typeface="Courier New" panose="02070309020205020404" pitchFamily="49" charset="0"/>
+                <a:cs typeface="Courier New" panose="02070309020205020404" pitchFamily="49" charset="0"/>
+              </a:rPr>
+              <a:t>.",</a:t>
+            </a:r>
+          </a:p>
+          <a:p>
+            <a:r>
+              <a:rPr lang="en-US" sz="1400" dirty="0">
+                <a:latin typeface="Courier New" panose="02070309020205020404" pitchFamily="49" charset="0"/>
+                <a:cs typeface="Courier New" panose="02070309020205020404" pitchFamily="49" charset="0"/>
+              </a:rPr>
+              <a:t>        "naam": "</a:t>
+            </a:r>
+            <a:r>
+              <a:rPr lang="en-US" sz="1400" dirty="0" err="1">
+                <a:latin typeface="Courier New" panose="02070309020205020404" pitchFamily="49" charset="0"/>
+                <a:cs typeface="Courier New" panose="02070309020205020404" pitchFamily="49" charset="0"/>
+              </a:rPr>
+              <a:t>Klaas</a:t>
+            </a:r>
+            <a:r>
+              <a:rPr lang="en-US" sz="1400" dirty="0">
+                <a:latin typeface="Courier New" panose="02070309020205020404" pitchFamily="49" charset="0"/>
+                <a:cs typeface="Courier New" panose="02070309020205020404" pitchFamily="49" charset="0"/>
+              </a:rPr>
+              <a:t>",</a:t>
+            </a:r>
+          </a:p>
+          <a:p>
+            <a:r>
+              <a:rPr lang="en-US" sz="1400" dirty="0">
+                <a:latin typeface="Courier New" panose="02070309020205020404" pitchFamily="49" charset="0"/>
+                <a:cs typeface="Courier New" panose="02070309020205020404" pitchFamily="49" charset="0"/>
+              </a:rPr>
+              <a:t>        “</a:t>
+            </a:r>
+            <a:r>
+              <a:rPr lang="en-US" sz="1400" dirty="0" err="1">
+                <a:latin typeface="Courier New" panose="02070309020205020404" pitchFamily="49" charset="0"/>
+                <a:cs typeface="Courier New" panose="02070309020205020404" pitchFamily="49" charset="0"/>
+              </a:rPr>
+              <a:t>achternaam</a:t>
+            </a:r>
+            <a:r>
+              <a:rPr lang="en-US" sz="1400" dirty="0">
+                <a:latin typeface="Courier New" panose="02070309020205020404" pitchFamily="49" charset="0"/>
+                <a:cs typeface="Courier New" panose="02070309020205020404" pitchFamily="49" charset="0"/>
+              </a:rPr>
+              <a:t>": "De Vries"</a:t>
+            </a:r>
+          </a:p>
+          <a:p>
+            <a:r>
+              <a:rPr lang="en-US" sz="1400" dirty="0">
+                <a:latin typeface="Courier New" panose="02070309020205020404" pitchFamily="49" charset="0"/>
+                <a:cs typeface="Courier New" panose="02070309020205020404" pitchFamily="49" charset="0"/>
+              </a:rPr>
+              <a:t>    },</a:t>
+            </a:r>
+          </a:p>
+          <a:p>
+            <a:r>
+              <a:rPr lang="en-US" sz="1400" dirty="0">
+                <a:latin typeface="Courier New" panose="02070309020205020404" pitchFamily="49" charset="0"/>
+                <a:cs typeface="Courier New" panose="02070309020205020404" pitchFamily="49" charset="0"/>
+              </a:rPr>
+              <a:t>    "</a:t>
+            </a:r>
+            <a:r>
+              <a:rPr lang="en-US" sz="1400" dirty="0" err="1">
+                <a:latin typeface="Courier New" panose="02070309020205020404" pitchFamily="49" charset="0"/>
+                <a:cs typeface="Courier New" panose="02070309020205020404" pitchFamily="49" charset="0"/>
+              </a:rPr>
+              <a:t>bezorg_adres</a:t>
+            </a:r>
+            <a:r>
+              <a:rPr lang="en-US" sz="1400" dirty="0">
+                <a:latin typeface="Courier New" panose="02070309020205020404" pitchFamily="49" charset="0"/>
+                <a:cs typeface="Courier New" panose="02070309020205020404" pitchFamily="49" charset="0"/>
+              </a:rPr>
+              <a:t>": {</a:t>
+            </a:r>
+          </a:p>
+          <a:p>
+            <a:r>
+              <a:rPr lang="en-US" sz="1400" dirty="0">
+                <a:latin typeface="Courier New" panose="02070309020205020404" pitchFamily="49" charset="0"/>
+                <a:cs typeface="Courier New" panose="02070309020205020404" pitchFamily="49" charset="0"/>
+              </a:rPr>
+              <a:t>        "</a:t>
+            </a:r>
+            <a:r>
+              <a:rPr lang="en-US" sz="1400" dirty="0" err="1">
+                <a:latin typeface="Courier New" panose="02070309020205020404" pitchFamily="49" charset="0"/>
+                <a:cs typeface="Courier New" panose="02070309020205020404" pitchFamily="49" charset="0"/>
+              </a:rPr>
+              <a:t>straat</a:t>
+            </a:r>
+            <a:r>
+              <a:rPr lang="en-US" sz="1400" dirty="0">
+                <a:latin typeface="Courier New" panose="02070309020205020404" pitchFamily="49" charset="0"/>
+                <a:cs typeface="Courier New" panose="02070309020205020404" pitchFamily="49" charset="0"/>
+              </a:rPr>
+              <a:t>": "</a:t>
+            </a:r>
+            <a:r>
+              <a:rPr lang="en-US" sz="1400" dirty="0" err="1">
+                <a:latin typeface="Courier New" panose="02070309020205020404" pitchFamily="49" charset="0"/>
+                <a:cs typeface="Courier New" panose="02070309020205020404" pitchFamily="49" charset="0"/>
+              </a:rPr>
+              <a:t>Kleverlaan</a:t>
+            </a:r>
+            <a:r>
+              <a:rPr lang="en-US" sz="1400" dirty="0">
+                <a:latin typeface="Courier New" panose="02070309020205020404" pitchFamily="49" charset="0"/>
+                <a:cs typeface="Courier New" panose="02070309020205020404" pitchFamily="49" charset="0"/>
+              </a:rPr>
+              <a:t>",</a:t>
+            </a:r>
+          </a:p>
+          <a:p>
+            <a:r>
+              <a:rPr lang="en-US" sz="1400" dirty="0">
+                <a:latin typeface="Courier New" panose="02070309020205020404" pitchFamily="49" charset="0"/>
+                <a:cs typeface="Courier New" panose="02070309020205020404" pitchFamily="49" charset="0"/>
+              </a:rPr>
+              <a:t>        "</a:t>
+            </a:r>
+            <a:r>
+              <a:rPr lang="en-US" sz="1400" dirty="0" err="1">
+                <a:latin typeface="Courier New" panose="02070309020205020404" pitchFamily="49" charset="0"/>
+                <a:cs typeface="Courier New" panose="02070309020205020404" pitchFamily="49" charset="0"/>
+              </a:rPr>
+              <a:t>huisnummer</a:t>
+            </a:r>
+            <a:r>
+              <a:rPr lang="en-US" sz="1400" dirty="0">
+                <a:latin typeface="Courier New" panose="02070309020205020404" pitchFamily="49" charset="0"/>
+                <a:cs typeface="Courier New" panose="02070309020205020404" pitchFamily="49" charset="0"/>
+              </a:rPr>
+              <a:t>": 4,</a:t>
+            </a:r>
+          </a:p>
+          <a:p>
+            <a:r>
+              <a:rPr lang="en-US" sz="1400" dirty="0">
+                <a:latin typeface="Courier New" panose="02070309020205020404" pitchFamily="49" charset="0"/>
+                <a:cs typeface="Courier New" panose="02070309020205020404" pitchFamily="49" charset="0"/>
+              </a:rPr>
+              <a:t>        "postcode": "2022 HJ",</a:t>
+            </a:r>
+          </a:p>
+          <a:p>
+            <a:r>
+              <a:rPr lang="en-US" sz="1400" dirty="0">
+                <a:latin typeface="Courier New" panose="02070309020205020404" pitchFamily="49" charset="0"/>
+                <a:cs typeface="Courier New" panose="02070309020205020404" pitchFamily="49" charset="0"/>
+              </a:rPr>
+              <a:t>        "</a:t>
+            </a:r>
+            <a:r>
+              <a:rPr lang="en-US" sz="1400" dirty="0" err="1">
+                <a:latin typeface="Courier New" panose="02070309020205020404" pitchFamily="49" charset="0"/>
+                <a:cs typeface="Courier New" panose="02070309020205020404" pitchFamily="49" charset="0"/>
+              </a:rPr>
+              <a:t>stad</a:t>
+            </a:r>
+            <a:r>
+              <a:rPr lang="en-US" sz="1400" dirty="0">
+                <a:latin typeface="Courier New" panose="02070309020205020404" pitchFamily="49" charset="0"/>
+                <a:cs typeface="Courier New" panose="02070309020205020404" pitchFamily="49" charset="0"/>
+              </a:rPr>
+              <a:t>": "Haarlem",</a:t>
+            </a:r>
+          </a:p>
+          <a:p>
+            <a:r>
+              <a:rPr lang="en-US" sz="1400" dirty="0">
+                <a:latin typeface="Courier New" panose="02070309020205020404" pitchFamily="49" charset="0"/>
+                <a:cs typeface="Courier New" panose="02070309020205020404" pitchFamily="49" charset="0"/>
+              </a:rPr>
+              <a:t>        "land": "Nederland"</a:t>
+            </a:r>
+          </a:p>
+          <a:p>
+            <a:r>
+              <a:rPr lang="en-US" sz="1400" dirty="0">
+                <a:latin typeface="Courier New" panose="02070309020205020404" pitchFamily="49" charset="0"/>
+                <a:cs typeface="Courier New" panose="02070309020205020404" pitchFamily="49" charset="0"/>
+              </a:rPr>
+              <a:t>    },</a:t>
+            </a:r>
+          </a:p>
+          <a:p>
+            <a:r>
+              <a:rPr lang="en-US" sz="1400" dirty="0">
+                <a:latin typeface="Courier New" panose="02070309020205020404" pitchFamily="49" charset="0"/>
+                <a:cs typeface="Courier New" panose="02070309020205020404" pitchFamily="49" charset="0"/>
+              </a:rPr>
+              <a:t>    "</a:t>
+            </a:r>
+            <a:r>
+              <a:rPr lang="en-US" sz="1400" dirty="0" err="1">
+                <a:latin typeface="Courier New" panose="02070309020205020404" pitchFamily="49" charset="0"/>
+                <a:cs typeface="Courier New" panose="02070309020205020404" pitchFamily="49" charset="0"/>
+              </a:rPr>
+              <a:t>factuur_adres</a:t>
+            </a:r>
+            <a:r>
+              <a:rPr lang="en-US" sz="1400" dirty="0">
+                <a:latin typeface="Courier New" panose="02070309020205020404" pitchFamily="49" charset="0"/>
+                <a:cs typeface="Courier New" panose="02070309020205020404" pitchFamily="49" charset="0"/>
+              </a:rPr>
+              <a:t>": {},</a:t>
+            </a:r>
+          </a:p>
+          <a:p>
+            <a:r>
+              <a:rPr lang="en-US" sz="1400" dirty="0">
+                <a:latin typeface="Courier New" panose="02070309020205020404" pitchFamily="49" charset="0"/>
+                <a:cs typeface="Courier New" panose="02070309020205020404" pitchFamily="49" charset="0"/>
+              </a:rPr>
+              <a:t>    "</a:t>
+            </a:r>
+            <a:r>
+              <a:rPr lang="en-US" sz="1400" dirty="0" err="1">
+                <a:latin typeface="Courier New" panose="02070309020205020404" pitchFamily="49" charset="0"/>
+                <a:cs typeface="Courier New" panose="02070309020205020404" pitchFamily="49" charset="0"/>
+              </a:rPr>
+              <a:t>producten</a:t>
+            </a:r>
+            <a:r>
+              <a:rPr lang="en-US" sz="1400" dirty="0">
+                <a:latin typeface="Courier New" panose="02070309020205020404" pitchFamily="49" charset="0"/>
+                <a:cs typeface="Courier New" panose="02070309020205020404" pitchFamily="49" charset="0"/>
+              </a:rPr>
+              <a:t>": [</a:t>
+            </a:r>
+          </a:p>
+          <a:p>
+            <a:r>
+              <a:rPr lang="en-US" sz="1400" dirty="0">
+                <a:latin typeface="Courier New" panose="02070309020205020404" pitchFamily="49" charset="0"/>
+                <a:cs typeface="Courier New" panose="02070309020205020404" pitchFamily="49" charset="0"/>
+              </a:rPr>
+              <a:t>        {</a:t>
+            </a:r>
+          </a:p>
+          <a:p>
+            <a:r>
+              <a:rPr lang="en-US" sz="1400" dirty="0">
+                <a:latin typeface="Courier New" panose="02070309020205020404" pitchFamily="49" charset="0"/>
+                <a:cs typeface="Courier New" panose="02070309020205020404" pitchFamily="49" charset="0"/>
+              </a:rPr>
+              <a:t>            "id": 1884322,</a:t>
+            </a:r>
+          </a:p>
+          <a:p>
+            <a:r>
+              <a:rPr lang="en-US" sz="1400" dirty="0">
+                <a:latin typeface="Courier New" panose="02070309020205020404" pitchFamily="49" charset="0"/>
+                <a:cs typeface="Courier New" panose="02070309020205020404" pitchFamily="49" charset="0"/>
+              </a:rPr>
+              <a:t>            "</a:t>
+            </a:r>
+            <a:r>
+              <a:rPr lang="en-US" sz="1400" dirty="0" err="1">
+                <a:latin typeface="Courier New" panose="02070309020205020404" pitchFamily="49" charset="0"/>
+                <a:cs typeface="Courier New" panose="02070309020205020404" pitchFamily="49" charset="0"/>
+              </a:rPr>
+              <a:t>ean</a:t>
+            </a:r>
+            <a:r>
+              <a:rPr lang="en-US" sz="1400" dirty="0">
+                <a:latin typeface="Courier New" panose="02070309020205020404" pitchFamily="49" charset="0"/>
+                <a:cs typeface="Courier New" panose="02070309020205020404" pitchFamily="49" charset="0"/>
+              </a:rPr>
+              <a:t>": 880688934884,</a:t>
+            </a:r>
+          </a:p>
+          <a:p>
+            <a:r>
+              <a:rPr lang="en-US" sz="1400" dirty="0">
+                <a:latin typeface="Courier New" panose="02070309020205020404" pitchFamily="49" charset="0"/>
+                <a:cs typeface="Courier New" panose="02070309020205020404" pitchFamily="49" charset="0"/>
+              </a:rPr>
+              <a:t>            "naam": "Samsung 860 EVO SSD",</a:t>
+            </a:r>
+          </a:p>
+          <a:p>
+            <a:r>
+              <a:rPr lang="en-US" sz="1400" dirty="0">
+                <a:latin typeface="Courier New" panose="02070309020205020404" pitchFamily="49" charset="0"/>
+                <a:cs typeface="Courier New" panose="02070309020205020404" pitchFamily="49" charset="0"/>
+              </a:rPr>
+              <a:t>            "</a:t>
+            </a:r>
+            <a:r>
+              <a:rPr lang="en-US" sz="1400" dirty="0" err="1">
+                <a:latin typeface="Courier New" panose="02070309020205020404" pitchFamily="49" charset="0"/>
+                <a:cs typeface="Courier New" panose="02070309020205020404" pitchFamily="49" charset="0"/>
+              </a:rPr>
+              <a:t>categorie</a:t>
+            </a:r>
+            <a:r>
+              <a:rPr lang="en-US" sz="1400" dirty="0">
+                <a:latin typeface="Courier New" panose="02070309020205020404" pitchFamily="49" charset="0"/>
+                <a:cs typeface="Courier New" panose="02070309020205020404" pitchFamily="49" charset="0"/>
+              </a:rPr>
+              <a:t>": "SSD Intern",</a:t>
+            </a:r>
+          </a:p>
+          <a:p>
+            <a:r>
+              <a:rPr lang="en-US" sz="1400" dirty="0">
+                <a:latin typeface="Courier New" panose="02070309020205020404" pitchFamily="49" charset="0"/>
+                <a:cs typeface="Courier New" panose="02070309020205020404" pitchFamily="49" charset="0"/>
+              </a:rPr>
+              <a:t>            "</a:t>
+            </a:r>
+            <a:r>
+              <a:rPr lang="en-US" sz="1400" dirty="0" err="1">
+                <a:latin typeface="Courier New" panose="02070309020205020404" pitchFamily="49" charset="0"/>
+                <a:cs typeface="Courier New" panose="02070309020205020404" pitchFamily="49" charset="0"/>
+              </a:rPr>
+              <a:t>prijs</a:t>
+            </a:r>
+            <a:r>
+              <a:rPr lang="en-US" sz="1400" dirty="0">
+                <a:latin typeface="Courier New" panose="02070309020205020404" pitchFamily="49" charset="0"/>
+                <a:cs typeface="Courier New" panose="02070309020205020404" pitchFamily="49" charset="0"/>
+              </a:rPr>
+              <a:t>": 95.50,</a:t>
+            </a:r>
+          </a:p>
+          <a:p>
+            <a:r>
+              <a:rPr lang="en-US" sz="1400" dirty="0">
+                <a:latin typeface="Courier New" panose="02070309020205020404" pitchFamily="49" charset="0"/>
+                <a:cs typeface="Courier New" panose="02070309020205020404" pitchFamily="49" charset="0"/>
+              </a:rPr>
+              <a:t>        }</a:t>
+            </a:r>
+          </a:p>
+          <a:p>
+            <a:r>
+              <a:rPr lang="en-US" sz="1400" dirty="0">
+                <a:latin typeface="Courier New" panose="02070309020205020404" pitchFamily="49" charset="0"/>
+                <a:cs typeface="Courier New" panose="02070309020205020404" pitchFamily="49" charset="0"/>
+              </a:rPr>
+              <a:t>    ],</a:t>
+            </a:r>
+          </a:p>
+          <a:p>
+            <a:r>
+              <a:rPr lang="en-US" sz="1400" dirty="0">
+                <a:latin typeface="Courier New" panose="02070309020205020404" pitchFamily="49" charset="0"/>
+                <a:cs typeface="Courier New" panose="02070309020205020404" pitchFamily="49" charset="0"/>
+              </a:rPr>
+              <a:t>    "</a:t>
+            </a:r>
+            <a:r>
+              <a:rPr lang="en-US" sz="1400" dirty="0" err="1">
+                <a:latin typeface="Courier New" panose="02070309020205020404" pitchFamily="49" charset="0"/>
+                <a:cs typeface="Courier New" panose="02070309020205020404" pitchFamily="49" charset="0"/>
+              </a:rPr>
+              <a:t>betaling</a:t>
+            </a:r>
+            <a:r>
+              <a:rPr lang="en-US" sz="1400" dirty="0">
+                <a:latin typeface="Courier New" panose="02070309020205020404" pitchFamily="49" charset="0"/>
+                <a:cs typeface="Courier New" panose="02070309020205020404" pitchFamily="49" charset="0"/>
+              </a:rPr>
+              <a:t>": {</a:t>
+            </a:r>
+          </a:p>
+          <a:p>
+            <a:r>
+              <a:rPr lang="en-US" sz="1400" dirty="0">
+                <a:latin typeface="Courier New" panose="02070309020205020404" pitchFamily="49" charset="0"/>
+                <a:cs typeface="Courier New" panose="02070309020205020404" pitchFamily="49" charset="0"/>
+              </a:rPr>
+              <a:t>        "</a:t>
+            </a:r>
+            <a:r>
+              <a:rPr lang="en-US" sz="1400" dirty="0" err="1">
+                <a:latin typeface="Courier New" panose="02070309020205020404" pitchFamily="49" charset="0"/>
+                <a:cs typeface="Courier New" panose="02070309020205020404" pitchFamily="49" charset="0"/>
+              </a:rPr>
+              <a:t>methode</a:t>
+            </a:r>
+            <a:r>
+              <a:rPr lang="en-US" sz="1400" dirty="0">
+                <a:latin typeface="Courier New" panose="02070309020205020404" pitchFamily="49" charset="0"/>
+                <a:cs typeface="Courier New" panose="02070309020205020404" pitchFamily="49" charset="0"/>
+              </a:rPr>
+              <a:t>": "PayPal",</a:t>
+            </a:r>
+          </a:p>
+          <a:p>
+            <a:r>
+              <a:rPr lang="en-US" sz="1400" dirty="0">
+                <a:latin typeface="Courier New" panose="02070309020205020404" pitchFamily="49" charset="0"/>
+                <a:cs typeface="Courier New" panose="02070309020205020404" pitchFamily="49" charset="0"/>
+              </a:rPr>
+              <a:t>        "</a:t>
+            </a:r>
+            <a:r>
+              <a:rPr lang="en-US" sz="1400" dirty="0" err="1">
+                <a:latin typeface="Courier New" panose="02070309020205020404" pitchFamily="49" charset="0"/>
+                <a:cs typeface="Courier New" panose="02070309020205020404" pitchFamily="49" charset="0"/>
+              </a:rPr>
+              <a:t>voldaan</a:t>
+            </a:r>
+            <a:r>
+              <a:rPr lang="en-US" sz="1400" dirty="0">
+                <a:latin typeface="Courier New" panose="02070309020205020404" pitchFamily="49" charset="0"/>
+                <a:cs typeface="Courier New" panose="02070309020205020404" pitchFamily="49" charset="0"/>
+              </a:rPr>
+              <a:t>": true</a:t>
+            </a:r>
+          </a:p>
+          <a:p>
+            <a:r>
+              <a:rPr lang="en-US" sz="1400" dirty="0">
+                <a:latin typeface="Courier New" panose="02070309020205020404" pitchFamily="49" charset="0"/>
+                <a:cs typeface="Courier New" panose="02070309020205020404" pitchFamily="49" charset="0"/>
+              </a:rPr>
+              <a:t>    },</a:t>
+            </a:r>
+          </a:p>
+          <a:p>
+            <a:r>
+              <a:rPr lang="en-US" sz="1400" dirty="0">
+                <a:latin typeface="Courier New" panose="02070309020205020404" pitchFamily="49" charset="0"/>
+                <a:cs typeface="Courier New" panose="02070309020205020404" pitchFamily="49" charset="0"/>
+              </a:rPr>
+              <a:t>}</a:t>
+            </a:r>
+            <a:endParaRPr lang="en-NL" sz="1400" dirty="0">
+              <a:latin typeface="Courier New" panose="02070309020205020404" pitchFamily="49" charset="0"/>
+              <a:cs typeface="Courier New" panose="02070309020205020404" pitchFamily="49" charset="0"/>
+            </a:endParaRPr>
+          </a:p>
+        </p:txBody>
+      </p:sp>
+    </p:spTree>
+    <p:extLst>
+      <p:ext uri="{BB962C8B-B14F-4D97-AF65-F5344CB8AC3E}">
+        <p14:creationId xmlns:p14="http://schemas.microsoft.com/office/powerpoint/2010/main" val="2674116955"/>
+      </p:ext>
+    </p:extLst>
+  </p:cSld>
+  <p:clrMapOvr>
+    <a:masterClrMapping/>
+  </p:clrMapOvr>
+</p:sld>
+</file>
+
+<file path=ppt/slides/slide21.xml><?xml version="1.0" encoding="utf-8"?>
+<p:sld xmlns:a="http://schemas.openxmlformats.org/drawingml/2006/main" xmlns:r="http://schemas.openxmlformats.org/officeDocument/2006/relationships" xmlns:p="http://schemas.openxmlformats.org/presentationml/2006/main">
+  <p:cSld>
+    <p:spTree>
+      <p:nvGrpSpPr>
+        <p:cNvPr id="1" name=""/>
+        <p:cNvGrpSpPr/>
+        <p:nvPr/>
+      </p:nvGrpSpPr>
+      <p:grpSpPr>
+        <a:xfrm>
+          <a:off x="0" y="0"/>
+          <a:ext cx="0" cy="0"/>
+          <a:chOff x="0" y="0"/>
+          <a:chExt cx="0" cy="0"/>
+        </a:xfrm>
+      </p:grpSpPr>
+      <p:sp>
+        <p:nvSpPr>
+          <p:cNvPr id="2" name="Title 1">
+            <a:extLst>
+              <a:ext uri="{FF2B5EF4-FFF2-40B4-BE49-F238E27FC236}">
+                <a16:creationId xmlns:a16="http://schemas.microsoft.com/office/drawing/2014/main" id="{9BDFD261-0D2C-41B9-9E28-43DF575D40E0}"/>
+              </a:ext>
+            </a:extLst>
+          </p:cNvPr>
+          <p:cNvSpPr>
+            <a:spLocks noGrp="1"/>
+          </p:cNvSpPr>
+          <p:nvPr>
+            <p:ph type="title"/>
+          </p:nvPr>
+        </p:nvSpPr>
+        <p:spPr/>
+        <p:txBody>
+          <a:bodyPr>
+            <a:normAutofit/>
+          </a:bodyPr>
+          <a:lstStyle/>
+          <a:p>
+            <a:r>
+              <a:rPr lang="nl-NL" sz="3600" dirty="0"/>
+              <a:t>Oefeningen 4</a:t>
+            </a:r>
+          </a:p>
+        </p:txBody>
+      </p:sp>
+      <p:sp>
+        <p:nvSpPr>
+          <p:cNvPr id="3" name="Content Placeholder 2">
+            <a:extLst>
+              <a:ext uri="{FF2B5EF4-FFF2-40B4-BE49-F238E27FC236}">
+                <a16:creationId xmlns:a16="http://schemas.microsoft.com/office/drawing/2014/main" id="{7844B503-C44F-453E-9465-D42E4557DE0C}"/>
+              </a:ext>
+            </a:extLst>
+          </p:cNvPr>
+          <p:cNvSpPr>
+            <a:spLocks noGrp="1"/>
+          </p:cNvSpPr>
+          <p:nvPr>
+            <p:ph idx="1"/>
+          </p:nvPr>
+        </p:nvSpPr>
+        <p:spPr>
+          <a:xfrm>
+            <a:off x="838200" y="1825625"/>
+            <a:ext cx="5069440" cy="4351338"/>
+          </a:xfrm>
+        </p:spPr>
+        <p:txBody>
+          <a:bodyPr>
             <a:noAutofit/>
           </a:bodyPr>
           <a:lstStyle/>
@@ -11922,7 +12084,7 @@
 </p:sld>
 </file>
 
-<file path=ppt/slides/slide21.xml><?xml version="1.0" encoding="utf-8"?>
+<file path=ppt/slides/slide22.xml><?xml version="1.0" encoding="utf-8"?>
 <p:sld xmlns:a="http://schemas.openxmlformats.org/drawingml/2006/main" xmlns:r="http://schemas.openxmlformats.org/officeDocument/2006/relationships" xmlns:p="http://schemas.openxmlformats.org/presentationml/2006/main">
   <p:cSld>
     <p:spTree>
@@ -12007,7 +12169,7 @@
 </p:sld>
 </file>
 
-<file path=ppt/slides/slide22.xml><?xml version="1.0" encoding="utf-8"?>
+<file path=ppt/slides/slide23.xml><?xml version="1.0" encoding="utf-8"?>
 <p:sld xmlns:a="http://schemas.openxmlformats.org/drawingml/2006/main" xmlns:r="http://schemas.openxmlformats.org/officeDocument/2006/relationships" xmlns:p="http://schemas.openxmlformats.org/presentationml/2006/main">
   <p:cSld>
     <p:spTree>
@@ -12440,7 +12602,7 @@
 </p:sld>
 </file>
 
-<file path=ppt/slides/slide23.xml><?xml version="1.0" encoding="utf-8"?>
+<file path=ppt/slides/slide24.xml><?xml version="1.0" encoding="utf-8"?>
 <p:sld xmlns:a="http://schemas.openxmlformats.org/drawingml/2006/main" xmlns:r="http://schemas.openxmlformats.org/officeDocument/2006/relationships" xmlns:p="http://schemas.openxmlformats.org/presentationml/2006/main">
   <p:cSld>
     <p:spTree>
@@ -12698,7 +12860,7 @@
 </p:sld>
 </file>
 
-<file path=ppt/slides/slide24.xml><?xml version="1.0" encoding="utf-8"?>
+<file path=ppt/slides/slide25.xml><?xml version="1.0" encoding="utf-8"?>
 <p:sld xmlns:a="http://schemas.openxmlformats.org/drawingml/2006/main" xmlns:r="http://schemas.openxmlformats.org/officeDocument/2006/relationships" xmlns:p="http://schemas.openxmlformats.org/presentationml/2006/main">
   <p:cSld>
     <p:spTree>
@@ -13183,7 +13345,7 @@
 </p:sld>
 </file>
 
-<file path=ppt/slides/slide25.xml><?xml version="1.0" encoding="utf-8"?>
+<file path=ppt/slides/slide26.xml><?xml version="1.0" encoding="utf-8"?>
 <p:sld xmlns:a="http://schemas.openxmlformats.org/drawingml/2006/main" xmlns:r="http://schemas.openxmlformats.org/officeDocument/2006/relationships" xmlns:p="http://schemas.openxmlformats.org/presentationml/2006/main">
   <p:cSld>
     <p:spTree>
@@ -13609,7 +13771,7 @@
 </p:sld>
 </file>
 
-<file path=ppt/slides/slide26.xml><?xml version="1.0" encoding="utf-8"?>
+<file path=ppt/slides/slide27.xml><?xml version="1.0" encoding="utf-8"?>
 <p:sld xmlns:a="http://schemas.openxmlformats.org/drawingml/2006/main" xmlns:r="http://schemas.openxmlformats.org/officeDocument/2006/relationships" xmlns:p="http://schemas.openxmlformats.org/presentationml/2006/main">
   <p:cSld>
     <p:spTree>
@@ -14134,7 +14296,7 @@
 </p:sld>
 </file>
 
-<file path=ppt/slides/slide27.xml><?xml version="1.0" encoding="utf-8"?>
+<file path=ppt/slides/slide28.xml><?xml version="1.0" encoding="utf-8"?>
 <p:sld xmlns:a="http://schemas.openxmlformats.org/drawingml/2006/main" xmlns:r="http://schemas.openxmlformats.org/officeDocument/2006/relationships" xmlns:p="http://schemas.openxmlformats.org/presentationml/2006/main">
   <p:cSld>
     <p:spTree>
@@ -14634,7 +14796,7 @@
 </p:sld>
 </file>
 
-<file path=ppt/slides/slide28.xml><?xml version="1.0" encoding="utf-8"?>
+<file path=ppt/slides/slide29.xml><?xml version="1.0" encoding="utf-8"?>
 <p:sld xmlns:a="http://schemas.openxmlformats.org/drawingml/2006/main" xmlns:r="http://schemas.openxmlformats.org/officeDocument/2006/relationships" xmlns:p="http://schemas.openxmlformats.org/presentationml/2006/main">
   <p:cSld>
     <p:spTree>
@@ -15202,7 +15364,92 @@
 </p:sld>
 </file>
 
-<file path=ppt/slides/slide29.xml><?xml version="1.0" encoding="utf-8"?>
+<file path=ppt/slides/slide3.xml><?xml version="1.0" encoding="utf-8"?>
+<p:sld xmlns:a="http://schemas.openxmlformats.org/drawingml/2006/main" xmlns:r="http://schemas.openxmlformats.org/officeDocument/2006/relationships" xmlns:p="http://schemas.openxmlformats.org/presentationml/2006/main">
+  <p:cSld>
+    <p:spTree>
+      <p:nvGrpSpPr>
+        <p:cNvPr id="1" name=""/>
+        <p:cNvGrpSpPr/>
+        <p:nvPr/>
+      </p:nvGrpSpPr>
+      <p:grpSpPr>
+        <a:xfrm>
+          <a:off x="0" y="0"/>
+          <a:ext cx="0" cy="0"/>
+          <a:chOff x="0" y="0"/>
+          <a:chExt cx="0" cy="0"/>
+        </a:xfrm>
+      </p:grpSpPr>
+      <p:sp>
+        <p:nvSpPr>
+          <p:cNvPr id="4" name="Title 3">
+            <a:extLst>
+              <a:ext uri="{FF2B5EF4-FFF2-40B4-BE49-F238E27FC236}">
+                <a16:creationId xmlns:a16="http://schemas.microsoft.com/office/drawing/2014/main" id="{B021A23A-264E-4F48-8D91-52361A48531C}"/>
+              </a:ext>
+            </a:extLst>
+          </p:cNvPr>
+          <p:cNvSpPr>
+            <a:spLocks noGrp="1"/>
+          </p:cNvSpPr>
+          <p:nvPr>
+            <p:ph type="title"/>
+          </p:nvPr>
+        </p:nvSpPr>
+        <p:spPr/>
+        <p:txBody>
+          <a:bodyPr>
+            <a:normAutofit/>
+          </a:bodyPr>
+          <a:lstStyle/>
+          <a:p>
+            <a:r>
+              <a:rPr lang="nl-NL" sz="4400" dirty="0"/>
+              <a:t>Structuur en normalisatie</a:t>
+            </a:r>
+          </a:p>
+        </p:txBody>
+      </p:sp>
+      <p:sp>
+        <p:nvSpPr>
+          <p:cNvPr id="5" name="Text Placeholder 4">
+            <a:extLst>
+              <a:ext uri="{FF2B5EF4-FFF2-40B4-BE49-F238E27FC236}">
+                <a16:creationId xmlns:a16="http://schemas.microsoft.com/office/drawing/2014/main" id="{8B343CC5-EAA5-4394-8782-3BBA201EEC8C}"/>
+              </a:ext>
+            </a:extLst>
+          </p:cNvPr>
+          <p:cNvSpPr>
+            <a:spLocks noGrp="1"/>
+          </p:cNvSpPr>
+          <p:nvPr>
+            <p:ph type="body" idx="1"/>
+          </p:nvPr>
+        </p:nvSpPr>
+        <p:spPr/>
+        <p:txBody>
+          <a:bodyPr/>
+          <a:lstStyle/>
+          <a:p>
+            <a:endParaRPr lang="en-NL"/>
+          </a:p>
+        </p:txBody>
+      </p:sp>
+    </p:spTree>
+    <p:extLst>
+      <p:ext uri="{BB962C8B-B14F-4D97-AF65-F5344CB8AC3E}">
+        <p14:creationId xmlns:p14="http://schemas.microsoft.com/office/powerpoint/2010/main" val="2754617916"/>
+      </p:ext>
+    </p:extLst>
+  </p:cSld>
+  <p:clrMapOvr>
+    <a:masterClrMapping/>
+  </p:clrMapOvr>
+</p:sld>
+</file>
+
+<file path=ppt/slides/slide30.xml><?xml version="1.0" encoding="utf-8"?>
 <p:sld xmlns:a="http://schemas.openxmlformats.org/drawingml/2006/main" xmlns:r="http://schemas.openxmlformats.org/officeDocument/2006/relationships" xmlns:p="http://schemas.openxmlformats.org/presentationml/2006/main">
   <p:cSld>
     <p:spTree>
@@ -15844,316 +16091,6 @@
 </p:sld>
 </file>
 
-<file path=ppt/slides/slide3.xml><?xml version="1.0" encoding="utf-8"?>
-<p:sld xmlns:a="http://schemas.openxmlformats.org/drawingml/2006/main" xmlns:r="http://schemas.openxmlformats.org/officeDocument/2006/relationships" xmlns:p="http://schemas.openxmlformats.org/presentationml/2006/main">
-  <p:cSld>
-    <p:spTree>
-      <p:nvGrpSpPr>
-        <p:cNvPr id="1" name=""/>
-        <p:cNvGrpSpPr/>
-        <p:nvPr/>
-      </p:nvGrpSpPr>
-      <p:grpSpPr>
-        <a:xfrm>
-          <a:off x="0" y="0"/>
-          <a:ext cx="0" cy="0"/>
-          <a:chOff x="0" y="0"/>
-          <a:chExt cx="0" cy="0"/>
-        </a:xfrm>
-      </p:grpSpPr>
-      <p:sp>
-        <p:nvSpPr>
-          <p:cNvPr id="4" name="Title 3">
-            <a:extLst>
-              <a:ext uri="{FF2B5EF4-FFF2-40B4-BE49-F238E27FC236}">
-                <a16:creationId xmlns:a16="http://schemas.microsoft.com/office/drawing/2014/main" id="{B021A23A-264E-4F48-8D91-52361A48531C}"/>
-              </a:ext>
-            </a:extLst>
-          </p:cNvPr>
-          <p:cNvSpPr>
-            <a:spLocks noGrp="1"/>
-          </p:cNvSpPr>
-          <p:nvPr>
-            <p:ph type="title"/>
-          </p:nvPr>
-        </p:nvSpPr>
-        <p:spPr/>
-        <p:txBody>
-          <a:bodyPr>
-            <a:normAutofit/>
-          </a:bodyPr>
-          <a:lstStyle/>
-          <a:p>
-            <a:r>
-              <a:rPr lang="nl-NL" sz="4400" dirty="0"/>
-              <a:t>Structuur en normalisatie</a:t>
-            </a:r>
-          </a:p>
-        </p:txBody>
-      </p:sp>
-      <p:sp>
-        <p:nvSpPr>
-          <p:cNvPr id="5" name="Text Placeholder 4">
-            <a:extLst>
-              <a:ext uri="{FF2B5EF4-FFF2-40B4-BE49-F238E27FC236}">
-                <a16:creationId xmlns:a16="http://schemas.microsoft.com/office/drawing/2014/main" id="{8B343CC5-EAA5-4394-8782-3BBA201EEC8C}"/>
-              </a:ext>
-            </a:extLst>
-          </p:cNvPr>
-          <p:cNvSpPr>
-            <a:spLocks noGrp="1"/>
-          </p:cNvSpPr>
-          <p:nvPr>
-            <p:ph type="body" idx="1"/>
-          </p:nvPr>
-        </p:nvSpPr>
-        <p:spPr/>
-        <p:txBody>
-          <a:bodyPr/>
-          <a:lstStyle/>
-          <a:p>
-            <a:endParaRPr lang="en-NL"/>
-          </a:p>
-        </p:txBody>
-      </p:sp>
-    </p:spTree>
-    <p:extLst>
-      <p:ext uri="{BB962C8B-B14F-4D97-AF65-F5344CB8AC3E}">
-        <p14:creationId xmlns:p14="http://schemas.microsoft.com/office/powerpoint/2010/main" val="2754617916"/>
-      </p:ext>
-    </p:extLst>
-  </p:cSld>
-  <p:clrMapOvr>
-    <a:masterClrMapping/>
-  </p:clrMapOvr>
-</p:sld>
-</file>
-
-<file path=ppt/slides/slide30.xml><?xml version="1.0" encoding="utf-8"?>
-<p:sld xmlns:a="http://schemas.openxmlformats.org/drawingml/2006/main" xmlns:r="http://schemas.openxmlformats.org/officeDocument/2006/relationships" xmlns:p="http://schemas.openxmlformats.org/presentationml/2006/main">
-  <p:cSld>
-    <p:spTree>
-      <p:nvGrpSpPr>
-        <p:cNvPr id="1" name=""/>
-        <p:cNvGrpSpPr/>
-        <p:nvPr/>
-      </p:nvGrpSpPr>
-      <p:grpSpPr>
-        <a:xfrm>
-          <a:off x="0" y="0"/>
-          <a:ext cx="0" cy="0"/>
-          <a:chOff x="0" y="0"/>
-          <a:chExt cx="0" cy="0"/>
-        </a:xfrm>
-      </p:grpSpPr>
-      <p:sp>
-        <p:nvSpPr>
-          <p:cNvPr id="2" name="Title 1">
-            <a:extLst>
-              <a:ext uri="{FF2B5EF4-FFF2-40B4-BE49-F238E27FC236}">
-                <a16:creationId xmlns:a16="http://schemas.microsoft.com/office/drawing/2014/main" id="{9BDFD261-0D2C-41B9-9E28-43DF575D40E0}"/>
-              </a:ext>
-            </a:extLst>
-          </p:cNvPr>
-          <p:cNvSpPr>
-            <a:spLocks noGrp="1"/>
-          </p:cNvSpPr>
-          <p:nvPr>
-            <p:ph type="title"/>
-          </p:nvPr>
-        </p:nvSpPr>
-        <p:spPr/>
-        <p:txBody>
-          <a:bodyPr>
-            <a:normAutofit/>
-          </a:bodyPr>
-          <a:lstStyle/>
-          <a:p>
-            <a:r>
-              <a:rPr lang="nl-NL" sz="3600" dirty="0"/>
-              <a:t>Oefeningen 5</a:t>
-            </a:r>
-          </a:p>
-        </p:txBody>
-      </p:sp>
-      <p:sp>
-        <p:nvSpPr>
-          <p:cNvPr id="3" name="Content Placeholder 2">
-            <a:extLst>
-              <a:ext uri="{FF2B5EF4-FFF2-40B4-BE49-F238E27FC236}">
-                <a16:creationId xmlns:a16="http://schemas.microsoft.com/office/drawing/2014/main" id="{7844B503-C44F-453E-9465-D42E4557DE0C}"/>
-              </a:ext>
-            </a:extLst>
-          </p:cNvPr>
-          <p:cNvSpPr>
-            <a:spLocks noGrp="1"/>
-          </p:cNvSpPr>
-          <p:nvPr>
-            <p:ph idx="1"/>
-          </p:nvPr>
-        </p:nvSpPr>
-        <p:spPr/>
-        <p:txBody>
-          <a:bodyPr>
-            <a:noAutofit/>
-          </a:bodyPr>
-          <a:lstStyle/>
-          <a:p>
-            <a:pPr marL="0" indent="0">
-              <a:buNone/>
-            </a:pPr>
-            <a:r>
-              <a:rPr lang="nl-NL" sz="2000" dirty="0"/>
-              <a:t>Maak voor de volgende oefeningen een eigen </a:t>
-            </a:r>
-            <a:r>
-              <a:rPr lang="nl-NL" sz="2000" dirty="0" err="1"/>
-              <a:t>SQLite</a:t>
-            </a:r>
-            <a:r>
-              <a:rPr lang="nl-NL" sz="2000" dirty="0"/>
-              <a:t> database aan:</a:t>
-            </a:r>
-          </a:p>
-          <a:p>
-            <a:pPr marL="0" indent="0">
-              <a:buNone/>
-            </a:pPr>
-            <a:endParaRPr lang="nl-NL" sz="2000" dirty="0"/>
-          </a:p>
-          <a:p>
-            <a:pPr marL="0" indent="0">
-              <a:buNone/>
-            </a:pPr>
-            <a:r>
-              <a:rPr lang="nl-NL" sz="2000" dirty="0" err="1">
-                <a:latin typeface="Courier New" panose="02070309020205020404" pitchFamily="49" charset="0"/>
-                <a:cs typeface="Courier New" panose="02070309020205020404" pitchFamily="49" charset="0"/>
-              </a:rPr>
-              <a:t>db</a:t>
-            </a:r>
-            <a:r>
-              <a:rPr lang="nl-NL" sz="2000" dirty="0">
-                <a:latin typeface="Courier New" panose="02070309020205020404" pitchFamily="49" charset="0"/>
-                <a:cs typeface="Courier New" panose="02070309020205020404" pitchFamily="49" charset="0"/>
-              </a:rPr>
-              <a:t> = Database(“&lt;</a:t>
-            </a:r>
-            <a:r>
-              <a:rPr lang="nl-NL" sz="2000" dirty="0" err="1">
-                <a:latin typeface="Courier New" panose="02070309020205020404" pitchFamily="49" charset="0"/>
-                <a:cs typeface="Courier New" panose="02070309020205020404" pitchFamily="49" charset="0"/>
-              </a:rPr>
-              <a:t>bestandsnaam.db</a:t>
-            </a:r>
-            <a:r>
-              <a:rPr lang="nl-NL" sz="2000" dirty="0">
-                <a:latin typeface="Courier New" panose="02070309020205020404" pitchFamily="49" charset="0"/>
-                <a:cs typeface="Courier New" panose="02070309020205020404" pitchFamily="49" charset="0"/>
-              </a:rPr>
-              <a:t>&gt;”)</a:t>
-            </a:r>
-          </a:p>
-          <a:p>
-            <a:pPr marL="0" indent="0">
-              <a:buNone/>
-            </a:pPr>
-            <a:endParaRPr lang="nl-NL" sz="2000" dirty="0"/>
-          </a:p>
-          <a:p>
-            <a:pPr marL="0" indent="0">
-              <a:buNone/>
-            </a:pPr>
-            <a:r>
-              <a:rPr lang="nl-NL" sz="2000" dirty="0"/>
-              <a:t>Voer de onderstaande query uit om </a:t>
-            </a:r>
-            <a:r>
-              <a:rPr lang="nl-NL" sz="2000" dirty="0" err="1"/>
-              <a:t>foreign</a:t>
-            </a:r>
-            <a:r>
-              <a:rPr lang="nl-NL" sz="2000" dirty="0"/>
-              <a:t> </a:t>
-            </a:r>
-            <a:r>
-              <a:rPr lang="nl-NL" sz="2000" dirty="0" err="1"/>
-              <a:t>keys</a:t>
-            </a:r>
-            <a:r>
-              <a:rPr lang="nl-NL" sz="2000" dirty="0"/>
-              <a:t> aan te zetten:</a:t>
-            </a:r>
-          </a:p>
-          <a:p>
-            <a:pPr marL="0" indent="0">
-              <a:buNone/>
-            </a:pPr>
-            <a:endParaRPr lang="nl-NL" sz="2000" dirty="0"/>
-          </a:p>
-          <a:p>
-            <a:pPr marL="0" indent="0">
-              <a:buNone/>
-            </a:pPr>
-            <a:r>
-              <a:rPr lang="nl-NL" sz="2000" dirty="0" err="1">
-                <a:latin typeface="Courier New" panose="02070309020205020404" pitchFamily="49" charset="0"/>
-                <a:cs typeface="Courier New" panose="02070309020205020404" pitchFamily="49" charset="0"/>
-              </a:rPr>
-              <a:t>db.query</a:t>
-            </a:r>
-            <a:r>
-              <a:rPr lang="nl-NL" sz="2000" dirty="0">
-                <a:latin typeface="Courier New" panose="02070309020205020404" pitchFamily="49" charset="0"/>
-                <a:cs typeface="Courier New" panose="02070309020205020404" pitchFamily="49" charset="0"/>
-              </a:rPr>
-              <a:t>(“PRAGMA </a:t>
-            </a:r>
-            <a:r>
-              <a:rPr lang="nl-NL" sz="2000" dirty="0" err="1">
-                <a:latin typeface="Courier New" panose="02070309020205020404" pitchFamily="49" charset="0"/>
-                <a:cs typeface="Courier New" panose="02070309020205020404" pitchFamily="49" charset="0"/>
-              </a:rPr>
-              <a:t>foreign_keys</a:t>
-            </a:r>
-            <a:r>
-              <a:rPr lang="nl-NL" sz="2000" dirty="0">
-                <a:latin typeface="Courier New" panose="02070309020205020404" pitchFamily="49" charset="0"/>
-                <a:cs typeface="Courier New" panose="02070309020205020404" pitchFamily="49" charset="0"/>
-              </a:rPr>
-              <a:t> = ON;”)</a:t>
-            </a:r>
-          </a:p>
-          <a:p>
-            <a:pPr marL="0" indent="0">
-              <a:buNone/>
-            </a:pPr>
-            <a:endParaRPr lang="nl-NL" sz="2000" dirty="0"/>
-          </a:p>
-          <a:p>
-            <a:pPr marL="0" indent="0">
-              <a:buNone/>
-            </a:pPr>
-            <a:r>
-              <a:rPr lang="nl-NL" sz="2000" dirty="0"/>
-              <a:t>Ga nu verder naar de oefeningen…</a:t>
-            </a:r>
-          </a:p>
-        </p:txBody>
-      </p:sp>
-    </p:spTree>
-    <p:extLst>
-      <p:ext uri="{BB962C8B-B14F-4D97-AF65-F5344CB8AC3E}">
-        <p14:creationId xmlns:p14="http://schemas.microsoft.com/office/powerpoint/2010/main" val="4278625515"/>
-      </p:ext>
-    </p:extLst>
-  </p:cSld>
-  <p:clrMapOvr>
-    <a:masterClrMapping/>
-  </p:clrMapOvr>
-</p:sld>
-</file>
-
 <file path=ppt/slides/slide31.xml><?xml version="1.0" encoding="utf-8"?>
 <p:sld xmlns:a="http://schemas.openxmlformats.org/drawingml/2006/main" xmlns:r="http://schemas.openxmlformats.org/officeDocument/2006/relationships" xmlns:p="http://schemas.openxmlformats.org/presentationml/2006/main">
   <p:cSld>
@@ -16224,6 +16161,231 @@
           </a:bodyPr>
           <a:lstStyle/>
           <a:p>
+            <a:pPr marL="0" indent="0">
+              <a:buNone/>
+            </a:pPr>
+            <a:r>
+              <a:rPr lang="nl-NL" sz="2000" dirty="0"/>
+              <a:t>Maak voor de volgende oefeningen een eigen </a:t>
+            </a:r>
+            <a:r>
+              <a:rPr lang="nl-NL" sz="2000" dirty="0" err="1"/>
+              <a:t>SQLite</a:t>
+            </a:r>
+            <a:r>
+              <a:rPr lang="nl-NL" sz="2000" dirty="0"/>
+              <a:t> database aan:</a:t>
+            </a:r>
+          </a:p>
+          <a:p>
+            <a:pPr marL="0" indent="0">
+              <a:buNone/>
+            </a:pPr>
+            <a:endParaRPr lang="nl-NL" sz="2000" dirty="0"/>
+          </a:p>
+          <a:p>
+            <a:pPr marL="0" indent="0">
+              <a:buNone/>
+            </a:pPr>
+            <a:r>
+              <a:rPr lang="nl-NL" sz="2000" dirty="0" err="1">
+                <a:latin typeface="Courier New" panose="02070309020205020404" pitchFamily="49" charset="0"/>
+                <a:cs typeface="Courier New" panose="02070309020205020404" pitchFamily="49" charset="0"/>
+              </a:rPr>
+              <a:t>db</a:t>
+            </a:r>
+            <a:r>
+              <a:rPr lang="nl-NL" sz="2000" dirty="0">
+                <a:latin typeface="Courier New" panose="02070309020205020404" pitchFamily="49" charset="0"/>
+                <a:cs typeface="Courier New" panose="02070309020205020404" pitchFamily="49" charset="0"/>
+              </a:rPr>
+              <a:t> = Database(“&lt;</a:t>
+            </a:r>
+            <a:r>
+              <a:rPr lang="nl-NL" sz="2000" dirty="0" err="1">
+                <a:latin typeface="Courier New" panose="02070309020205020404" pitchFamily="49" charset="0"/>
+                <a:cs typeface="Courier New" panose="02070309020205020404" pitchFamily="49" charset="0"/>
+              </a:rPr>
+              <a:t>bestandsnaam.db</a:t>
+            </a:r>
+            <a:r>
+              <a:rPr lang="nl-NL" sz="2000" dirty="0">
+                <a:latin typeface="Courier New" panose="02070309020205020404" pitchFamily="49" charset="0"/>
+                <a:cs typeface="Courier New" panose="02070309020205020404" pitchFamily="49" charset="0"/>
+              </a:rPr>
+              <a:t>&gt;”)</a:t>
+            </a:r>
+          </a:p>
+          <a:p>
+            <a:pPr marL="0" indent="0">
+              <a:buNone/>
+            </a:pPr>
+            <a:endParaRPr lang="nl-NL" sz="2000" dirty="0"/>
+          </a:p>
+          <a:p>
+            <a:pPr marL="0" indent="0">
+              <a:buNone/>
+            </a:pPr>
+            <a:r>
+              <a:rPr lang="nl-NL" sz="2000" dirty="0"/>
+              <a:t>Voer de onderstaande query uit om </a:t>
+            </a:r>
+            <a:r>
+              <a:rPr lang="nl-NL" sz="2000" dirty="0" err="1"/>
+              <a:t>foreign</a:t>
+            </a:r>
+            <a:r>
+              <a:rPr lang="nl-NL" sz="2000" dirty="0"/>
+              <a:t> </a:t>
+            </a:r>
+            <a:r>
+              <a:rPr lang="nl-NL" sz="2000" dirty="0" err="1"/>
+              <a:t>keys</a:t>
+            </a:r>
+            <a:r>
+              <a:rPr lang="nl-NL" sz="2000" dirty="0"/>
+              <a:t> aan te zetten:</a:t>
+            </a:r>
+          </a:p>
+          <a:p>
+            <a:pPr marL="0" indent="0">
+              <a:buNone/>
+            </a:pPr>
+            <a:endParaRPr lang="nl-NL" sz="2000" dirty="0"/>
+          </a:p>
+          <a:p>
+            <a:pPr marL="0" indent="0">
+              <a:buNone/>
+            </a:pPr>
+            <a:r>
+              <a:rPr lang="nl-NL" sz="2000" dirty="0" err="1">
+                <a:latin typeface="Courier New" panose="02070309020205020404" pitchFamily="49" charset="0"/>
+                <a:cs typeface="Courier New" panose="02070309020205020404" pitchFamily="49" charset="0"/>
+              </a:rPr>
+              <a:t>db.query</a:t>
+            </a:r>
+            <a:r>
+              <a:rPr lang="nl-NL" sz="2000" dirty="0">
+                <a:latin typeface="Courier New" panose="02070309020205020404" pitchFamily="49" charset="0"/>
+                <a:cs typeface="Courier New" panose="02070309020205020404" pitchFamily="49" charset="0"/>
+              </a:rPr>
+              <a:t>(“PRAGMA </a:t>
+            </a:r>
+            <a:r>
+              <a:rPr lang="nl-NL" sz="2000" dirty="0" err="1">
+                <a:latin typeface="Courier New" panose="02070309020205020404" pitchFamily="49" charset="0"/>
+                <a:cs typeface="Courier New" panose="02070309020205020404" pitchFamily="49" charset="0"/>
+              </a:rPr>
+              <a:t>foreign_keys</a:t>
+            </a:r>
+            <a:r>
+              <a:rPr lang="nl-NL" sz="2000" dirty="0">
+                <a:latin typeface="Courier New" panose="02070309020205020404" pitchFamily="49" charset="0"/>
+                <a:cs typeface="Courier New" panose="02070309020205020404" pitchFamily="49" charset="0"/>
+              </a:rPr>
+              <a:t> = ON;”)</a:t>
+            </a:r>
+          </a:p>
+          <a:p>
+            <a:pPr marL="0" indent="0">
+              <a:buNone/>
+            </a:pPr>
+            <a:endParaRPr lang="nl-NL" sz="2000" dirty="0"/>
+          </a:p>
+          <a:p>
+            <a:pPr marL="0" indent="0">
+              <a:buNone/>
+            </a:pPr>
+            <a:r>
+              <a:rPr lang="nl-NL" sz="2000" dirty="0"/>
+              <a:t>Ga nu verder naar de oefeningen…</a:t>
+            </a:r>
+          </a:p>
+        </p:txBody>
+      </p:sp>
+    </p:spTree>
+    <p:extLst>
+      <p:ext uri="{BB962C8B-B14F-4D97-AF65-F5344CB8AC3E}">
+        <p14:creationId xmlns:p14="http://schemas.microsoft.com/office/powerpoint/2010/main" val="4278625515"/>
+      </p:ext>
+    </p:extLst>
+  </p:cSld>
+  <p:clrMapOvr>
+    <a:masterClrMapping/>
+  </p:clrMapOvr>
+</p:sld>
+</file>
+
+<file path=ppt/slides/slide32.xml><?xml version="1.0" encoding="utf-8"?>
+<p:sld xmlns:a="http://schemas.openxmlformats.org/drawingml/2006/main" xmlns:r="http://schemas.openxmlformats.org/officeDocument/2006/relationships" xmlns:p="http://schemas.openxmlformats.org/presentationml/2006/main">
+  <p:cSld>
+    <p:spTree>
+      <p:nvGrpSpPr>
+        <p:cNvPr id="1" name=""/>
+        <p:cNvGrpSpPr/>
+        <p:nvPr/>
+      </p:nvGrpSpPr>
+      <p:grpSpPr>
+        <a:xfrm>
+          <a:off x="0" y="0"/>
+          <a:ext cx="0" cy="0"/>
+          <a:chOff x="0" y="0"/>
+          <a:chExt cx="0" cy="0"/>
+        </a:xfrm>
+      </p:grpSpPr>
+      <p:sp>
+        <p:nvSpPr>
+          <p:cNvPr id="2" name="Title 1">
+            <a:extLst>
+              <a:ext uri="{FF2B5EF4-FFF2-40B4-BE49-F238E27FC236}">
+                <a16:creationId xmlns:a16="http://schemas.microsoft.com/office/drawing/2014/main" id="{9BDFD261-0D2C-41B9-9E28-43DF575D40E0}"/>
+              </a:ext>
+            </a:extLst>
+          </p:cNvPr>
+          <p:cNvSpPr>
+            <a:spLocks noGrp="1"/>
+          </p:cNvSpPr>
+          <p:nvPr>
+            <p:ph type="title"/>
+          </p:nvPr>
+        </p:nvSpPr>
+        <p:spPr/>
+        <p:txBody>
+          <a:bodyPr>
+            <a:normAutofit/>
+          </a:bodyPr>
+          <a:lstStyle/>
+          <a:p>
+            <a:r>
+              <a:rPr lang="nl-NL" sz="3600" dirty="0"/>
+              <a:t>Oefeningen 5</a:t>
+            </a:r>
+          </a:p>
+        </p:txBody>
+      </p:sp>
+      <p:sp>
+        <p:nvSpPr>
+          <p:cNvPr id="3" name="Content Placeholder 2">
+            <a:extLst>
+              <a:ext uri="{FF2B5EF4-FFF2-40B4-BE49-F238E27FC236}">
+                <a16:creationId xmlns:a16="http://schemas.microsoft.com/office/drawing/2014/main" id="{7844B503-C44F-453E-9465-D42E4557DE0C}"/>
+              </a:ext>
+            </a:extLst>
+          </p:cNvPr>
+          <p:cNvSpPr>
+            <a:spLocks noGrp="1"/>
+          </p:cNvSpPr>
+          <p:nvPr>
+            <p:ph idx="1"/>
+          </p:nvPr>
+        </p:nvSpPr>
+        <p:spPr/>
+        <p:txBody>
+          <a:bodyPr>
+            <a:noAutofit/>
+          </a:bodyPr>
+          <a:lstStyle/>
+          <a:p>
             <a:pPr marL="457200" indent="-457200">
               <a:buAutoNum type="arabicPeriod"/>
             </a:pPr>
@@ -16353,7 +16515,7 @@
 </p:sld>
 </file>
 
-<file path=ppt/slides/slide32.xml><?xml version="1.0" encoding="utf-8"?>
+<file path=ppt/slides/slide33.xml><?xml version="1.0" encoding="utf-8"?>
 <p:sld xmlns:a="http://schemas.openxmlformats.org/drawingml/2006/main" xmlns:r="http://schemas.openxmlformats.org/officeDocument/2006/relationships" xmlns:p="http://schemas.openxmlformats.org/presentationml/2006/main">
   <p:cSld>
     <p:spTree>
@@ -16438,7 +16600,7 @@
 </p:sld>
 </file>
 
-<file path=ppt/slides/slide33.xml><?xml version="1.0" encoding="utf-8"?>
+<file path=ppt/slides/slide34.xml><?xml version="1.0" encoding="utf-8"?>
 <p:sld xmlns:a="http://schemas.openxmlformats.org/drawingml/2006/main" xmlns:r="http://schemas.openxmlformats.org/officeDocument/2006/relationships" xmlns:p="http://schemas.openxmlformats.org/presentationml/2006/main">
   <p:cSld>
     <p:spTree>
@@ -17408,7 +17570,7 @@
 </p:sld>
 </file>
 
-<file path=ppt/slides/slide34.xml><?xml version="1.0" encoding="utf-8"?>
+<file path=ppt/slides/slide35.xml><?xml version="1.0" encoding="utf-8"?>
 <p:sld xmlns:a="http://schemas.openxmlformats.org/drawingml/2006/main" xmlns:r="http://schemas.openxmlformats.org/officeDocument/2006/relationships" xmlns:p="http://schemas.openxmlformats.org/presentationml/2006/main">
   <p:cSld>
     <p:spTree>
@@ -18523,7 +18685,7 @@
 </p:sld>
 </file>
 
-<file path=ppt/slides/slide35.xml><?xml version="1.0" encoding="utf-8"?>
+<file path=ppt/slides/slide36.xml><?xml version="1.0" encoding="utf-8"?>
 <p:sld xmlns:a="http://schemas.openxmlformats.org/drawingml/2006/main" xmlns:r="http://schemas.openxmlformats.org/officeDocument/2006/relationships" xmlns:p="http://schemas.openxmlformats.org/presentationml/2006/main">
   <p:cSld>
     <p:spTree>
@@ -19063,7 +19225,7 @@
 </p:sld>
 </file>
 
-<file path=ppt/slides/slide36.xml><?xml version="1.0" encoding="utf-8"?>
+<file path=ppt/slides/slide37.xml><?xml version="1.0" encoding="utf-8"?>
 <p:sld xmlns:a="http://schemas.openxmlformats.org/drawingml/2006/main" xmlns:r="http://schemas.openxmlformats.org/officeDocument/2006/relationships" xmlns:p="http://schemas.openxmlformats.org/presentationml/2006/main">
   <p:cSld>
     <p:spTree>
@@ -19543,7 +19705,7 @@
 </p:sld>
 </file>
 
-<file path=ppt/slides/slide37.xml><?xml version="1.0" encoding="utf-8"?>
+<file path=ppt/slides/slide38.xml><?xml version="1.0" encoding="utf-8"?>
 <p:sld xmlns:a="http://schemas.openxmlformats.org/drawingml/2006/main" xmlns:r="http://schemas.openxmlformats.org/officeDocument/2006/relationships" xmlns:p="http://schemas.openxmlformats.org/presentationml/2006/main">
   <p:cSld>
     <p:spTree>
@@ -19696,7 +19858,7 @@
 </p:sld>
 </file>
 
-<file path=ppt/slides/slide38.xml><?xml version="1.0" encoding="utf-8"?>
+<file path=ppt/slides/slide39.xml><?xml version="1.0" encoding="utf-8"?>
 <p:sld xmlns:a="http://schemas.openxmlformats.org/drawingml/2006/main" xmlns:r="http://schemas.openxmlformats.org/officeDocument/2006/relationships" xmlns:p="http://schemas.openxmlformats.org/presentationml/2006/main">
   <p:cSld>
     <p:spTree>
@@ -19781,7 +19943,624 @@
 </p:sld>
 </file>
 
-<file path=ppt/slides/slide39.xml><?xml version="1.0" encoding="utf-8"?>
+<file path=ppt/slides/slide4.xml><?xml version="1.0" encoding="utf-8"?>
+<p:sld xmlns:a="http://schemas.openxmlformats.org/drawingml/2006/main" xmlns:r="http://schemas.openxmlformats.org/officeDocument/2006/relationships" xmlns:p="http://schemas.openxmlformats.org/presentationml/2006/main">
+  <p:cSld>
+    <p:spTree>
+      <p:nvGrpSpPr>
+        <p:cNvPr id="1" name=""/>
+        <p:cNvGrpSpPr/>
+        <p:nvPr/>
+      </p:nvGrpSpPr>
+      <p:grpSpPr>
+        <a:xfrm>
+          <a:off x="0" y="0"/>
+          <a:ext cx="0" cy="0"/>
+          <a:chOff x="0" y="0"/>
+          <a:chExt cx="0" cy="0"/>
+        </a:xfrm>
+      </p:grpSpPr>
+      <p:sp>
+        <p:nvSpPr>
+          <p:cNvPr id="2" name="Title 1">
+            <a:extLst>
+              <a:ext uri="{FF2B5EF4-FFF2-40B4-BE49-F238E27FC236}">
+                <a16:creationId xmlns:a16="http://schemas.microsoft.com/office/drawing/2014/main" id="{9BDFD261-0D2C-41B9-9E28-43DF575D40E0}"/>
+              </a:ext>
+            </a:extLst>
+          </p:cNvPr>
+          <p:cNvSpPr>
+            <a:spLocks noGrp="1"/>
+          </p:cNvSpPr>
+          <p:nvPr>
+            <p:ph type="title"/>
+          </p:nvPr>
+        </p:nvSpPr>
+        <p:spPr/>
+        <p:txBody>
+          <a:bodyPr>
+            <a:normAutofit/>
+          </a:bodyPr>
+          <a:lstStyle/>
+          <a:p>
+            <a:r>
+              <a:rPr lang="nl-NL" sz="3600" dirty="0"/>
+              <a:t>Relaties tussen tabellen</a:t>
+            </a:r>
+          </a:p>
+        </p:txBody>
+      </p:sp>
+      <p:sp>
+        <p:nvSpPr>
+          <p:cNvPr id="3" name="Content Placeholder 2">
+            <a:extLst>
+              <a:ext uri="{FF2B5EF4-FFF2-40B4-BE49-F238E27FC236}">
+                <a16:creationId xmlns:a16="http://schemas.microsoft.com/office/drawing/2014/main" id="{7844B503-C44F-453E-9465-D42E4557DE0C}"/>
+              </a:ext>
+            </a:extLst>
+          </p:cNvPr>
+          <p:cNvSpPr>
+            <a:spLocks noGrp="1"/>
+          </p:cNvSpPr>
+          <p:nvPr>
+            <p:ph idx="1"/>
+          </p:nvPr>
+        </p:nvSpPr>
+        <p:spPr>
+          <a:xfrm>
+            <a:off x="838199" y="1825625"/>
+            <a:ext cx="10442825" cy="4351338"/>
+          </a:xfrm>
+        </p:spPr>
+        <p:txBody>
+          <a:bodyPr>
+            <a:normAutofit/>
+          </a:bodyPr>
+          <a:lstStyle/>
+          <a:p>
+            <a:pPr marL="0" indent="0">
+              <a:buNone/>
+            </a:pPr>
+            <a:r>
+              <a:rPr lang="nl-NL" sz="2000" dirty="0"/>
+              <a:t>Tabellen hebben vaak relaties met andere tabellen:</a:t>
+            </a:r>
+          </a:p>
+          <a:p>
+            <a:pPr marL="0" indent="0">
+              <a:buNone/>
+            </a:pPr>
+            <a:endParaRPr lang="nl-NL" sz="2000" dirty="0"/>
+          </a:p>
+          <a:p>
+            <a:pPr marL="0" indent="0">
+              <a:buNone/>
+            </a:pPr>
+            <a:endParaRPr lang="nl-NL" sz="2000" dirty="0"/>
+          </a:p>
+        </p:txBody>
+      </p:sp>
+      <p:graphicFrame>
+        <p:nvGraphicFramePr>
+          <p:cNvPr id="4" name="Table 5">
+            <a:extLst>
+              <a:ext uri="{FF2B5EF4-FFF2-40B4-BE49-F238E27FC236}">
+                <a16:creationId xmlns:a16="http://schemas.microsoft.com/office/drawing/2014/main" id="{62CA46F3-D9D4-4F4A-856A-A943EE0F0F0C}"/>
+              </a:ext>
+            </a:extLst>
+          </p:cNvPr>
+          <p:cNvGraphicFramePr>
+            <a:graphicFrameLocks noGrp="1"/>
+          </p:cNvGraphicFramePr>
+          <p:nvPr/>
+        </p:nvGraphicFramePr>
+        <p:xfrm>
+          <a:off x="989028" y="2928721"/>
+          <a:ext cx="1820160" cy="1849120"/>
+        </p:xfrm>
+        <a:graphic>
+          <a:graphicData uri="http://schemas.openxmlformats.org/drawingml/2006/table">
+            <a:tbl>
+              <a:tblPr firstRow="1" bandRow="1">
+                <a:tableStyleId>{5C22544A-7EE6-4342-B048-85BDC9FD1C3A}</a:tableStyleId>
+              </a:tblPr>
+              <a:tblGrid>
+                <a:gridCol w="1820160">
+                  <a:extLst>
+                    <a:ext uri="{9D8B030D-6E8A-4147-A177-3AD203B41FA5}">
+                      <a16:colId xmlns:a16="http://schemas.microsoft.com/office/drawing/2014/main" val="2508677333"/>
+                    </a:ext>
+                  </a:extLst>
+                </a:gridCol>
+              </a:tblGrid>
+              <a:tr h="0">
+                <a:tc>
+                  <a:txBody>
+                    <a:bodyPr/>
+                    <a:lstStyle/>
+                    <a:p>
+                      <a:r>
+                        <a:rPr lang="nl-NL" noProof="0" dirty="0"/>
+                        <a:t>Klanten</a:t>
+                      </a:r>
+                    </a:p>
+                  </a:txBody>
+                  <a:tcPr/>
+                </a:tc>
+                <a:extLst>
+                  <a:ext uri="{0D108BD9-81ED-4DB2-BD59-A6C34878D82A}">
+                    <a16:rowId xmlns:a16="http://schemas.microsoft.com/office/drawing/2014/main" val="858791041"/>
+                  </a:ext>
+                </a:extLst>
+              </a:tr>
+              <a:tr h="370840">
+                <a:tc>
+                  <a:txBody>
+                    <a:bodyPr/>
+                    <a:lstStyle/>
+                    <a:p>
+                      <a:r>
+                        <a:rPr lang="nl-NL" noProof="0" dirty="0" err="1"/>
+                        <a:t>KlantID</a:t>
+                      </a:r>
+                      <a:endParaRPr lang="nl-NL" noProof="0" dirty="0"/>
+                    </a:p>
+                  </a:txBody>
+                  <a:tcPr/>
+                </a:tc>
+                <a:extLst>
+                  <a:ext uri="{0D108BD9-81ED-4DB2-BD59-A6C34878D82A}">
+                    <a16:rowId xmlns:a16="http://schemas.microsoft.com/office/drawing/2014/main" val="1538811982"/>
+                  </a:ext>
+                </a:extLst>
+              </a:tr>
+              <a:tr h="370840">
+                <a:tc>
+                  <a:txBody>
+                    <a:bodyPr/>
+                    <a:lstStyle/>
+                    <a:p>
+                      <a:r>
+                        <a:rPr lang="nl-NL" noProof="0"/>
+                        <a:t>Voornaam</a:t>
+                      </a:r>
+                    </a:p>
+                  </a:txBody>
+                  <a:tcPr/>
+                </a:tc>
+                <a:extLst>
+                  <a:ext uri="{0D108BD9-81ED-4DB2-BD59-A6C34878D82A}">
+                    <a16:rowId xmlns:a16="http://schemas.microsoft.com/office/drawing/2014/main" val="3674785774"/>
+                  </a:ext>
+                </a:extLst>
+              </a:tr>
+              <a:tr h="370840">
+                <a:tc>
+                  <a:txBody>
+                    <a:bodyPr/>
+                    <a:lstStyle/>
+                    <a:p>
+                      <a:r>
+                        <a:rPr lang="nl-NL" noProof="0"/>
+                        <a:t>Achternaam</a:t>
+                      </a:r>
+                    </a:p>
+                  </a:txBody>
+                  <a:tcPr/>
+                </a:tc>
+                <a:extLst>
+                  <a:ext uri="{0D108BD9-81ED-4DB2-BD59-A6C34878D82A}">
+                    <a16:rowId xmlns:a16="http://schemas.microsoft.com/office/drawing/2014/main" val="2335262126"/>
+                  </a:ext>
+                </a:extLst>
+              </a:tr>
+              <a:tr h="370840">
+                <a:tc>
+                  <a:txBody>
+                    <a:bodyPr/>
+                    <a:lstStyle/>
+                    <a:p>
+                      <a:r>
+                        <a:rPr lang="nl-NL" noProof="0" dirty="0"/>
+                        <a:t>…</a:t>
+                      </a:r>
+                    </a:p>
+                  </a:txBody>
+                  <a:tcPr/>
+                </a:tc>
+                <a:extLst>
+                  <a:ext uri="{0D108BD9-81ED-4DB2-BD59-A6C34878D82A}">
+                    <a16:rowId xmlns:a16="http://schemas.microsoft.com/office/drawing/2014/main" val="2163937255"/>
+                  </a:ext>
+                </a:extLst>
+              </a:tr>
+            </a:tbl>
+          </a:graphicData>
+        </a:graphic>
+      </p:graphicFrame>
+      <p:graphicFrame>
+        <p:nvGraphicFramePr>
+          <p:cNvPr id="5" name="Table 5">
+            <a:extLst>
+              <a:ext uri="{FF2B5EF4-FFF2-40B4-BE49-F238E27FC236}">
+                <a16:creationId xmlns:a16="http://schemas.microsoft.com/office/drawing/2014/main" id="{2F81CE1D-F9ED-02C0-0A6D-49B2EC941B4F}"/>
+              </a:ext>
+            </a:extLst>
+          </p:cNvPr>
+          <p:cNvGraphicFramePr>
+            <a:graphicFrameLocks noGrp="1"/>
+          </p:cNvGraphicFramePr>
+          <p:nvPr>
+            <p:extLst>
+              <p:ext uri="{D42A27DB-BD31-4B8C-83A1-F6EECF244321}">
+                <p14:modId xmlns:p14="http://schemas.microsoft.com/office/powerpoint/2010/main" val="2425437271"/>
+              </p:ext>
+            </p:extLst>
+          </p:nvPr>
+        </p:nvGraphicFramePr>
+        <p:xfrm>
+          <a:off x="4275840" y="2928721"/>
+          <a:ext cx="1820160" cy="1849120"/>
+        </p:xfrm>
+        <a:graphic>
+          <a:graphicData uri="http://schemas.openxmlformats.org/drawingml/2006/table">
+            <a:tbl>
+              <a:tblPr firstRow="1" bandRow="1">
+                <a:tableStyleId>{5C22544A-7EE6-4342-B048-85BDC9FD1C3A}</a:tableStyleId>
+              </a:tblPr>
+              <a:tblGrid>
+                <a:gridCol w="1820160">
+                  <a:extLst>
+                    <a:ext uri="{9D8B030D-6E8A-4147-A177-3AD203B41FA5}">
+                      <a16:colId xmlns:a16="http://schemas.microsoft.com/office/drawing/2014/main" val="2508677333"/>
+                    </a:ext>
+                  </a:extLst>
+                </a:gridCol>
+              </a:tblGrid>
+              <a:tr h="0">
+                <a:tc>
+                  <a:txBody>
+                    <a:bodyPr/>
+                    <a:lstStyle/>
+                    <a:p>
+                      <a:r>
+                        <a:rPr lang="nl-NL" noProof="0" dirty="0"/>
+                        <a:t>Transacties</a:t>
+                      </a:r>
+                    </a:p>
+                  </a:txBody>
+                  <a:tcPr/>
+                </a:tc>
+                <a:extLst>
+                  <a:ext uri="{0D108BD9-81ED-4DB2-BD59-A6C34878D82A}">
+                    <a16:rowId xmlns:a16="http://schemas.microsoft.com/office/drawing/2014/main" val="858791041"/>
+                  </a:ext>
+                </a:extLst>
+              </a:tr>
+              <a:tr h="370840">
+                <a:tc>
+                  <a:txBody>
+                    <a:bodyPr/>
+                    <a:lstStyle/>
+                    <a:p>
+                      <a:r>
+                        <a:rPr lang="nl-NL" noProof="0" dirty="0" err="1"/>
+                        <a:t>KlantID</a:t>
+                      </a:r>
+                      <a:endParaRPr lang="nl-NL" noProof="0" dirty="0"/>
+                    </a:p>
+                  </a:txBody>
+                  <a:tcPr/>
+                </a:tc>
+                <a:extLst>
+                  <a:ext uri="{0D108BD9-81ED-4DB2-BD59-A6C34878D82A}">
+                    <a16:rowId xmlns:a16="http://schemas.microsoft.com/office/drawing/2014/main" val="1538811982"/>
+                  </a:ext>
+                </a:extLst>
+              </a:tr>
+              <a:tr h="370840">
+                <a:tc>
+                  <a:txBody>
+                    <a:bodyPr/>
+                    <a:lstStyle/>
+                    <a:p>
+                      <a:r>
+                        <a:rPr lang="nl-NL" noProof="0" dirty="0" err="1"/>
+                        <a:t>ProductID</a:t>
+                      </a:r>
+                      <a:endParaRPr lang="nl-NL" noProof="0" dirty="0"/>
+                    </a:p>
+                  </a:txBody>
+                  <a:tcPr/>
+                </a:tc>
+                <a:extLst>
+                  <a:ext uri="{0D108BD9-81ED-4DB2-BD59-A6C34878D82A}">
+                    <a16:rowId xmlns:a16="http://schemas.microsoft.com/office/drawing/2014/main" val="3674785774"/>
+                  </a:ext>
+                </a:extLst>
+              </a:tr>
+              <a:tr h="370840">
+                <a:tc>
+                  <a:txBody>
+                    <a:bodyPr/>
+                    <a:lstStyle/>
+                    <a:p>
+                      <a:r>
+                        <a:rPr lang="nl-NL" noProof="0" dirty="0"/>
+                        <a:t>Aantal</a:t>
+                      </a:r>
+                    </a:p>
+                  </a:txBody>
+                  <a:tcPr/>
+                </a:tc>
+                <a:extLst>
+                  <a:ext uri="{0D108BD9-81ED-4DB2-BD59-A6C34878D82A}">
+                    <a16:rowId xmlns:a16="http://schemas.microsoft.com/office/drawing/2014/main" val="2335262126"/>
+                  </a:ext>
+                </a:extLst>
+              </a:tr>
+              <a:tr h="370840">
+                <a:tc>
+                  <a:txBody>
+                    <a:bodyPr/>
+                    <a:lstStyle/>
+                    <a:p>
+                      <a:r>
+                        <a:rPr lang="nl-NL" noProof="0" dirty="0"/>
+                        <a:t>…</a:t>
+                      </a:r>
+                    </a:p>
+                  </a:txBody>
+                  <a:tcPr/>
+                </a:tc>
+                <a:extLst>
+                  <a:ext uri="{0D108BD9-81ED-4DB2-BD59-A6C34878D82A}">
+                    <a16:rowId xmlns:a16="http://schemas.microsoft.com/office/drawing/2014/main" val="2163937255"/>
+                  </a:ext>
+                </a:extLst>
+              </a:tr>
+            </a:tbl>
+          </a:graphicData>
+        </a:graphic>
+      </p:graphicFrame>
+      <p:graphicFrame>
+        <p:nvGraphicFramePr>
+          <p:cNvPr id="8" name="Table 5">
+            <a:extLst>
+              <a:ext uri="{FF2B5EF4-FFF2-40B4-BE49-F238E27FC236}">
+                <a16:creationId xmlns:a16="http://schemas.microsoft.com/office/drawing/2014/main" id="{F4917DC8-4826-215A-40A2-62AE8EF1EFDB}"/>
+              </a:ext>
+            </a:extLst>
+          </p:cNvPr>
+          <p:cNvGraphicFramePr>
+            <a:graphicFrameLocks noGrp="1"/>
+          </p:cNvGraphicFramePr>
+          <p:nvPr>
+            <p:extLst>
+              <p:ext uri="{D42A27DB-BD31-4B8C-83A1-F6EECF244321}">
+                <p14:modId xmlns:p14="http://schemas.microsoft.com/office/powerpoint/2010/main" val="1940865512"/>
+              </p:ext>
+            </p:extLst>
+          </p:nvPr>
+        </p:nvGraphicFramePr>
+        <p:xfrm>
+          <a:off x="7562652" y="2928721"/>
+          <a:ext cx="1820160" cy="1849120"/>
+        </p:xfrm>
+        <a:graphic>
+          <a:graphicData uri="http://schemas.openxmlformats.org/drawingml/2006/table">
+            <a:tbl>
+              <a:tblPr firstRow="1" bandRow="1">
+                <a:tableStyleId>{5C22544A-7EE6-4342-B048-85BDC9FD1C3A}</a:tableStyleId>
+              </a:tblPr>
+              <a:tblGrid>
+                <a:gridCol w="1820160">
+                  <a:extLst>
+                    <a:ext uri="{9D8B030D-6E8A-4147-A177-3AD203B41FA5}">
+                      <a16:colId xmlns:a16="http://schemas.microsoft.com/office/drawing/2014/main" val="2508677333"/>
+                    </a:ext>
+                  </a:extLst>
+                </a:gridCol>
+              </a:tblGrid>
+              <a:tr h="0">
+                <a:tc>
+                  <a:txBody>
+                    <a:bodyPr/>
+                    <a:lstStyle/>
+                    <a:p>
+                      <a:r>
+                        <a:rPr lang="nl-NL" noProof="0" dirty="0"/>
+                        <a:t>Producten</a:t>
+                      </a:r>
+                    </a:p>
+                  </a:txBody>
+                  <a:tcPr/>
+                </a:tc>
+                <a:extLst>
+                  <a:ext uri="{0D108BD9-81ED-4DB2-BD59-A6C34878D82A}">
+                    <a16:rowId xmlns:a16="http://schemas.microsoft.com/office/drawing/2014/main" val="858791041"/>
+                  </a:ext>
+                </a:extLst>
+              </a:tr>
+              <a:tr h="370840">
+                <a:tc>
+                  <a:txBody>
+                    <a:bodyPr/>
+                    <a:lstStyle/>
+                    <a:p>
+                      <a:r>
+                        <a:rPr lang="nl-NL" noProof="0" dirty="0" err="1"/>
+                        <a:t>ProductID</a:t>
+                      </a:r>
+                      <a:endParaRPr lang="nl-NL" noProof="0" dirty="0"/>
+                    </a:p>
+                  </a:txBody>
+                  <a:tcPr/>
+                </a:tc>
+                <a:extLst>
+                  <a:ext uri="{0D108BD9-81ED-4DB2-BD59-A6C34878D82A}">
+                    <a16:rowId xmlns:a16="http://schemas.microsoft.com/office/drawing/2014/main" val="1538811982"/>
+                  </a:ext>
+                </a:extLst>
+              </a:tr>
+              <a:tr h="370840">
+                <a:tc>
+                  <a:txBody>
+                    <a:bodyPr/>
+                    <a:lstStyle/>
+                    <a:p>
+                      <a:r>
+                        <a:rPr lang="nl-NL" noProof="0" dirty="0"/>
+                        <a:t>Naam</a:t>
+                      </a:r>
+                    </a:p>
+                  </a:txBody>
+                  <a:tcPr/>
+                </a:tc>
+                <a:extLst>
+                  <a:ext uri="{0D108BD9-81ED-4DB2-BD59-A6C34878D82A}">
+                    <a16:rowId xmlns:a16="http://schemas.microsoft.com/office/drawing/2014/main" val="3674785774"/>
+                  </a:ext>
+                </a:extLst>
+              </a:tr>
+              <a:tr h="370840">
+                <a:tc>
+                  <a:txBody>
+                    <a:bodyPr/>
+                    <a:lstStyle/>
+                    <a:p>
+                      <a:r>
+                        <a:rPr lang="nl-NL" noProof="0" dirty="0"/>
+                        <a:t>Omschrijving</a:t>
+                      </a:r>
+                    </a:p>
+                  </a:txBody>
+                  <a:tcPr/>
+                </a:tc>
+                <a:extLst>
+                  <a:ext uri="{0D108BD9-81ED-4DB2-BD59-A6C34878D82A}">
+                    <a16:rowId xmlns:a16="http://schemas.microsoft.com/office/drawing/2014/main" val="2335262126"/>
+                  </a:ext>
+                </a:extLst>
+              </a:tr>
+              <a:tr h="370840">
+                <a:tc>
+                  <a:txBody>
+                    <a:bodyPr/>
+                    <a:lstStyle/>
+                    <a:p>
+                      <a:r>
+                        <a:rPr lang="nl-NL" noProof="0" dirty="0"/>
+                        <a:t>…</a:t>
+                      </a:r>
+                    </a:p>
+                  </a:txBody>
+                  <a:tcPr/>
+                </a:tc>
+                <a:extLst>
+                  <a:ext uri="{0D108BD9-81ED-4DB2-BD59-A6C34878D82A}">
+                    <a16:rowId xmlns:a16="http://schemas.microsoft.com/office/drawing/2014/main" val="2163937255"/>
+                  </a:ext>
+                </a:extLst>
+              </a:tr>
+            </a:tbl>
+          </a:graphicData>
+        </a:graphic>
+      </p:graphicFrame>
+      <p:cxnSp>
+        <p:nvCxnSpPr>
+          <p:cNvPr id="14" name="Straight Arrow Connector 13">
+            <a:extLst>
+              <a:ext uri="{FF2B5EF4-FFF2-40B4-BE49-F238E27FC236}">
+                <a16:creationId xmlns:a16="http://schemas.microsoft.com/office/drawing/2014/main" id="{90F9FA4A-B9A7-DF68-B995-366AE423C670}"/>
+              </a:ext>
+            </a:extLst>
+          </p:cNvPr>
+          <p:cNvCxnSpPr/>
+          <p:nvPr/>
+        </p:nvCxnSpPr>
+        <p:spPr>
+          <a:xfrm>
+            <a:off x="2809188" y="3476135"/>
+            <a:ext cx="1466652" cy="0"/>
+          </a:xfrm>
+          <a:prstGeom prst="straightConnector1">
+            <a:avLst/>
+          </a:prstGeom>
+          <a:ln>
+            <a:headEnd type="triangle"/>
+            <a:tailEnd type="triangle"/>
+          </a:ln>
+        </p:spPr>
+        <p:style>
+          <a:lnRef idx="3">
+            <a:schemeClr val="dk1"/>
+          </a:lnRef>
+          <a:fillRef idx="0">
+            <a:schemeClr val="dk1"/>
+          </a:fillRef>
+          <a:effectRef idx="2">
+            <a:schemeClr val="dk1"/>
+          </a:effectRef>
+          <a:fontRef idx="minor">
+            <a:schemeClr val="tx1"/>
+          </a:fontRef>
+        </p:style>
+      </p:cxnSp>
+      <p:cxnSp>
+        <p:nvCxnSpPr>
+          <p:cNvPr id="17" name="Connector: Elbow 16">
+            <a:extLst>
+              <a:ext uri="{FF2B5EF4-FFF2-40B4-BE49-F238E27FC236}">
+                <a16:creationId xmlns:a16="http://schemas.microsoft.com/office/drawing/2014/main" id="{48D8C0B7-30C2-E9CA-33E3-8FECE2876D14}"/>
+              </a:ext>
+            </a:extLst>
+          </p:cNvPr>
+          <p:cNvCxnSpPr/>
+          <p:nvPr/>
+        </p:nvCxnSpPr>
+        <p:spPr>
+          <a:xfrm flipV="1">
+            <a:off x="6096000" y="3476135"/>
+            <a:ext cx="1466652" cy="377146"/>
+          </a:xfrm>
+          <a:prstGeom prst="bentConnector3">
+            <a:avLst/>
+          </a:prstGeom>
+          <a:ln>
+            <a:headEnd type="triangle"/>
+            <a:tailEnd type="triangle"/>
+          </a:ln>
+        </p:spPr>
+        <p:style>
+          <a:lnRef idx="3">
+            <a:schemeClr val="dk1"/>
+          </a:lnRef>
+          <a:fillRef idx="0">
+            <a:schemeClr val="dk1"/>
+          </a:fillRef>
+          <a:effectRef idx="2">
+            <a:schemeClr val="dk1"/>
+          </a:effectRef>
+          <a:fontRef idx="minor">
+            <a:schemeClr val="tx1"/>
+          </a:fontRef>
+        </p:style>
+      </p:cxnSp>
+    </p:spTree>
+    <p:extLst>
+      <p:ext uri="{BB962C8B-B14F-4D97-AF65-F5344CB8AC3E}">
+        <p14:creationId xmlns:p14="http://schemas.microsoft.com/office/powerpoint/2010/main" val="2320990652"/>
+      </p:ext>
+    </p:extLst>
+  </p:cSld>
+  <p:clrMapOvr>
+    <a:masterClrMapping/>
+  </p:clrMapOvr>
+</p:sld>
+</file>
+
+<file path=ppt/slides/slide40.xml><?xml version="1.0" encoding="utf-8"?>
 <p:sld xmlns:a="http://schemas.openxmlformats.org/drawingml/2006/main" xmlns:r="http://schemas.openxmlformats.org/officeDocument/2006/relationships" xmlns:p="http://schemas.openxmlformats.org/presentationml/2006/main">
   <p:cSld>
     <p:spTree>
@@ -20284,611 +21063,6 @@
 </p:sld>
 </file>
 
-<file path=ppt/slides/slide4.xml><?xml version="1.0" encoding="utf-8"?>
-<p:sld xmlns:a="http://schemas.openxmlformats.org/drawingml/2006/main" xmlns:r="http://schemas.openxmlformats.org/officeDocument/2006/relationships" xmlns:p="http://schemas.openxmlformats.org/presentationml/2006/main">
-  <p:cSld>
-    <p:spTree>
-      <p:nvGrpSpPr>
-        <p:cNvPr id="1" name=""/>
-        <p:cNvGrpSpPr/>
-        <p:nvPr/>
-      </p:nvGrpSpPr>
-      <p:grpSpPr>
-        <a:xfrm>
-          <a:off x="0" y="0"/>
-          <a:ext cx="0" cy="0"/>
-          <a:chOff x="0" y="0"/>
-          <a:chExt cx="0" cy="0"/>
-        </a:xfrm>
-      </p:grpSpPr>
-      <p:sp>
-        <p:nvSpPr>
-          <p:cNvPr id="2" name="Title 1">
-            <a:extLst>
-              <a:ext uri="{FF2B5EF4-FFF2-40B4-BE49-F238E27FC236}">
-                <a16:creationId xmlns:a16="http://schemas.microsoft.com/office/drawing/2014/main" id="{9BDFD261-0D2C-41B9-9E28-43DF575D40E0}"/>
-              </a:ext>
-            </a:extLst>
-          </p:cNvPr>
-          <p:cNvSpPr>
-            <a:spLocks noGrp="1"/>
-          </p:cNvSpPr>
-          <p:nvPr>
-            <p:ph type="title"/>
-          </p:nvPr>
-        </p:nvSpPr>
-        <p:spPr/>
-        <p:txBody>
-          <a:bodyPr>
-            <a:normAutofit/>
-          </a:bodyPr>
-          <a:lstStyle/>
-          <a:p>
-            <a:r>
-              <a:rPr lang="nl-NL" sz="3600" dirty="0"/>
-              <a:t>Relaties tussen tabellen</a:t>
-            </a:r>
-          </a:p>
-        </p:txBody>
-      </p:sp>
-      <p:sp>
-        <p:nvSpPr>
-          <p:cNvPr id="3" name="Content Placeholder 2">
-            <a:extLst>
-              <a:ext uri="{FF2B5EF4-FFF2-40B4-BE49-F238E27FC236}">
-                <a16:creationId xmlns:a16="http://schemas.microsoft.com/office/drawing/2014/main" id="{7844B503-C44F-453E-9465-D42E4557DE0C}"/>
-              </a:ext>
-            </a:extLst>
-          </p:cNvPr>
-          <p:cNvSpPr>
-            <a:spLocks noGrp="1"/>
-          </p:cNvSpPr>
-          <p:nvPr>
-            <p:ph idx="1"/>
-          </p:nvPr>
-        </p:nvSpPr>
-        <p:spPr>
-          <a:xfrm>
-            <a:off x="838199" y="1825625"/>
-            <a:ext cx="10442825" cy="4351338"/>
-          </a:xfrm>
-        </p:spPr>
-        <p:txBody>
-          <a:bodyPr>
-            <a:normAutofit/>
-          </a:bodyPr>
-          <a:lstStyle/>
-          <a:p>
-            <a:pPr marL="0" indent="0">
-              <a:buNone/>
-            </a:pPr>
-            <a:r>
-              <a:rPr lang="nl-NL" sz="2000" dirty="0"/>
-              <a:t>Tabellen kunnen relaties hebben:</a:t>
-            </a:r>
-          </a:p>
-          <a:p>
-            <a:pPr marL="0" indent="0">
-              <a:buNone/>
-            </a:pPr>
-            <a:endParaRPr lang="nl-NL" sz="2000" dirty="0"/>
-          </a:p>
-          <a:p>
-            <a:pPr marL="0" indent="0">
-              <a:buNone/>
-            </a:pPr>
-            <a:endParaRPr lang="nl-NL" sz="2000" dirty="0"/>
-          </a:p>
-        </p:txBody>
-      </p:sp>
-      <p:graphicFrame>
-        <p:nvGraphicFramePr>
-          <p:cNvPr id="4" name="Table 5">
-            <a:extLst>
-              <a:ext uri="{FF2B5EF4-FFF2-40B4-BE49-F238E27FC236}">
-                <a16:creationId xmlns:a16="http://schemas.microsoft.com/office/drawing/2014/main" id="{62CA46F3-D9D4-4F4A-856A-A943EE0F0F0C}"/>
-              </a:ext>
-            </a:extLst>
-          </p:cNvPr>
-          <p:cNvGraphicFramePr>
-            <a:graphicFrameLocks noGrp="1"/>
-          </p:cNvGraphicFramePr>
-          <p:nvPr/>
-        </p:nvGraphicFramePr>
-        <p:xfrm>
-          <a:off x="989028" y="2928721"/>
-          <a:ext cx="1820160" cy="1849120"/>
-        </p:xfrm>
-        <a:graphic>
-          <a:graphicData uri="http://schemas.openxmlformats.org/drawingml/2006/table">
-            <a:tbl>
-              <a:tblPr firstRow="1" bandRow="1">
-                <a:tableStyleId>{5C22544A-7EE6-4342-B048-85BDC9FD1C3A}</a:tableStyleId>
-              </a:tblPr>
-              <a:tblGrid>
-                <a:gridCol w="1820160">
-                  <a:extLst>
-                    <a:ext uri="{9D8B030D-6E8A-4147-A177-3AD203B41FA5}">
-                      <a16:colId xmlns:a16="http://schemas.microsoft.com/office/drawing/2014/main" val="2508677333"/>
-                    </a:ext>
-                  </a:extLst>
-                </a:gridCol>
-              </a:tblGrid>
-              <a:tr h="0">
-                <a:tc>
-                  <a:txBody>
-                    <a:bodyPr/>
-                    <a:lstStyle/>
-                    <a:p>
-                      <a:r>
-                        <a:rPr lang="nl-NL" noProof="0" dirty="0"/>
-                        <a:t>Klanten</a:t>
-                      </a:r>
-                    </a:p>
-                  </a:txBody>
-                  <a:tcPr/>
-                </a:tc>
-                <a:extLst>
-                  <a:ext uri="{0D108BD9-81ED-4DB2-BD59-A6C34878D82A}">
-                    <a16:rowId xmlns:a16="http://schemas.microsoft.com/office/drawing/2014/main" val="858791041"/>
-                  </a:ext>
-                </a:extLst>
-              </a:tr>
-              <a:tr h="370840">
-                <a:tc>
-                  <a:txBody>
-                    <a:bodyPr/>
-                    <a:lstStyle/>
-                    <a:p>
-                      <a:r>
-                        <a:rPr lang="nl-NL" noProof="0" dirty="0" err="1"/>
-                        <a:t>KlantID</a:t>
-                      </a:r>
-                      <a:endParaRPr lang="nl-NL" noProof="0" dirty="0"/>
-                    </a:p>
-                  </a:txBody>
-                  <a:tcPr/>
-                </a:tc>
-                <a:extLst>
-                  <a:ext uri="{0D108BD9-81ED-4DB2-BD59-A6C34878D82A}">
-                    <a16:rowId xmlns:a16="http://schemas.microsoft.com/office/drawing/2014/main" val="1538811982"/>
-                  </a:ext>
-                </a:extLst>
-              </a:tr>
-              <a:tr h="370840">
-                <a:tc>
-                  <a:txBody>
-                    <a:bodyPr/>
-                    <a:lstStyle/>
-                    <a:p>
-                      <a:r>
-                        <a:rPr lang="nl-NL" noProof="0"/>
-                        <a:t>Voornaam</a:t>
-                      </a:r>
-                    </a:p>
-                  </a:txBody>
-                  <a:tcPr/>
-                </a:tc>
-                <a:extLst>
-                  <a:ext uri="{0D108BD9-81ED-4DB2-BD59-A6C34878D82A}">
-                    <a16:rowId xmlns:a16="http://schemas.microsoft.com/office/drawing/2014/main" val="3674785774"/>
-                  </a:ext>
-                </a:extLst>
-              </a:tr>
-              <a:tr h="370840">
-                <a:tc>
-                  <a:txBody>
-                    <a:bodyPr/>
-                    <a:lstStyle/>
-                    <a:p>
-                      <a:r>
-                        <a:rPr lang="nl-NL" noProof="0"/>
-                        <a:t>Achternaam</a:t>
-                      </a:r>
-                    </a:p>
-                  </a:txBody>
-                  <a:tcPr/>
-                </a:tc>
-                <a:extLst>
-                  <a:ext uri="{0D108BD9-81ED-4DB2-BD59-A6C34878D82A}">
-                    <a16:rowId xmlns:a16="http://schemas.microsoft.com/office/drawing/2014/main" val="2335262126"/>
-                  </a:ext>
-                </a:extLst>
-              </a:tr>
-              <a:tr h="370840">
-                <a:tc>
-                  <a:txBody>
-                    <a:bodyPr/>
-                    <a:lstStyle/>
-                    <a:p>
-                      <a:r>
-                        <a:rPr lang="nl-NL" noProof="0" dirty="0"/>
-                        <a:t>…</a:t>
-                      </a:r>
-                    </a:p>
-                  </a:txBody>
-                  <a:tcPr/>
-                </a:tc>
-                <a:extLst>
-                  <a:ext uri="{0D108BD9-81ED-4DB2-BD59-A6C34878D82A}">
-                    <a16:rowId xmlns:a16="http://schemas.microsoft.com/office/drawing/2014/main" val="2163937255"/>
-                  </a:ext>
-                </a:extLst>
-              </a:tr>
-            </a:tbl>
-          </a:graphicData>
-        </a:graphic>
-      </p:graphicFrame>
-      <p:graphicFrame>
-        <p:nvGraphicFramePr>
-          <p:cNvPr id="5" name="Table 5">
-            <a:extLst>
-              <a:ext uri="{FF2B5EF4-FFF2-40B4-BE49-F238E27FC236}">
-                <a16:creationId xmlns:a16="http://schemas.microsoft.com/office/drawing/2014/main" id="{2F81CE1D-F9ED-02C0-0A6D-49B2EC941B4F}"/>
-              </a:ext>
-            </a:extLst>
-          </p:cNvPr>
-          <p:cNvGraphicFramePr>
-            <a:graphicFrameLocks noGrp="1"/>
-          </p:cNvGraphicFramePr>
-          <p:nvPr/>
-        </p:nvGraphicFramePr>
-        <p:xfrm>
-          <a:off x="4275840" y="2928721"/>
-          <a:ext cx="1820160" cy="1849120"/>
-        </p:xfrm>
-        <a:graphic>
-          <a:graphicData uri="http://schemas.openxmlformats.org/drawingml/2006/table">
-            <a:tbl>
-              <a:tblPr firstRow="1" bandRow="1">
-                <a:tableStyleId>{5C22544A-7EE6-4342-B048-85BDC9FD1C3A}</a:tableStyleId>
-              </a:tblPr>
-              <a:tblGrid>
-                <a:gridCol w="1820160">
-                  <a:extLst>
-                    <a:ext uri="{9D8B030D-6E8A-4147-A177-3AD203B41FA5}">
-                      <a16:colId xmlns:a16="http://schemas.microsoft.com/office/drawing/2014/main" val="2508677333"/>
-                    </a:ext>
-                  </a:extLst>
-                </a:gridCol>
-              </a:tblGrid>
-              <a:tr h="0">
-                <a:tc>
-                  <a:txBody>
-                    <a:bodyPr/>
-                    <a:lstStyle/>
-                    <a:p>
-                      <a:r>
-                        <a:rPr lang="nl-NL" noProof="0" dirty="0"/>
-                        <a:t>Transacties</a:t>
-                      </a:r>
-                    </a:p>
-                  </a:txBody>
-                  <a:tcPr/>
-                </a:tc>
-                <a:extLst>
-                  <a:ext uri="{0D108BD9-81ED-4DB2-BD59-A6C34878D82A}">
-                    <a16:rowId xmlns:a16="http://schemas.microsoft.com/office/drawing/2014/main" val="858791041"/>
-                  </a:ext>
-                </a:extLst>
-              </a:tr>
-              <a:tr h="370840">
-                <a:tc>
-                  <a:txBody>
-                    <a:bodyPr/>
-                    <a:lstStyle/>
-                    <a:p>
-                      <a:r>
-                        <a:rPr lang="nl-NL" noProof="0" dirty="0" err="1"/>
-                        <a:t>KlantID</a:t>
-                      </a:r>
-                      <a:endParaRPr lang="nl-NL" noProof="0" dirty="0"/>
-                    </a:p>
-                  </a:txBody>
-                  <a:tcPr/>
-                </a:tc>
-                <a:extLst>
-                  <a:ext uri="{0D108BD9-81ED-4DB2-BD59-A6C34878D82A}">
-                    <a16:rowId xmlns:a16="http://schemas.microsoft.com/office/drawing/2014/main" val="1538811982"/>
-                  </a:ext>
-                </a:extLst>
-              </a:tr>
-              <a:tr h="370840">
-                <a:tc>
-                  <a:txBody>
-                    <a:bodyPr/>
-                    <a:lstStyle/>
-                    <a:p>
-                      <a:r>
-                        <a:rPr lang="nl-NL" noProof="0" dirty="0" err="1"/>
-                        <a:t>ArtikelID</a:t>
-                      </a:r>
-                      <a:endParaRPr lang="nl-NL" noProof="0" dirty="0"/>
-                    </a:p>
-                  </a:txBody>
-                  <a:tcPr/>
-                </a:tc>
-                <a:extLst>
-                  <a:ext uri="{0D108BD9-81ED-4DB2-BD59-A6C34878D82A}">
-                    <a16:rowId xmlns:a16="http://schemas.microsoft.com/office/drawing/2014/main" val="3674785774"/>
-                  </a:ext>
-                </a:extLst>
-              </a:tr>
-              <a:tr h="370840">
-                <a:tc>
-                  <a:txBody>
-                    <a:bodyPr/>
-                    <a:lstStyle/>
-                    <a:p>
-                      <a:r>
-                        <a:rPr lang="nl-NL" noProof="0" dirty="0"/>
-                        <a:t>Aantal</a:t>
-                      </a:r>
-                    </a:p>
-                  </a:txBody>
-                  <a:tcPr/>
-                </a:tc>
-                <a:extLst>
-                  <a:ext uri="{0D108BD9-81ED-4DB2-BD59-A6C34878D82A}">
-                    <a16:rowId xmlns:a16="http://schemas.microsoft.com/office/drawing/2014/main" val="2335262126"/>
-                  </a:ext>
-                </a:extLst>
-              </a:tr>
-              <a:tr h="370840">
-                <a:tc>
-                  <a:txBody>
-                    <a:bodyPr/>
-                    <a:lstStyle/>
-                    <a:p>
-                      <a:r>
-                        <a:rPr lang="nl-NL" noProof="0" dirty="0"/>
-                        <a:t>…</a:t>
-                      </a:r>
-                    </a:p>
-                  </a:txBody>
-                  <a:tcPr/>
-                </a:tc>
-                <a:extLst>
-                  <a:ext uri="{0D108BD9-81ED-4DB2-BD59-A6C34878D82A}">
-                    <a16:rowId xmlns:a16="http://schemas.microsoft.com/office/drawing/2014/main" val="2163937255"/>
-                  </a:ext>
-                </a:extLst>
-              </a:tr>
-            </a:tbl>
-          </a:graphicData>
-        </a:graphic>
-      </p:graphicFrame>
-      <p:graphicFrame>
-        <p:nvGraphicFramePr>
-          <p:cNvPr id="8" name="Table 5">
-            <a:extLst>
-              <a:ext uri="{FF2B5EF4-FFF2-40B4-BE49-F238E27FC236}">
-                <a16:creationId xmlns:a16="http://schemas.microsoft.com/office/drawing/2014/main" id="{F4917DC8-4826-215A-40A2-62AE8EF1EFDB}"/>
-              </a:ext>
-            </a:extLst>
-          </p:cNvPr>
-          <p:cNvGraphicFramePr>
-            <a:graphicFrameLocks noGrp="1"/>
-          </p:cNvGraphicFramePr>
-          <p:nvPr/>
-        </p:nvGraphicFramePr>
-        <p:xfrm>
-          <a:off x="7562652" y="2928721"/>
-          <a:ext cx="1820160" cy="1849120"/>
-        </p:xfrm>
-        <a:graphic>
-          <a:graphicData uri="http://schemas.openxmlformats.org/drawingml/2006/table">
-            <a:tbl>
-              <a:tblPr firstRow="1" bandRow="1">
-                <a:tableStyleId>{5C22544A-7EE6-4342-B048-85BDC9FD1C3A}</a:tableStyleId>
-              </a:tblPr>
-              <a:tblGrid>
-                <a:gridCol w="1820160">
-                  <a:extLst>
-                    <a:ext uri="{9D8B030D-6E8A-4147-A177-3AD203B41FA5}">
-                      <a16:colId xmlns:a16="http://schemas.microsoft.com/office/drawing/2014/main" val="2508677333"/>
-                    </a:ext>
-                  </a:extLst>
-                </a:gridCol>
-              </a:tblGrid>
-              <a:tr h="0">
-                <a:tc>
-                  <a:txBody>
-                    <a:bodyPr/>
-                    <a:lstStyle/>
-                    <a:p>
-                      <a:r>
-                        <a:rPr lang="nl-NL" noProof="0" dirty="0"/>
-                        <a:t>Artikelen</a:t>
-                      </a:r>
-                    </a:p>
-                  </a:txBody>
-                  <a:tcPr/>
-                </a:tc>
-                <a:extLst>
-                  <a:ext uri="{0D108BD9-81ED-4DB2-BD59-A6C34878D82A}">
-                    <a16:rowId xmlns:a16="http://schemas.microsoft.com/office/drawing/2014/main" val="858791041"/>
-                  </a:ext>
-                </a:extLst>
-              </a:tr>
-              <a:tr h="370840">
-                <a:tc>
-                  <a:txBody>
-                    <a:bodyPr/>
-                    <a:lstStyle/>
-                    <a:p>
-                      <a:r>
-                        <a:rPr lang="nl-NL" noProof="0" dirty="0" err="1"/>
-                        <a:t>ArtikelID</a:t>
-                      </a:r>
-                      <a:endParaRPr lang="nl-NL" noProof="0" dirty="0"/>
-                    </a:p>
-                  </a:txBody>
-                  <a:tcPr/>
-                </a:tc>
-                <a:extLst>
-                  <a:ext uri="{0D108BD9-81ED-4DB2-BD59-A6C34878D82A}">
-                    <a16:rowId xmlns:a16="http://schemas.microsoft.com/office/drawing/2014/main" val="1538811982"/>
-                  </a:ext>
-                </a:extLst>
-              </a:tr>
-              <a:tr h="370840">
-                <a:tc>
-                  <a:txBody>
-                    <a:bodyPr/>
-                    <a:lstStyle/>
-                    <a:p>
-                      <a:r>
-                        <a:rPr lang="nl-NL" noProof="0" dirty="0"/>
-                        <a:t>PLU</a:t>
-                      </a:r>
-                    </a:p>
-                  </a:txBody>
-                  <a:tcPr/>
-                </a:tc>
-                <a:extLst>
-                  <a:ext uri="{0D108BD9-81ED-4DB2-BD59-A6C34878D82A}">
-                    <a16:rowId xmlns:a16="http://schemas.microsoft.com/office/drawing/2014/main" val="3674785774"/>
-                  </a:ext>
-                </a:extLst>
-              </a:tr>
-              <a:tr h="370840">
-                <a:tc>
-                  <a:txBody>
-                    <a:bodyPr/>
-                    <a:lstStyle/>
-                    <a:p>
-                      <a:r>
-                        <a:rPr lang="nl-NL" noProof="0" dirty="0"/>
-                        <a:t>Omschrijving</a:t>
-                      </a:r>
-                    </a:p>
-                  </a:txBody>
-                  <a:tcPr/>
-                </a:tc>
-                <a:extLst>
-                  <a:ext uri="{0D108BD9-81ED-4DB2-BD59-A6C34878D82A}">
-                    <a16:rowId xmlns:a16="http://schemas.microsoft.com/office/drawing/2014/main" val="2335262126"/>
-                  </a:ext>
-                </a:extLst>
-              </a:tr>
-              <a:tr h="370840">
-                <a:tc>
-                  <a:txBody>
-                    <a:bodyPr/>
-                    <a:lstStyle/>
-                    <a:p>
-                      <a:r>
-                        <a:rPr lang="nl-NL" noProof="0" dirty="0"/>
-                        <a:t>…</a:t>
-                      </a:r>
-                    </a:p>
-                  </a:txBody>
-                  <a:tcPr/>
-                </a:tc>
-                <a:extLst>
-                  <a:ext uri="{0D108BD9-81ED-4DB2-BD59-A6C34878D82A}">
-                    <a16:rowId xmlns:a16="http://schemas.microsoft.com/office/drawing/2014/main" val="2163937255"/>
-                  </a:ext>
-                </a:extLst>
-              </a:tr>
-            </a:tbl>
-          </a:graphicData>
-        </a:graphic>
-      </p:graphicFrame>
-      <p:cxnSp>
-        <p:nvCxnSpPr>
-          <p:cNvPr id="14" name="Straight Arrow Connector 13">
-            <a:extLst>
-              <a:ext uri="{FF2B5EF4-FFF2-40B4-BE49-F238E27FC236}">
-                <a16:creationId xmlns:a16="http://schemas.microsoft.com/office/drawing/2014/main" id="{90F9FA4A-B9A7-DF68-B995-366AE423C670}"/>
-              </a:ext>
-            </a:extLst>
-          </p:cNvPr>
-          <p:cNvCxnSpPr/>
-          <p:nvPr/>
-        </p:nvCxnSpPr>
-        <p:spPr>
-          <a:xfrm>
-            <a:off x="2809188" y="3476135"/>
-            <a:ext cx="1466652" cy="0"/>
-          </a:xfrm>
-          <a:prstGeom prst="straightConnector1">
-            <a:avLst/>
-          </a:prstGeom>
-          <a:ln>
-            <a:headEnd type="triangle"/>
-            <a:tailEnd type="triangle"/>
-          </a:ln>
-        </p:spPr>
-        <p:style>
-          <a:lnRef idx="3">
-            <a:schemeClr val="dk1"/>
-          </a:lnRef>
-          <a:fillRef idx="0">
-            <a:schemeClr val="dk1"/>
-          </a:fillRef>
-          <a:effectRef idx="2">
-            <a:schemeClr val="dk1"/>
-          </a:effectRef>
-          <a:fontRef idx="minor">
-            <a:schemeClr val="tx1"/>
-          </a:fontRef>
-        </p:style>
-      </p:cxnSp>
-      <p:cxnSp>
-        <p:nvCxnSpPr>
-          <p:cNvPr id="17" name="Connector: Elbow 16">
-            <a:extLst>
-              <a:ext uri="{FF2B5EF4-FFF2-40B4-BE49-F238E27FC236}">
-                <a16:creationId xmlns:a16="http://schemas.microsoft.com/office/drawing/2014/main" id="{48D8C0B7-30C2-E9CA-33E3-8FECE2876D14}"/>
-              </a:ext>
-            </a:extLst>
-          </p:cNvPr>
-          <p:cNvCxnSpPr/>
-          <p:nvPr/>
-        </p:nvCxnSpPr>
-        <p:spPr>
-          <a:xfrm flipV="1">
-            <a:off x="6096000" y="3476135"/>
-            <a:ext cx="1466652" cy="377146"/>
-          </a:xfrm>
-          <a:prstGeom prst="bentConnector3">
-            <a:avLst/>
-          </a:prstGeom>
-          <a:ln>
-            <a:headEnd type="triangle"/>
-            <a:tailEnd type="triangle"/>
-          </a:ln>
-        </p:spPr>
-        <p:style>
-          <a:lnRef idx="3">
-            <a:schemeClr val="dk1"/>
-          </a:lnRef>
-          <a:fillRef idx="0">
-            <a:schemeClr val="dk1"/>
-          </a:fillRef>
-          <a:effectRef idx="2">
-            <a:schemeClr val="dk1"/>
-          </a:effectRef>
-          <a:fontRef idx="minor">
-            <a:schemeClr val="tx1"/>
-          </a:fontRef>
-        </p:style>
-      </p:cxnSp>
-    </p:spTree>
-    <p:extLst>
-      <p:ext uri="{BB962C8B-B14F-4D97-AF65-F5344CB8AC3E}">
-        <p14:creationId xmlns:p14="http://schemas.microsoft.com/office/powerpoint/2010/main" val="2320990652"/>
-      </p:ext>
-    </p:extLst>
-  </p:cSld>
-  <p:clrMapOvr>
-    <a:masterClrMapping/>
-  </p:clrMapOvr>
-</p:sld>
-</file>
-
 <file path=ppt/slides/slide5.xml><?xml version="1.0" encoding="utf-8"?>
 <p:sld xmlns:a="http://schemas.openxmlformats.org/drawingml/2006/main" xmlns:r="http://schemas.openxmlformats.org/officeDocument/2006/relationships" xmlns:p="http://schemas.openxmlformats.org/presentationml/2006/main">
   <p:cSld>
@@ -20951,14 +21125,14 @@
           <p:nvPr>
             <p:extLst>
               <p:ext uri="{D42A27DB-BD31-4B8C-83A1-F6EECF244321}">
-                <p14:modId xmlns:p14="http://schemas.microsoft.com/office/powerpoint/2010/main" val="2365856763"/>
+                <p14:modId xmlns:p14="http://schemas.microsoft.com/office/powerpoint/2010/main" val="1334893465"/>
               </p:ext>
             </p:extLst>
           </p:nvPr>
         </p:nvGraphicFramePr>
         <p:xfrm>
-          <a:off x="838199" y="1825623"/>
-          <a:ext cx="10442826" cy="4424348"/>
+          <a:off x="838200" y="1635709"/>
+          <a:ext cx="10442826" cy="4651968"/>
         </p:xfrm>
         <a:graphic>
           <a:graphicData uri="http://schemas.openxmlformats.org/drawingml/2006/table">
@@ -20967,21 +21141,21 @@
                 <a:tableStyleId>{5C22544A-7EE6-4342-B048-85BDC9FD1C3A}</a:tableStyleId>
               </a:tblPr>
               <a:tblGrid>
-                <a:gridCol w="3480942">
+                <a:gridCol w="1693986">
                   <a:extLst>
                     <a:ext uri="{9D8B030D-6E8A-4147-A177-3AD203B41FA5}">
                       <a16:colId xmlns:a16="http://schemas.microsoft.com/office/drawing/2014/main" val="2462131715"/>
                     </a:ext>
                   </a:extLst>
                 </a:gridCol>
-                <a:gridCol w="3480942">
+                <a:gridCol w="4192172">
                   <a:extLst>
                     <a:ext uri="{9D8B030D-6E8A-4147-A177-3AD203B41FA5}">
                       <a16:colId xmlns:a16="http://schemas.microsoft.com/office/drawing/2014/main" val="2197458734"/>
                     </a:ext>
                   </a:extLst>
                 </a:gridCol>
-                <a:gridCol w="3480942">
+                <a:gridCol w="4556668">
                   <a:extLst>
                     <a:ext uri="{9D8B030D-6E8A-4147-A177-3AD203B41FA5}">
                       <a16:colId xmlns:a16="http://schemas.microsoft.com/office/drawing/2014/main" val="1150342863"/>
@@ -21056,7 +21230,7 @@
                     <a:p>
                       <a:r>
                         <a:rPr lang="nl-NL" noProof="0" dirty="0"/>
-                        <a:t>Een persoon heeft één roepnaam.</a:t>
+                        <a:t>Klant heeft één achternaam.</a:t>
                       </a:r>
                     </a:p>
                   </a:txBody>
@@ -21069,7 +21243,18 @@
                     <a:p>
                       <a:r>
                         <a:rPr lang="nl-NL" noProof="0" dirty="0"/>
-                        <a:t>Kan in dezelfde tabel.</a:t>
+                        <a:t>Kan in één tabel (</a:t>
+                      </a:r>
+                      <a:r>
+                        <a:rPr lang="nl-NL" noProof="0" dirty="0">
+                          <a:latin typeface="Courier New" panose="02070309020205020404" pitchFamily="49" charset="0"/>
+                          <a:cs typeface="Courier New" panose="02070309020205020404" pitchFamily="49" charset="0"/>
+                        </a:rPr>
+                        <a:t>Klanten</a:t>
+                      </a:r>
+                      <a:r>
+                        <a:rPr lang="nl-NL" noProof="0" dirty="0"/>
+                        <a:t>).</a:t>
                       </a:r>
                     </a:p>
                   </a:txBody>
@@ -21081,7 +21266,7 @@
                   </a:ext>
                 </a:extLst>
               </a:tr>
-              <a:tr h="1113249">
+              <a:tr h="1340869">
                 <a:tc>
                   <a:txBody>
                     <a:bodyPr/>
@@ -21102,7 +21287,16 @@
                     <a:p>
                       <a:r>
                         <a:rPr lang="nl-NL" noProof="0" dirty="0"/>
-                        <a:t>Een persoon kan meerdere transacties hebben.</a:t>
+                        <a:t>Klant kan meerdere transacties hebben.</a:t>
+                      </a:r>
+                    </a:p>
+                    <a:p>
+                      <a:endParaRPr lang="nl-NL" noProof="0" dirty="0"/>
+                    </a:p>
+                    <a:p>
+                      <a:r>
+                        <a:rPr lang="nl-NL" noProof="0" dirty="0"/>
+                        <a:t>Een transactie hoort maar bij één klant.</a:t>
                       </a:r>
                     </a:p>
                   </a:txBody>
@@ -21115,7 +21309,29 @@
                     <a:p>
                       <a:r>
                         <a:rPr lang="nl-NL" noProof="0" dirty="0"/>
-                        <a:t>Twee tabellen met verwijzende sleutel.</a:t>
+                        <a:t>Twee tabellen (</a:t>
+                      </a:r>
+                      <a:r>
+                        <a:rPr lang="nl-NL" noProof="0" dirty="0">
+                          <a:latin typeface="Courier New" panose="02070309020205020404" pitchFamily="49" charset="0"/>
+                          <a:cs typeface="Courier New" panose="02070309020205020404" pitchFamily="49" charset="0"/>
+                        </a:rPr>
+                        <a:t>Klanten</a:t>
+                      </a:r>
+                      <a:r>
+                        <a:rPr lang="nl-NL" noProof="0" dirty="0"/>
+                        <a:t>, </a:t>
+                      </a:r>
+                      <a:r>
+                        <a:rPr lang="nl-NL" noProof="0" dirty="0">
+                          <a:latin typeface="Courier New" panose="02070309020205020404" pitchFamily="49" charset="0"/>
+                          <a:cs typeface="Courier New" panose="02070309020205020404" pitchFamily="49" charset="0"/>
+                        </a:rPr>
+                        <a:t>Transacties</a:t>
+                      </a:r>
+                      <a:r>
+                        <a:rPr lang="nl-NL" noProof="0" dirty="0"/>
+                        <a:t>) met gekoppelde sleutel.</a:t>
                       </a:r>
                     </a:p>
                   </a:txBody>
@@ -21148,7 +21364,7 @@
                     <a:p>
                       <a:r>
                         <a:rPr lang="nl-NL" noProof="0" dirty="0"/>
-                        <a:t>Een artikel kan in meerdere transacties voorkomen.</a:t>
+                        <a:t>Een product kan in meerdere transacties voorkomen.</a:t>
                       </a:r>
                     </a:p>
                     <a:p>
@@ -21157,7 +21373,7 @@
                     <a:p>
                       <a:r>
                         <a:rPr lang="nl-NL" noProof="0" dirty="0"/>
-                        <a:t>Een transactie kan meerdere artikelen omvatten.</a:t>
+                        <a:t>Een transactie kan meerdere producten omvatten.</a:t>
                       </a:r>
                     </a:p>
                   </a:txBody>
@@ -21170,7 +21386,40 @@
                     <a:p>
                       <a:r>
                         <a:rPr lang="nl-NL" noProof="0" dirty="0"/>
-                        <a:t>Twee tabellen met een koppeltabel er tussen.</a:t>
+                        <a:t>Twee tabellen (</a:t>
+                      </a:r>
+                      <a:r>
+                        <a:rPr lang="nl-NL" noProof="0" dirty="0">
+                          <a:latin typeface="Courier New" panose="02070309020205020404" pitchFamily="49" charset="0"/>
+                          <a:cs typeface="Courier New" panose="02070309020205020404" pitchFamily="49" charset="0"/>
+                        </a:rPr>
+                        <a:t>Transacties</a:t>
+                      </a:r>
+                      <a:r>
+                        <a:rPr lang="nl-NL" noProof="0" dirty="0"/>
+                        <a:t>, </a:t>
+                      </a:r>
+                      <a:r>
+                        <a:rPr lang="nl-NL" noProof="0" dirty="0">
+                          <a:latin typeface="Courier New" panose="02070309020205020404" pitchFamily="49" charset="0"/>
+                          <a:cs typeface="Courier New" panose="02070309020205020404" pitchFamily="49" charset="0"/>
+                        </a:rPr>
+                        <a:t>Producten</a:t>
+                      </a:r>
+                      <a:r>
+                        <a:rPr lang="nl-NL" noProof="0" dirty="0"/>
+                        <a:t>) en koppeltabel (</a:t>
+                      </a:r>
+                      <a:r>
+                        <a:rPr lang="nl-NL" noProof="0" dirty="0" err="1">
+                          <a:latin typeface="Courier New" panose="02070309020205020404" pitchFamily="49" charset="0"/>
+                          <a:cs typeface="Courier New" panose="02070309020205020404" pitchFamily="49" charset="0"/>
+                        </a:rPr>
+                        <a:t>TransactieProducten</a:t>
+                      </a:r>
+                      <a:r>
+                        <a:rPr lang="nl-NL" noProof="0" dirty="0"/>
+                        <a:t>).</a:t>
                       </a:r>
                     </a:p>
                   </a:txBody>
@@ -21974,7 +22223,7 @@
           <p:nvPr>
             <p:extLst>
               <p:ext uri="{D42A27DB-BD31-4B8C-83A1-F6EECF244321}">
-                <p14:modId xmlns:p14="http://schemas.microsoft.com/office/powerpoint/2010/main" val="3402478098"/>
+                <p14:modId xmlns:p14="http://schemas.microsoft.com/office/powerpoint/2010/main" val="2044121336"/>
               </p:ext>
             </p:extLst>
           </p:nvPr>
@@ -22519,7 +22768,7 @@
           <p:nvPr>
             <p:extLst>
               <p:ext uri="{D42A27DB-BD31-4B8C-83A1-F6EECF244321}">
-                <p14:modId xmlns:p14="http://schemas.microsoft.com/office/powerpoint/2010/main" val="2022337916"/>
+                <p14:modId xmlns:p14="http://schemas.microsoft.com/office/powerpoint/2010/main" val="2106781234"/>
               </p:ext>
             </p:extLst>
           </p:nvPr>
@@ -22556,6 +22805,7 @@
                     <a:bodyPr/>
                     <a:lstStyle/>
                     <a:p>
+                      <a:pPr algn="ctr"/>
                       <a:r>
                         <a:rPr lang="en-US" dirty="0" err="1"/>
                         <a:t>KlantID</a:t>
@@ -22570,6 +22820,7 @@
                     <a:bodyPr/>
                     <a:lstStyle/>
                     <a:p>
+                      <a:pPr algn="ctr"/>
                       <a:r>
                         <a:rPr lang="en-US" dirty="0" err="1"/>
                         <a:t>BoekID</a:t>
@@ -22591,6 +22842,7 @@
                     <a:bodyPr/>
                     <a:lstStyle/>
                     <a:p>
+                      <a:pPr algn="ctr"/>
                       <a:r>
                         <a:rPr lang="en-US" dirty="0"/>
                         <a:t>1</a:t>
@@ -22605,6 +22857,7 @@
                     <a:bodyPr/>
                     <a:lstStyle/>
                     <a:p>
+                      <a:pPr algn="ctr"/>
                       <a:r>
                         <a:rPr lang="en-US" dirty="0"/>
                         <a:t>2</a:t>
@@ -22626,6 +22879,7 @@
                     <a:bodyPr/>
                     <a:lstStyle/>
                     <a:p>
+                      <a:pPr algn="ctr"/>
                       <a:r>
                         <a:rPr lang="en-US" dirty="0"/>
                         <a:t>1</a:t>
@@ -22640,6 +22894,7 @@
                     <a:bodyPr/>
                     <a:lstStyle/>
                     <a:p>
+                      <a:pPr algn="ctr"/>
                       <a:r>
                         <a:rPr lang="en-US" dirty="0"/>
                         <a:t>3</a:t>
@@ -22661,6 +22916,7 @@
                     <a:bodyPr/>
                     <a:lstStyle/>
                     <a:p>
+                      <a:pPr algn="ctr"/>
                       <a:r>
                         <a:rPr lang="en-US" dirty="0"/>
                         <a:t>2</a:t>
@@ -22675,6 +22931,7 @@
                     <a:bodyPr/>
                     <a:lstStyle/>
                     <a:p>
+                      <a:pPr algn="ctr"/>
                       <a:r>
                         <a:rPr lang="en-US" dirty="0"/>
                         <a:t>1</a:t>
@@ -22696,6 +22953,7 @@
                     <a:bodyPr/>
                     <a:lstStyle/>
                     <a:p>
+                      <a:pPr algn="ctr"/>
                       <a:r>
                         <a:rPr lang="en-US" dirty="0"/>
                         <a:t>3</a:t>
@@ -22710,6 +22968,7 @@
                     <a:bodyPr/>
                     <a:lstStyle/>
                     <a:p>
+                      <a:pPr algn="ctr"/>
                       <a:r>
                         <a:rPr lang="en-US" dirty="0"/>
                         <a:t>3</a:t>
@@ -22854,7 +23113,7 @@
         <p:spPr>
           <a:xfrm>
             <a:off x="4900773" y="6113124"/>
-            <a:ext cx="1023029" cy="0"/>
+            <a:ext cx="1134267" cy="0"/>
           </a:xfrm>
           <a:prstGeom prst="line">
             <a:avLst/>
@@ -22891,8 +23150,8 @@
         </p:nvCxnSpPr>
         <p:spPr>
           <a:xfrm>
-            <a:off x="1160980" y="6113124"/>
-            <a:ext cx="2520696" cy="0"/>
+            <a:off x="1350498" y="6113124"/>
+            <a:ext cx="2405576" cy="0"/>
           </a:xfrm>
           <a:prstGeom prst="line">
             <a:avLst/>
@@ -22922,12 +23181,14 @@
               </a:ext>
             </a:extLst>
           </p:cNvPr>
-          <p:cNvCxnSpPr/>
+          <p:cNvCxnSpPr>
+            <a:cxnSpLocks/>
+          </p:cNvCxnSpPr>
           <p:nvPr/>
         </p:nvCxnSpPr>
         <p:spPr>
           <a:xfrm flipV="1">
-            <a:off x="1171254" y="5151636"/>
+            <a:off x="1350498" y="5151636"/>
             <a:ext cx="0" cy="961488"/>
           </a:xfrm>
           <a:prstGeom prst="straightConnector1">
@@ -22961,12 +23222,14 @@
               </a:ext>
             </a:extLst>
           </p:cNvPr>
-          <p:cNvCxnSpPr/>
+          <p:cNvCxnSpPr>
+            <a:cxnSpLocks/>
+          </p:cNvCxnSpPr>
           <p:nvPr/>
         </p:nvCxnSpPr>
         <p:spPr>
           <a:xfrm flipV="1">
-            <a:off x="3681676" y="5664716"/>
+            <a:off x="3756074" y="5664716"/>
             <a:ext cx="0" cy="448408"/>
           </a:xfrm>
           <a:prstGeom prst="straightConnector1">
@@ -23048,7 +23311,7 @@
         </p:nvCxnSpPr>
         <p:spPr>
           <a:xfrm flipV="1">
-            <a:off x="5923802" y="5151636"/>
+            <a:off x="6035040" y="5151636"/>
             <a:ext cx="0" cy="961488"/>
           </a:xfrm>
           <a:prstGeom prst="straightConnector1">
@@ -23549,7 +23812,13 @@
           <p:cNvGraphicFramePr>
             <a:graphicFrameLocks noGrp="1"/>
           </p:cNvGraphicFramePr>
-          <p:nvPr/>
+          <p:nvPr>
+            <p:extLst>
+              <p:ext uri="{D42A27DB-BD31-4B8C-83A1-F6EECF244321}">
+                <p14:modId xmlns:p14="http://schemas.microsoft.com/office/powerpoint/2010/main" val="1141215937"/>
+              </p:ext>
+            </p:extLst>
+          </p:nvPr>
         </p:nvGraphicFramePr>
         <p:xfrm>
           <a:off x="7556643" y="3605033"/>
@@ -23906,7 +24175,13 @@
           <p:cNvGraphicFramePr>
             <a:graphicFrameLocks noGrp="1"/>
           </p:cNvGraphicFramePr>
-          <p:nvPr/>
+          <p:nvPr>
+            <p:extLst>
+              <p:ext uri="{D42A27DB-BD31-4B8C-83A1-F6EECF244321}">
+                <p14:modId xmlns:p14="http://schemas.microsoft.com/office/powerpoint/2010/main" val="3396506055"/>
+              </p:ext>
+            </p:extLst>
+          </p:nvPr>
         </p:nvGraphicFramePr>
         <p:xfrm>
           <a:off x="858747" y="3605033"/>

</xml_diff>

<commit_message>
Clean up, update data generator
</commit_message>
<xml_diff>
--- a/sql_course/2_database_design/2_database_design.pptx
+++ b/sql_course/2_database_design/2_database_design.pptx
@@ -248,7 +248,7 @@
           <a:p>
             <a:fld id="{61CE90D0-176A-4BE5-B54F-392F0A16E3B3}" type="datetimeFigureOut">
               <a:rPr lang="en-NL" smtClean="0"/>
-              <a:t>15/01/2025</a:t>
+              <a:t>16/01/2025</a:t>
             </a:fld>
             <a:endParaRPr lang="en-NL"/>
           </a:p>
@@ -3009,7 +3009,7 @@
           <a:p>
             <a:fld id="{7B15CBDA-B49C-4B0F-9869-5B15867EA611}" type="datetimeFigureOut">
               <a:rPr lang="en-NL" smtClean="0"/>
-              <a:t>15/01/2025</a:t>
+              <a:t>16/01/2025</a:t>
             </a:fld>
             <a:endParaRPr lang="en-NL"/>
           </a:p>
@@ -3209,7 +3209,7 @@
           <a:p>
             <a:fld id="{7B15CBDA-B49C-4B0F-9869-5B15867EA611}" type="datetimeFigureOut">
               <a:rPr lang="en-NL" smtClean="0"/>
-              <a:t>15/01/2025</a:t>
+              <a:t>16/01/2025</a:t>
             </a:fld>
             <a:endParaRPr lang="en-NL"/>
           </a:p>
@@ -3419,7 +3419,7 @@
           <a:p>
             <a:fld id="{7B15CBDA-B49C-4B0F-9869-5B15867EA611}" type="datetimeFigureOut">
               <a:rPr lang="en-NL" smtClean="0"/>
-              <a:t>15/01/2025</a:t>
+              <a:t>16/01/2025</a:t>
             </a:fld>
             <a:endParaRPr lang="en-NL"/>
           </a:p>
@@ -3619,7 +3619,7 @@
           <a:p>
             <a:fld id="{7B15CBDA-B49C-4B0F-9869-5B15867EA611}" type="datetimeFigureOut">
               <a:rPr lang="en-NL" smtClean="0"/>
-              <a:t>15/01/2025</a:t>
+              <a:t>16/01/2025</a:t>
             </a:fld>
             <a:endParaRPr lang="en-NL"/>
           </a:p>
@@ -3895,7 +3895,7 @@
           <a:p>
             <a:fld id="{7B15CBDA-B49C-4B0F-9869-5B15867EA611}" type="datetimeFigureOut">
               <a:rPr lang="en-NL" smtClean="0"/>
-              <a:t>15/01/2025</a:t>
+              <a:t>16/01/2025</a:t>
             </a:fld>
             <a:endParaRPr lang="en-NL"/>
           </a:p>
@@ -4163,7 +4163,7 @@
           <a:p>
             <a:fld id="{7B15CBDA-B49C-4B0F-9869-5B15867EA611}" type="datetimeFigureOut">
               <a:rPr lang="en-NL" smtClean="0"/>
-              <a:t>15/01/2025</a:t>
+              <a:t>16/01/2025</a:t>
             </a:fld>
             <a:endParaRPr lang="en-NL"/>
           </a:p>
@@ -4578,7 +4578,7 @@
           <a:p>
             <a:fld id="{7B15CBDA-B49C-4B0F-9869-5B15867EA611}" type="datetimeFigureOut">
               <a:rPr lang="en-NL" smtClean="0"/>
-              <a:t>15/01/2025</a:t>
+              <a:t>16/01/2025</a:t>
             </a:fld>
             <a:endParaRPr lang="en-NL"/>
           </a:p>
@@ -4720,7 +4720,7 @@
           <a:p>
             <a:fld id="{7B15CBDA-B49C-4B0F-9869-5B15867EA611}" type="datetimeFigureOut">
               <a:rPr lang="en-NL" smtClean="0"/>
-              <a:t>15/01/2025</a:t>
+              <a:t>16/01/2025</a:t>
             </a:fld>
             <a:endParaRPr lang="en-NL"/>
           </a:p>
@@ -4833,7 +4833,7 @@
           <a:p>
             <a:fld id="{7B15CBDA-B49C-4B0F-9869-5B15867EA611}" type="datetimeFigureOut">
               <a:rPr lang="en-NL" smtClean="0"/>
-              <a:t>15/01/2025</a:t>
+              <a:t>16/01/2025</a:t>
             </a:fld>
             <a:endParaRPr lang="en-NL"/>
           </a:p>
@@ -5146,7 +5146,7 @@
           <a:p>
             <a:fld id="{7B15CBDA-B49C-4B0F-9869-5B15867EA611}" type="datetimeFigureOut">
               <a:rPr lang="en-NL" smtClean="0"/>
-              <a:t>15/01/2025</a:t>
+              <a:t>16/01/2025</a:t>
             </a:fld>
             <a:endParaRPr lang="en-NL"/>
           </a:p>
@@ -5435,7 +5435,7 @@
           <a:p>
             <a:fld id="{7B15CBDA-B49C-4B0F-9869-5B15867EA611}" type="datetimeFigureOut">
               <a:rPr lang="en-NL" smtClean="0"/>
-              <a:t>15/01/2025</a:t>
+              <a:t>16/01/2025</a:t>
             </a:fld>
             <a:endParaRPr lang="en-NL"/>
           </a:p>
@@ -5678,7 +5678,7 @@
           <a:p>
             <a:fld id="{7B15CBDA-B49C-4B0F-9869-5B15867EA611}" type="datetimeFigureOut">
               <a:rPr lang="en-NL" smtClean="0"/>
-              <a:t>15/01/2025</a:t>
+              <a:t>16/01/2025</a:t>
             </a:fld>
             <a:endParaRPr lang="en-NL"/>
           </a:p>
@@ -12100,6 +12100,36 @@
           </a:p>
         </p:txBody>
       </p:sp>
+      <p:pic>
+        <p:nvPicPr>
+          <p:cNvPr id="4" name="Picture 3">
+            <a:extLst>
+              <a:ext uri="{FF2B5EF4-FFF2-40B4-BE49-F238E27FC236}">
+                <a16:creationId xmlns:a16="http://schemas.microsoft.com/office/drawing/2014/main" id="{0FCD4BFA-BE16-2B70-772E-C4C5042A23B6}"/>
+              </a:ext>
+            </a:extLst>
+          </p:cNvPr>
+          <p:cNvPicPr>
+            <a:picLocks noChangeAspect="1"/>
+          </p:cNvPicPr>
+          <p:nvPr/>
+        </p:nvPicPr>
+        <p:blipFill>
+          <a:blip r:embed="rId2"/>
+          <a:stretch>
+            <a:fillRect/>
+          </a:stretch>
+        </p:blipFill>
+        <p:spPr>
+          <a:xfrm rot="1217736">
+            <a:off x="8324075" y="3685187"/>
+            <a:ext cx="2694468" cy="2415360"/>
+          </a:xfrm>
+          <a:prstGeom prst="rect">
+            <a:avLst/>
+          </a:prstGeom>
+        </p:spPr>
+      </p:pic>
     </p:spTree>
     <p:extLst>
       <p:ext uri="{BB962C8B-B14F-4D97-AF65-F5344CB8AC3E}">

</xml_diff>

<commit_message>
Fixes for SQL part 2
</commit_message>
<xml_diff>
--- a/sql_course/2_database_design/2_database_design.pptx
+++ b/sql_course/2_database_design/2_database_design.pptx
@@ -256,7 +256,7 @@
           <a:p>
             <a:fld id="{61CE90D0-176A-4BE5-B54F-392F0A16E3B3}" type="datetimeFigureOut">
               <a:rPr lang="en-NL" smtClean="0"/>
-              <a:t>30/01/2025</a:t>
+              <a:t>31/01/2025</a:t>
             </a:fld>
             <a:endParaRPr lang="en-NL"/>
           </a:p>
@@ -3984,7 +3984,7 @@
           <a:p>
             <a:fld id="{7B15CBDA-B49C-4B0F-9869-5B15867EA611}" type="datetimeFigureOut">
               <a:rPr lang="en-NL" smtClean="0"/>
-              <a:t>30/01/2025</a:t>
+              <a:t>31/01/2025</a:t>
             </a:fld>
             <a:endParaRPr lang="en-NL"/>
           </a:p>
@@ -4184,7 +4184,7 @@
           <a:p>
             <a:fld id="{7B15CBDA-B49C-4B0F-9869-5B15867EA611}" type="datetimeFigureOut">
               <a:rPr lang="en-NL" smtClean="0"/>
-              <a:t>30/01/2025</a:t>
+              <a:t>31/01/2025</a:t>
             </a:fld>
             <a:endParaRPr lang="en-NL"/>
           </a:p>
@@ -4394,7 +4394,7 @@
           <a:p>
             <a:fld id="{7B15CBDA-B49C-4B0F-9869-5B15867EA611}" type="datetimeFigureOut">
               <a:rPr lang="en-NL" smtClean="0"/>
-              <a:t>30/01/2025</a:t>
+              <a:t>31/01/2025</a:t>
             </a:fld>
             <a:endParaRPr lang="en-NL"/>
           </a:p>
@@ -4594,7 +4594,7 @@
           <a:p>
             <a:fld id="{7B15CBDA-B49C-4B0F-9869-5B15867EA611}" type="datetimeFigureOut">
               <a:rPr lang="en-NL" smtClean="0"/>
-              <a:t>30/01/2025</a:t>
+              <a:t>31/01/2025</a:t>
             </a:fld>
             <a:endParaRPr lang="en-NL"/>
           </a:p>
@@ -4870,7 +4870,7 @@
           <a:p>
             <a:fld id="{7B15CBDA-B49C-4B0F-9869-5B15867EA611}" type="datetimeFigureOut">
               <a:rPr lang="en-NL" smtClean="0"/>
-              <a:t>30/01/2025</a:t>
+              <a:t>31/01/2025</a:t>
             </a:fld>
             <a:endParaRPr lang="en-NL"/>
           </a:p>
@@ -5138,7 +5138,7 @@
           <a:p>
             <a:fld id="{7B15CBDA-B49C-4B0F-9869-5B15867EA611}" type="datetimeFigureOut">
               <a:rPr lang="en-NL" smtClean="0"/>
-              <a:t>30/01/2025</a:t>
+              <a:t>31/01/2025</a:t>
             </a:fld>
             <a:endParaRPr lang="en-NL"/>
           </a:p>
@@ -5553,7 +5553,7 @@
           <a:p>
             <a:fld id="{7B15CBDA-B49C-4B0F-9869-5B15867EA611}" type="datetimeFigureOut">
               <a:rPr lang="en-NL" smtClean="0"/>
-              <a:t>30/01/2025</a:t>
+              <a:t>31/01/2025</a:t>
             </a:fld>
             <a:endParaRPr lang="en-NL"/>
           </a:p>
@@ -5695,7 +5695,7 @@
           <a:p>
             <a:fld id="{7B15CBDA-B49C-4B0F-9869-5B15867EA611}" type="datetimeFigureOut">
               <a:rPr lang="en-NL" smtClean="0"/>
-              <a:t>30/01/2025</a:t>
+              <a:t>31/01/2025</a:t>
             </a:fld>
             <a:endParaRPr lang="en-NL"/>
           </a:p>
@@ -5808,7 +5808,7 @@
           <a:p>
             <a:fld id="{7B15CBDA-B49C-4B0F-9869-5B15867EA611}" type="datetimeFigureOut">
               <a:rPr lang="en-NL" smtClean="0"/>
-              <a:t>30/01/2025</a:t>
+              <a:t>31/01/2025</a:t>
             </a:fld>
             <a:endParaRPr lang="en-NL"/>
           </a:p>
@@ -6121,7 +6121,7 @@
           <a:p>
             <a:fld id="{7B15CBDA-B49C-4B0F-9869-5B15867EA611}" type="datetimeFigureOut">
               <a:rPr lang="en-NL" smtClean="0"/>
-              <a:t>30/01/2025</a:t>
+              <a:t>31/01/2025</a:t>
             </a:fld>
             <a:endParaRPr lang="en-NL"/>
           </a:p>
@@ -6410,7 +6410,7 @@
           <a:p>
             <a:fld id="{7B15CBDA-B49C-4B0F-9869-5B15867EA611}" type="datetimeFigureOut">
               <a:rPr lang="en-NL" smtClean="0"/>
-              <a:t>30/01/2025</a:t>
+              <a:t>31/01/2025</a:t>
             </a:fld>
             <a:endParaRPr lang="en-NL"/>
           </a:p>
@@ -6653,7 +6653,7 @@
           <a:p>
             <a:fld id="{7B15CBDA-B49C-4B0F-9869-5B15867EA611}" type="datetimeFigureOut">
               <a:rPr lang="en-NL" smtClean="0"/>
-              <a:t>30/01/2025</a:t>
+              <a:t>31/01/2025</a:t>
             </a:fld>
             <a:endParaRPr lang="en-NL"/>
           </a:p>
@@ -19799,7 +19799,7 @@
                 <a:latin typeface="Courier New" panose="02070309020205020404" pitchFamily="49" charset="0"/>
                 <a:cs typeface="Courier New" panose="02070309020205020404" pitchFamily="49" charset="0"/>
               </a:rPr>
-              <a:t>TEKST   </a:t>
+              <a:t>TEXT    </a:t>
             </a:r>
             <a:r>
               <a:rPr lang="nl-NL" sz="2000" b="1" noProof="0" dirty="0">
@@ -19842,7 +19842,31 @@
                 <a:latin typeface="Courier New" panose="02070309020205020404" pitchFamily="49" charset="0"/>
                 <a:cs typeface="Courier New" panose="02070309020205020404" pitchFamily="49" charset="0"/>
               </a:rPr>
-              <a:t>TEKST   </a:t>
+              <a:t>TE</a:t>
+            </a:r>
+            <a:r>
+              <a:rPr lang="nl-NL" sz="2000" dirty="0">
+                <a:solidFill>
+                  <a:schemeClr val="accent5">
+                    <a:lumMod val="75000"/>
+                  </a:schemeClr>
+                </a:solidFill>
+                <a:latin typeface="Courier New" panose="02070309020205020404" pitchFamily="49" charset="0"/>
+                <a:cs typeface="Courier New" panose="02070309020205020404" pitchFamily="49" charset="0"/>
+              </a:rPr>
+              <a:t>X</a:t>
+            </a:r>
+            <a:r>
+              <a:rPr lang="nl-NL" sz="2000" noProof="0" dirty="0">
+                <a:solidFill>
+                  <a:schemeClr val="accent5">
+                    <a:lumMod val="75000"/>
+                  </a:schemeClr>
+                </a:solidFill>
+                <a:latin typeface="Courier New" panose="02070309020205020404" pitchFamily="49" charset="0"/>
+                <a:cs typeface="Courier New" panose="02070309020205020404" pitchFamily="49" charset="0"/>
+              </a:rPr>
+              <a:t>T    </a:t>
             </a:r>
             <a:r>
               <a:rPr lang="nl-NL" sz="2000" b="1" noProof="0" dirty="0">

</xml_diff>